<commit_message>
finish ps for graphics, graphics page
</commit_message>
<xml_diff>
--- a/HW1.pptx
+++ b/HW1.pptx
@@ -116,6 +116,3340 @@
     </p:ext>
   </p:extLst>
 </p:presentation>
+</file>
+
+<file path=ppt/diagrams/colors1.xml><?xml version="1.0" encoding="utf-8"?>
+<dgm:colorsDef xmlns:dgm="http://schemas.openxmlformats.org/drawingml/2006/diagram" xmlns:a="http://schemas.openxmlformats.org/drawingml/2006/main" uniqueId="urn:microsoft.com/office/officeart/2005/8/colors/accent1_2">
+  <dgm:title val=""/>
+  <dgm:desc val=""/>
+  <dgm:catLst>
+    <dgm:cat type="accent1" pri="11200"/>
+  </dgm:catLst>
+  <dgm:styleLbl name="node0">
+    <dgm:fillClrLst meth="repeat">
+      <a:schemeClr val="accent1"/>
+    </dgm:fillClrLst>
+    <dgm:linClrLst meth="repeat">
+      <a:schemeClr val="lt1"/>
+    </dgm:linClrLst>
+    <dgm:effectClrLst/>
+    <dgm:txLinClrLst/>
+    <dgm:txFillClrLst/>
+    <dgm:txEffectClrLst/>
+  </dgm:styleLbl>
+  <dgm:styleLbl name="alignNode1">
+    <dgm:fillClrLst meth="repeat">
+      <a:schemeClr val="accent1"/>
+    </dgm:fillClrLst>
+    <dgm:linClrLst meth="repeat">
+      <a:schemeClr val="accent1"/>
+    </dgm:linClrLst>
+    <dgm:effectClrLst/>
+    <dgm:txLinClrLst/>
+    <dgm:txFillClrLst/>
+    <dgm:txEffectClrLst/>
+  </dgm:styleLbl>
+  <dgm:styleLbl name="node1">
+    <dgm:fillClrLst meth="repeat">
+      <a:schemeClr val="accent1"/>
+    </dgm:fillClrLst>
+    <dgm:linClrLst meth="repeat">
+      <a:schemeClr val="lt1"/>
+    </dgm:linClrLst>
+    <dgm:effectClrLst/>
+    <dgm:txLinClrLst/>
+    <dgm:txFillClrLst/>
+    <dgm:txEffectClrLst/>
+  </dgm:styleLbl>
+  <dgm:styleLbl name="lnNode1">
+    <dgm:fillClrLst meth="repeat">
+      <a:schemeClr val="accent1"/>
+    </dgm:fillClrLst>
+    <dgm:linClrLst meth="repeat">
+      <a:schemeClr val="lt1"/>
+    </dgm:linClrLst>
+    <dgm:effectClrLst/>
+    <dgm:txLinClrLst/>
+    <dgm:txFillClrLst/>
+    <dgm:txEffectClrLst/>
+  </dgm:styleLbl>
+  <dgm:styleLbl name="vennNode1">
+    <dgm:fillClrLst meth="repeat">
+      <a:schemeClr val="accent1">
+        <a:alpha val="50000"/>
+      </a:schemeClr>
+    </dgm:fillClrLst>
+    <dgm:linClrLst meth="repeat">
+      <a:schemeClr val="lt1"/>
+    </dgm:linClrLst>
+    <dgm:effectClrLst/>
+    <dgm:txLinClrLst/>
+    <dgm:txFillClrLst/>
+    <dgm:txEffectClrLst/>
+  </dgm:styleLbl>
+  <dgm:styleLbl name="node2">
+    <dgm:fillClrLst meth="repeat">
+      <a:schemeClr val="accent1"/>
+    </dgm:fillClrLst>
+    <dgm:linClrLst meth="repeat">
+      <a:schemeClr val="lt1"/>
+    </dgm:linClrLst>
+    <dgm:effectClrLst/>
+    <dgm:txLinClrLst/>
+    <dgm:txFillClrLst/>
+    <dgm:txEffectClrLst/>
+  </dgm:styleLbl>
+  <dgm:styleLbl name="node3">
+    <dgm:fillClrLst meth="repeat">
+      <a:schemeClr val="accent1"/>
+    </dgm:fillClrLst>
+    <dgm:linClrLst meth="repeat">
+      <a:schemeClr val="lt1"/>
+    </dgm:linClrLst>
+    <dgm:effectClrLst/>
+    <dgm:txLinClrLst/>
+    <dgm:txFillClrLst/>
+    <dgm:txEffectClrLst/>
+  </dgm:styleLbl>
+  <dgm:styleLbl name="node4">
+    <dgm:fillClrLst meth="repeat">
+      <a:schemeClr val="accent1"/>
+    </dgm:fillClrLst>
+    <dgm:linClrLst meth="repeat">
+      <a:schemeClr val="lt1"/>
+    </dgm:linClrLst>
+    <dgm:effectClrLst/>
+    <dgm:txLinClrLst/>
+    <dgm:txFillClrLst/>
+    <dgm:txEffectClrLst/>
+  </dgm:styleLbl>
+  <dgm:styleLbl name="fgImgPlace1">
+    <dgm:fillClrLst meth="repeat">
+      <a:schemeClr val="accent1">
+        <a:tint val="50000"/>
+      </a:schemeClr>
+    </dgm:fillClrLst>
+    <dgm:linClrLst meth="repeat">
+      <a:schemeClr val="lt1"/>
+    </dgm:linClrLst>
+    <dgm:effectClrLst/>
+    <dgm:txLinClrLst/>
+    <dgm:txFillClrLst meth="repeat">
+      <a:schemeClr val="lt1"/>
+    </dgm:txFillClrLst>
+    <dgm:txEffectClrLst/>
+  </dgm:styleLbl>
+  <dgm:styleLbl name="alignImgPlace1">
+    <dgm:fillClrLst meth="repeat">
+      <a:schemeClr val="accent1">
+        <a:tint val="50000"/>
+      </a:schemeClr>
+    </dgm:fillClrLst>
+    <dgm:linClrLst meth="repeat">
+      <a:schemeClr val="lt1"/>
+    </dgm:linClrLst>
+    <dgm:effectClrLst/>
+    <dgm:txLinClrLst/>
+    <dgm:txFillClrLst meth="repeat">
+      <a:schemeClr val="lt1"/>
+    </dgm:txFillClrLst>
+    <dgm:txEffectClrLst/>
+  </dgm:styleLbl>
+  <dgm:styleLbl name="bgImgPlace1">
+    <dgm:fillClrLst meth="repeat">
+      <a:schemeClr val="accent1">
+        <a:tint val="50000"/>
+      </a:schemeClr>
+    </dgm:fillClrLst>
+    <dgm:linClrLst meth="repeat">
+      <a:schemeClr val="lt1"/>
+    </dgm:linClrLst>
+    <dgm:effectClrLst/>
+    <dgm:txLinClrLst/>
+    <dgm:txFillClrLst meth="repeat">
+      <a:schemeClr val="lt1"/>
+    </dgm:txFillClrLst>
+    <dgm:txEffectClrLst/>
+  </dgm:styleLbl>
+  <dgm:styleLbl name="sibTrans2D1">
+    <dgm:fillClrLst meth="repeat">
+      <a:schemeClr val="accent1">
+        <a:tint val="60000"/>
+      </a:schemeClr>
+    </dgm:fillClrLst>
+    <dgm:linClrLst meth="repeat">
+      <a:schemeClr val="accent1">
+        <a:tint val="60000"/>
+      </a:schemeClr>
+    </dgm:linClrLst>
+    <dgm:effectClrLst/>
+    <dgm:txLinClrLst/>
+    <dgm:txFillClrLst/>
+    <dgm:txEffectClrLst/>
+  </dgm:styleLbl>
+  <dgm:styleLbl name="fgSibTrans2D1">
+    <dgm:fillClrLst meth="repeat">
+      <a:schemeClr val="accent1">
+        <a:tint val="60000"/>
+      </a:schemeClr>
+    </dgm:fillClrLst>
+    <dgm:linClrLst meth="repeat">
+      <a:schemeClr val="accent1">
+        <a:tint val="60000"/>
+      </a:schemeClr>
+    </dgm:linClrLst>
+    <dgm:effectClrLst/>
+    <dgm:txLinClrLst/>
+    <dgm:txFillClrLst/>
+    <dgm:txEffectClrLst/>
+  </dgm:styleLbl>
+  <dgm:styleLbl name="bgSibTrans2D1">
+    <dgm:fillClrLst meth="repeat">
+      <a:schemeClr val="accent1">
+        <a:tint val="60000"/>
+      </a:schemeClr>
+    </dgm:fillClrLst>
+    <dgm:linClrLst meth="repeat">
+      <a:schemeClr val="accent1">
+        <a:tint val="60000"/>
+      </a:schemeClr>
+    </dgm:linClrLst>
+    <dgm:effectClrLst/>
+    <dgm:txLinClrLst/>
+    <dgm:txFillClrLst/>
+    <dgm:txEffectClrLst/>
+  </dgm:styleLbl>
+  <dgm:styleLbl name="sibTrans1D1">
+    <dgm:fillClrLst meth="repeat">
+      <a:schemeClr val="accent1"/>
+    </dgm:fillClrLst>
+    <dgm:linClrLst meth="repeat">
+      <a:schemeClr val="accent1"/>
+    </dgm:linClrLst>
+    <dgm:effectClrLst/>
+    <dgm:txLinClrLst/>
+    <dgm:txFillClrLst meth="repeat">
+      <a:schemeClr val="tx1"/>
+    </dgm:txFillClrLst>
+    <dgm:txEffectClrLst/>
+  </dgm:styleLbl>
+  <dgm:styleLbl name="callout">
+    <dgm:fillClrLst meth="repeat">
+      <a:schemeClr val="accent1"/>
+    </dgm:fillClrLst>
+    <dgm:linClrLst meth="repeat">
+      <a:schemeClr val="accent1">
+        <a:tint val="50000"/>
+      </a:schemeClr>
+    </dgm:linClrLst>
+    <dgm:effectClrLst/>
+    <dgm:txLinClrLst/>
+    <dgm:txFillClrLst meth="repeat">
+      <a:schemeClr val="tx1"/>
+    </dgm:txFillClrLst>
+    <dgm:txEffectClrLst/>
+  </dgm:styleLbl>
+  <dgm:styleLbl name="asst0">
+    <dgm:fillClrLst meth="repeat">
+      <a:schemeClr val="accent1"/>
+    </dgm:fillClrLst>
+    <dgm:linClrLst meth="repeat">
+      <a:schemeClr val="lt1"/>
+    </dgm:linClrLst>
+    <dgm:effectClrLst/>
+    <dgm:txLinClrLst/>
+    <dgm:txFillClrLst/>
+    <dgm:txEffectClrLst/>
+  </dgm:styleLbl>
+  <dgm:styleLbl name="asst1">
+    <dgm:fillClrLst meth="repeat">
+      <a:schemeClr val="accent1"/>
+    </dgm:fillClrLst>
+    <dgm:linClrLst meth="repeat">
+      <a:schemeClr val="lt1"/>
+    </dgm:linClrLst>
+    <dgm:effectClrLst/>
+    <dgm:txLinClrLst/>
+    <dgm:txFillClrLst/>
+    <dgm:txEffectClrLst/>
+  </dgm:styleLbl>
+  <dgm:styleLbl name="asst2">
+    <dgm:fillClrLst meth="repeat">
+      <a:schemeClr val="accent1"/>
+    </dgm:fillClrLst>
+    <dgm:linClrLst meth="repeat">
+      <a:schemeClr val="lt1"/>
+    </dgm:linClrLst>
+    <dgm:effectClrLst/>
+    <dgm:txLinClrLst/>
+    <dgm:txFillClrLst/>
+    <dgm:txEffectClrLst/>
+  </dgm:styleLbl>
+  <dgm:styleLbl name="asst3">
+    <dgm:fillClrLst meth="repeat">
+      <a:schemeClr val="accent1"/>
+    </dgm:fillClrLst>
+    <dgm:linClrLst meth="repeat">
+      <a:schemeClr val="lt1"/>
+    </dgm:linClrLst>
+    <dgm:effectClrLst/>
+    <dgm:txLinClrLst/>
+    <dgm:txFillClrLst/>
+    <dgm:txEffectClrLst/>
+  </dgm:styleLbl>
+  <dgm:styleLbl name="asst4">
+    <dgm:fillClrLst meth="repeat">
+      <a:schemeClr val="accent1"/>
+    </dgm:fillClrLst>
+    <dgm:linClrLst meth="repeat">
+      <a:schemeClr val="lt1"/>
+    </dgm:linClrLst>
+    <dgm:effectClrLst/>
+    <dgm:txLinClrLst/>
+    <dgm:txFillClrLst/>
+    <dgm:txEffectClrLst/>
+  </dgm:styleLbl>
+  <dgm:styleLbl name="parChTrans2D1">
+    <dgm:fillClrLst meth="repeat">
+      <a:schemeClr val="accent1">
+        <a:tint val="60000"/>
+      </a:schemeClr>
+    </dgm:fillClrLst>
+    <dgm:linClrLst meth="repeat">
+      <a:schemeClr val="accent1">
+        <a:tint val="60000"/>
+      </a:schemeClr>
+    </dgm:linClrLst>
+    <dgm:effectClrLst/>
+    <dgm:txLinClrLst/>
+    <dgm:txFillClrLst meth="repeat">
+      <a:schemeClr val="lt1"/>
+    </dgm:txFillClrLst>
+    <dgm:txEffectClrLst/>
+  </dgm:styleLbl>
+  <dgm:styleLbl name="parChTrans2D2">
+    <dgm:fillClrLst meth="repeat">
+      <a:schemeClr val="accent1"/>
+    </dgm:fillClrLst>
+    <dgm:linClrLst meth="repeat">
+      <a:schemeClr val="accent1"/>
+    </dgm:linClrLst>
+    <dgm:effectClrLst/>
+    <dgm:txLinClrLst/>
+    <dgm:txFillClrLst meth="repeat">
+      <a:schemeClr val="lt1"/>
+    </dgm:txFillClrLst>
+    <dgm:txEffectClrLst/>
+  </dgm:styleLbl>
+  <dgm:styleLbl name="parChTrans2D3">
+    <dgm:fillClrLst meth="repeat">
+      <a:schemeClr val="accent1"/>
+    </dgm:fillClrLst>
+    <dgm:linClrLst meth="repeat">
+      <a:schemeClr val="accent1"/>
+    </dgm:linClrLst>
+    <dgm:effectClrLst/>
+    <dgm:txLinClrLst/>
+    <dgm:txFillClrLst meth="repeat">
+      <a:schemeClr val="lt1"/>
+    </dgm:txFillClrLst>
+    <dgm:txEffectClrLst/>
+  </dgm:styleLbl>
+  <dgm:styleLbl name="parChTrans2D4">
+    <dgm:fillClrLst meth="repeat">
+      <a:schemeClr val="accent1"/>
+    </dgm:fillClrLst>
+    <dgm:linClrLst meth="repeat">
+      <a:schemeClr val="accent1"/>
+    </dgm:linClrLst>
+    <dgm:effectClrLst/>
+    <dgm:txLinClrLst/>
+    <dgm:txFillClrLst meth="repeat">
+      <a:schemeClr val="lt1"/>
+    </dgm:txFillClrLst>
+    <dgm:txEffectClrLst/>
+  </dgm:styleLbl>
+  <dgm:styleLbl name="parChTrans1D1">
+    <dgm:fillClrLst meth="repeat">
+      <a:schemeClr val="accent1"/>
+    </dgm:fillClrLst>
+    <dgm:linClrLst meth="repeat">
+      <a:schemeClr val="accent1">
+        <a:shade val="60000"/>
+      </a:schemeClr>
+    </dgm:linClrLst>
+    <dgm:effectClrLst/>
+    <dgm:txLinClrLst/>
+    <dgm:txFillClrLst meth="repeat">
+      <a:schemeClr val="tx1"/>
+    </dgm:txFillClrLst>
+    <dgm:txEffectClrLst/>
+  </dgm:styleLbl>
+  <dgm:styleLbl name="parChTrans1D2">
+    <dgm:fillClrLst meth="repeat">
+      <a:schemeClr val="accent1"/>
+    </dgm:fillClrLst>
+    <dgm:linClrLst meth="repeat">
+      <a:schemeClr val="accent1">
+        <a:shade val="60000"/>
+      </a:schemeClr>
+    </dgm:linClrLst>
+    <dgm:effectClrLst/>
+    <dgm:txLinClrLst/>
+    <dgm:txFillClrLst meth="repeat">
+      <a:schemeClr val="tx1"/>
+    </dgm:txFillClrLst>
+    <dgm:txEffectClrLst/>
+  </dgm:styleLbl>
+  <dgm:styleLbl name="parChTrans1D3">
+    <dgm:fillClrLst meth="repeat">
+      <a:schemeClr val="accent1"/>
+    </dgm:fillClrLst>
+    <dgm:linClrLst meth="repeat">
+      <a:schemeClr val="accent1">
+        <a:shade val="80000"/>
+      </a:schemeClr>
+    </dgm:linClrLst>
+    <dgm:effectClrLst/>
+    <dgm:txLinClrLst/>
+    <dgm:txFillClrLst meth="repeat">
+      <a:schemeClr val="tx1"/>
+    </dgm:txFillClrLst>
+    <dgm:txEffectClrLst/>
+  </dgm:styleLbl>
+  <dgm:styleLbl name="parChTrans1D4">
+    <dgm:fillClrLst meth="repeat">
+      <a:schemeClr val="accent1"/>
+    </dgm:fillClrLst>
+    <dgm:linClrLst meth="repeat">
+      <a:schemeClr val="accent1">
+        <a:shade val="80000"/>
+      </a:schemeClr>
+    </dgm:linClrLst>
+    <dgm:effectClrLst/>
+    <dgm:txLinClrLst/>
+    <dgm:txFillClrLst meth="repeat">
+      <a:schemeClr val="tx1"/>
+    </dgm:txFillClrLst>
+    <dgm:txEffectClrLst/>
+  </dgm:styleLbl>
+  <dgm:styleLbl name="fgAcc1">
+    <dgm:fillClrLst meth="repeat">
+      <a:schemeClr val="lt1">
+        <a:alpha val="90000"/>
+      </a:schemeClr>
+    </dgm:fillClrLst>
+    <dgm:linClrLst meth="repeat">
+      <a:schemeClr val="accent1"/>
+    </dgm:linClrLst>
+    <dgm:effectClrLst/>
+    <dgm:txLinClrLst/>
+    <dgm:txFillClrLst meth="repeat">
+      <a:schemeClr val="dk1"/>
+    </dgm:txFillClrLst>
+    <dgm:txEffectClrLst/>
+  </dgm:styleLbl>
+  <dgm:styleLbl name="conFgAcc1">
+    <dgm:fillClrLst meth="repeat">
+      <a:schemeClr val="lt1">
+        <a:alpha val="90000"/>
+      </a:schemeClr>
+    </dgm:fillClrLst>
+    <dgm:linClrLst meth="repeat">
+      <a:schemeClr val="accent1"/>
+    </dgm:linClrLst>
+    <dgm:effectClrLst/>
+    <dgm:txLinClrLst/>
+    <dgm:txFillClrLst meth="repeat">
+      <a:schemeClr val="dk1"/>
+    </dgm:txFillClrLst>
+    <dgm:txEffectClrLst/>
+  </dgm:styleLbl>
+  <dgm:styleLbl name="alignAcc1">
+    <dgm:fillClrLst meth="repeat">
+      <a:schemeClr val="lt1">
+        <a:alpha val="90000"/>
+      </a:schemeClr>
+    </dgm:fillClrLst>
+    <dgm:linClrLst meth="repeat">
+      <a:schemeClr val="accent1"/>
+    </dgm:linClrLst>
+    <dgm:effectClrLst/>
+    <dgm:txLinClrLst/>
+    <dgm:txFillClrLst meth="repeat">
+      <a:schemeClr val="dk1"/>
+    </dgm:txFillClrLst>
+    <dgm:txEffectClrLst/>
+  </dgm:styleLbl>
+  <dgm:styleLbl name="trAlignAcc1">
+    <dgm:fillClrLst meth="repeat">
+      <a:schemeClr val="lt1">
+        <a:alpha val="40000"/>
+      </a:schemeClr>
+    </dgm:fillClrLst>
+    <dgm:linClrLst meth="repeat">
+      <a:schemeClr val="accent1"/>
+    </dgm:linClrLst>
+    <dgm:effectClrLst/>
+    <dgm:txLinClrLst/>
+    <dgm:txFillClrLst meth="repeat">
+      <a:schemeClr val="dk1"/>
+    </dgm:txFillClrLst>
+    <dgm:txEffectClrLst/>
+  </dgm:styleLbl>
+  <dgm:styleLbl name="bgAcc1">
+    <dgm:fillClrLst meth="repeat">
+      <a:schemeClr val="lt1">
+        <a:alpha val="90000"/>
+      </a:schemeClr>
+    </dgm:fillClrLst>
+    <dgm:linClrLst meth="repeat">
+      <a:schemeClr val="accent1"/>
+    </dgm:linClrLst>
+    <dgm:effectClrLst/>
+    <dgm:txLinClrLst/>
+    <dgm:txFillClrLst meth="repeat">
+      <a:schemeClr val="dk1"/>
+    </dgm:txFillClrLst>
+    <dgm:txEffectClrLst/>
+  </dgm:styleLbl>
+  <dgm:styleLbl name="solidFgAcc1">
+    <dgm:fillClrLst meth="repeat">
+      <a:schemeClr val="lt1"/>
+    </dgm:fillClrLst>
+    <dgm:linClrLst meth="repeat">
+      <a:schemeClr val="accent1"/>
+    </dgm:linClrLst>
+    <dgm:effectClrLst/>
+    <dgm:txLinClrLst/>
+    <dgm:txFillClrLst meth="repeat">
+      <a:schemeClr val="dk1"/>
+    </dgm:txFillClrLst>
+    <dgm:txEffectClrLst/>
+  </dgm:styleLbl>
+  <dgm:styleLbl name="solidAlignAcc1">
+    <dgm:fillClrLst meth="repeat">
+      <a:schemeClr val="lt1"/>
+    </dgm:fillClrLst>
+    <dgm:linClrLst meth="repeat">
+      <a:schemeClr val="accent1"/>
+    </dgm:linClrLst>
+    <dgm:effectClrLst/>
+    <dgm:txLinClrLst/>
+    <dgm:txFillClrLst meth="repeat">
+      <a:schemeClr val="dk1"/>
+    </dgm:txFillClrLst>
+    <dgm:txEffectClrLst/>
+  </dgm:styleLbl>
+  <dgm:styleLbl name="solidBgAcc1">
+    <dgm:fillClrLst meth="repeat">
+      <a:schemeClr val="lt1"/>
+    </dgm:fillClrLst>
+    <dgm:linClrLst meth="repeat">
+      <a:schemeClr val="accent1"/>
+    </dgm:linClrLst>
+    <dgm:effectClrLst/>
+    <dgm:txLinClrLst/>
+    <dgm:txFillClrLst meth="repeat">
+      <a:schemeClr val="dk1"/>
+    </dgm:txFillClrLst>
+    <dgm:txEffectClrLst/>
+  </dgm:styleLbl>
+  <dgm:styleLbl name="fgAccFollowNode1">
+    <dgm:fillClrLst meth="repeat">
+      <a:schemeClr val="accent1">
+        <a:alpha val="90000"/>
+        <a:tint val="40000"/>
+      </a:schemeClr>
+    </dgm:fillClrLst>
+    <dgm:linClrLst meth="repeat">
+      <a:schemeClr val="accent1">
+        <a:alpha val="90000"/>
+        <a:tint val="40000"/>
+      </a:schemeClr>
+    </dgm:linClrLst>
+    <dgm:effectClrLst/>
+    <dgm:txLinClrLst/>
+    <dgm:txFillClrLst meth="repeat">
+      <a:schemeClr val="dk1"/>
+    </dgm:txFillClrLst>
+    <dgm:txEffectClrLst/>
+  </dgm:styleLbl>
+  <dgm:styleLbl name="alignAccFollowNode1">
+    <dgm:fillClrLst meth="repeat">
+      <a:schemeClr val="accent1">
+        <a:alpha val="90000"/>
+        <a:tint val="40000"/>
+      </a:schemeClr>
+    </dgm:fillClrLst>
+    <dgm:linClrLst meth="repeat">
+      <a:schemeClr val="accent1">
+        <a:alpha val="90000"/>
+        <a:tint val="40000"/>
+      </a:schemeClr>
+    </dgm:linClrLst>
+    <dgm:effectClrLst/>
+    <dgm:txLinClrLst/>
+    <dgm:txFillClrLst meth="repeat">
+      <a:schemeClr val="dk1"/>
+    </dgm:txFillClrLst>
+    <dgm:txEffectClrLst/>
+  </dgm:styleLbl>
+  <dgm:styleLbl name="bgAccFollowNode1">
+    <dgm:fillClrLst meth="repeat">
+      <a:schemeClr val="accent1">
+        <a:alpha val="90000"/>
+        <a:tint val="40000"/>
+      </a:schemeClr>
+    </dgm:fillClrLst>
+    <dgm:linClrLst meth="repeat">
+      <a:schemeClr val="accent1">
+        <a:alpha val="90000"/>
+        <a:tint val="40000"/>
+      </a:schemeClr>
+    </dgm:linClrLst>
+    <dgm:effectClrLst/>
+    <dgm:txLinClrLst/>
+    <dgm:txFillClrLst meth="repeat">
+      <a:schemeClr val="dk1"/>
+    </dgm:txFillClrLst>
+    <dgm:txEffectClrLst/>
+  </dgm:styleLbl>
+  <dgm:styleLbl name="fgAcc0">
+    <dgm:fillClrLst meth="repeat">
+      <a:schemeClr val="lt1">
+        <a:alpha val="90000"/>
+      </a:schemeClr>
+    </dgm:fillClrLst>
+    <dgm:linClrLst meth="repeat">
+      <a:schemeClr val="accent1"/>
+    </dgm:linClrLst>
+    <dgm:effectClrLst/>
+    <dgm:txLinClrLst/>
+    <dgm:txFillClrLst meth="repeat">
+      <a:schemeClr val="dk1"/>
+    </dgm:txFillClrLst>
+    <dgm:txEffectClrLst/>
+  </dgm:styleLbl>
+  <dgm:styleLbl name="fgAcc2">
+    <dgm:fillClrLst meth="repeat">
+      <a:schemeClr val="lt1">
+        <a:alpha val="90000"/>
+      </a:schemeClr>
+    </dgm:fillClrLst>
+    <dgm:linClrLst meth="repeat">
+      <a:schemeClr val="accent1"/>
+    </dgm:linClrLst>
+    <dgm:effectClrLst/>
+    <dgm:txLinClrLst/>
+    <dgm:txFillClrLst meth="repeat">
+      <a:schemeClr val="dk1"/>
+    </dgm:txFillClrLst>
+    <dgm:txEffectClrLst/>
+  </dgm:styleLbl>
+  <dgm:styleLbl name="fgAcc3">
+    <dgm:fillClrLst meth="repeat">
+      <a:schemeClr val="lt1">
+        <a:alpha val="90000"/>
+      </a:schemeClr>
+    </dgm:fillClrLst>
+    <dgm:linClrLst meth="repeat">
+      <a:schemeClr val="accent1"/>
+    </dgm:linClrLst>
+    <dgm:effectClrLst/>
+    <dgm:txLinClrLst/>
+    <dgm:txFillClrLst meth="repeat">
+      <a:schemeClr val="dk1"/>
+    </dgm:txFillClrLst>
+    <dgm:txEffectClrLst/>
+  </dgm:styleLbl>
+  <dgm:styleLbl name="fgAcc4">
+    <dgm:fillClrLst meth="repeat">
+      <a:schemeClr val="lt1">
+        <a:alpha val="90000"/>
+      </a:schemeClr>
+    </dgm:fillClrLst>
+    <dgm:linClrLst meth="repeat">
+      <a:schemeClr val="accent1"/>
+    </dgm:linClrLst>
+    <dgm:effectClrLst/>
+    <dgm:txLinClrLst/>
+    <dgm:txFillClrLst meth="repeat">
+      <a:schemeClr val="dk1"/>
+    </dgm:txFillClrLst>
+    <dgm:txEffectClrLst/>
+  </dgm:styleLbl>
+  <dgm:styleLbl name="bgShp">
+    <dgm:fillClrLst meth="repeat">
+      <a:schemeClr val="accent1">
+        <a:tint val="40000"/>
+      </a:schemeClr>
+    </dgm:fillClrLst>
+    <dgm:linClrLst meth="repeat">
+      <a:schemeClr val="accent1"/>
+    </dgm:linClrLst>
+    <dgm:effectClrLst/>
+    <dgm:txLinClrLst/>
+    <dgm:txFillClrLst meth="repeat">
+      <a:schemeClr val="dk1"/>
+    </dgm:txFillClrLst>
+    <dgm:txEffectClrLst/>
+  </dgm:styleLbl>
+  <dgm:styleLbl name="dkBgShp">
+    <dgm:fillClrLst meth="repeat">
+      <a:schemeClr val="accent1">
+        <a:shade val="80000"/>
+      </a:schemeClr>
+    </dgm:fillClrLst>
+    <dgm:linClrLst meth="repeat">
+      <a:schemeClr val="accent1"/>
+    </dgm:linClrLst>
+    <dgm:effectClrLst/>
+    <dgm:txLinClrLst/>
+    <dgm:txFillClrLst meth="repeat">
+      <a:schemeClr val="lt1"/>
+    </dgm:txFillClrLst>
+    <dgm:txEffectClrLst/>
+  </dgm:styleLbl>
+  <dgm:styleLbl name="trBgShp">
+    <dgm:fillClrLst meth="repeat">
+      <a:schemeClr val="accent1">
+        <a:tint val="50000"/>
+        <a:alpha val="40000"/>
+      </a:schemeClr>
+    </dgm:fillClrLst>
+    <dgm:linClrLst meth="repeat">
+      <a:schemeClr val="accent1"/>
+    </dgm:linClrLst>
+    <dgm:effectClrLst/>
+    <dgm:txLinClrLst/>
+    <dgm:txFillClrLst meth="repeat">
+      <a:schemeClr val="lt1"/>
+    </dgm:txFillClrLst>
+    <dgm:txEffectClrLst/>
+  </dgm:styleLbl>
+  <dgm:styleLbl name="fgShp">
+    <dgm:fillClrLst meth="repeat">
+      <a:schemeClr val="accent1">
+        <a:tint val="60000"/>
+      </a:schemeClr>
+    </dgm:fillClrLst>
+    <dgm:linClrLst meth="repeat">
+      <a:schemeClr val="lt1"/>
+    </dgm:linClrLst>
+    <dgm:effectClrLst/>
+    <dgm:txLinClrLst/>
+    <dgm:txFillClrLst meth="repeat">
+      <a:schemeClr val="dk1"/>
+    </dgm:txFillClrLst>
+    <dgm:txEffectClrLst/>
+  </dgm:styleLbl>
+  <dgm:styleLbl name="revTx">
+    <dgm:fillClrLst meth="repeat">
+      <a:schemeClr val="lt1">
+        <a:alpha val="0"/>
+      </a:schemeClr>
+    </dgm:fillClrLst>
+    <dgm:linClrLst meth="repeat">
+      <a:schemeClr val="dk1">
+        <a:alpha val="0"/>
+      </a:schemeClr>
+    </dgm:linClrLst>
+    <dgm:effectClrLst/>
+    <dgm:txLinClrLst/>
+    <dgm:txFillClrLst meth="repeat">
+      <a:schemeClr val="tx1"/>
+    </dgm:txFillClrLst>
+    <dgm:txEffectClrLst/>
+  </dgm:styleLbl>
+</dgm:colorsDef>
+</file>
+
+<file path=ppt/diagrams/data1.xml><?xml version="1.0" encoding="utf-8"?>
+<dgm:dataModel xmlns:dgm="http://schemas.openxmlformats.org/drawingml/2006/diagram" xmlns:a="http://schemas.openxmlformats.org/drawingml/2006/main">
+  <dgm:ptLst>
+    <dgm:pt modelId="{6398A917-0180-D447-B8D9-09D301527380}" type="doc">
+      <dgm:prSet loTypeId="urn:microsoft.com/office/officeart/2005/8/layout/chevron2" loCatId="" qsTypeId="urn:microsoft.com/office/officeart/2005/8/quickstyle/simple4" qsCatId="simple" csTypeId="urn:microsoft.com/office/officeart/2005/8/colors/accent1_2" csCatId="accent1" phldr="1"/>
+      <dgm:spPr/>
+      <dgm:t>
+        <a:bodyPr/>
+        <a:lstStyle/>
+        <a:p>
+          <a:endParaRPr lang="en-US"/>
+        </a:p>
+      </dgm:t>
+    </dgm:pt>
+    <dgm:pt modelId="{FB0BC376-0C42-3548-ACCF-269014E7C684}">
+      <dgm:prSet phldrT="[Text]"/>
+      <dgm:spPr/>
+      <dgm:t>
+        <a:bodyPr/>
+        <a:lstStyle/>
+        <a:p>
+          <a:r>
+            <a:rPr lang="en-US" dirty="0" smtClean="0"/>
+            <a:t>Security</a:t>
+          </a:r>
+          <a:endParaRPr lang="en-US" dirty="0"/>
+        </a:p>
+      </dgm:t>
+    </dgm:pt>
+    <dgm:pt modelId="{ADBAEFDA-6E69-7345-9D69-5BD9FDDF8C96}" type="parTrans" cxnId="{85767EAB-4AFE-2541-8D67-8CFC9CCED076}">
+      <dgm:prSet/>
+      <dgm:spPr/>
+      <dgm:t>
+        <a:bodyPr/>
+        <a:lstStyle/>
+        <a:p>
+          <a:endParaRPr lang="en-US"/>
+        </a:p>
+      </dgm:t>
+    </dgm:pt>
+    <dgm:pt modelId="{2952B97B-E9F1-D845-A2C8-0BA85328EE3D}" type="sibTrans" cxnId="{85767EAB-4AFE-2541-8D67-8CFC9CCED076}">
+      <dgm:prSet/>
+      <dgm:spPr/>
+      <dgm:t>
+        <a:bodyPr/>
+        <a:lstStyle/>
+        <a:p>
+          <a:endParaRPr lang="en-US"/>
+        </a:p>
+      </dgm:t>
+    </dgm:pt>
+    <dgm:pt modelId="{F0B2BA1C-6DB4-614D-9F14-FAB31CA2AFD5}">
+      <dgm:prSet phldrT="[Text]"/>
+      <dgm:spPr/>
+      <dgm:t>
+        <a:bodyPr/>
+        <a:lstStyle/>
+        <a:p>
+          <a:pPr marL="228600" marR="0" lvl="1" indent="-228600" algn="l" defTabSz="1066800" rtl="0" eaLnBrk="1" fontAlgn="auto" latinLnBrk="0" hangingPunct="1">
+            <a:lnSpc>
+              <a:spcPct val="90000"/>
+            </a:lnSpc>
+            <a:spcBef>
+              <a:spcPct val="0"/>
+            </a:spcBef>
+            <a:spcAft>
+              <a:spcPct val="15000"/>
+            </a:spcAft>
+            <a:buClrTx/>
+            <a:buSzTx/>
+            <a:buFontTx/>
+            <a:buNone/>
+            <a:tabLst/>
+            <a:defRPr/>
+          </a:pPr>
+          <a:r>
+            <a:rPr lang="en-US" dirty="0" smtClean="0"/>
+            <a:t>Connected</a:t>
+          </a:r>
+          <a:r>
+            <a:rPr lang="en-US" baseline="0" dirty="0" smtClean="0"/>
+            <a:t> via LE Bluetooth with security</a:t>
+          </a:r>
+          <a:endParaRPr lang="en-US" dirty="0"/>
+        </a:p>
+      </dgm:t>
+    </dgm:pt>
+    <dgm:pt modelId="{46C440E7-02CA-A74C-98EE-FB7E48A06BFD}" type="parTrans" cxnId="{E6060930-EB1D-B240-80AA-4E79C1E7413F}">
+      <dgm:prSet/>
+      <dgm:spPr/>
+      <dgm:t>
+        <a:bodyPr/>
+        <a:lstStyle/>
+        <a:p>
+          <a:endParaRPr lang="en-US"/>
+        </a:p>
+      </dgm:t>
+    </dgm:pt>
+    <dgm:pt modelId="{AFC9B692-BE2D-1741-AFC4-05418E43496F}" type="sibTrans" cxnId="{E6060930-EB1D-B240-80AA-4E79C1E7413F}">
+      <dgm:prSet/>
+      <dgm:spPr/>
+      <dgm:t>
+        <a:bodyPr/>
+        <a:lstStyle/>
+        <a:p>
+          <a:endParaRPr lang="en-US"/>
+        </a:p>
+      </dgm:t>
+    </dgm:pt>
+    <dgm:pt modelId="{BC72EE67-6690-FF4E-B9A6-715DDE1ED2FD}">
+      <dgm:prSet phldrT="[Text]"/>
+      <dgm:spPr/>
+      <dgm:t>
+        <a:bodyPr/>
+        <a:lstStyle/>
+        <a:p>
+          <a:pPr marL="228600" lvl="1" indent="0" algn="l" defTabSz="1066800">
+            <a:lnSpc>
+              <a:spcPct val="90000"/>
+            </a:lnSpc>
+            <a:spcBef>
+              <a:spcPct val="0"/>
+            </a:spcBef>
+            <a:spcAft>
+              <a:spcPct val="15000"/>
+            </a:spcAft>
+            <a:buNone/>
+          </a:pPr>
+          <a:r>
+            <a:rPr lang="en-US" dirty="0" smtClean="0"/>
+            <a:t> Generates</a:t>
+          </a:r>
+          <a:r>
+            <a:rPr lang="en-US" baseline="0" dirty="0" smtClean="0"/>
+            <a:t> OTP to connect to central server</a:t>
+          </a:r>
+          <a:endParaRPr lang="en-US" dirty="0"/>
+        </a:p>
+      </dgm:t>
+    </dgm:pt>
+    <dgm:pt modelId="{B60837CA-FFDC-2446-8B7C-7A4B9A10EEEC}" type="parTrans" cxnId="{22EAB0E2-F7E8-D940-9122-D4B7520D9CC8}">
+      <dgm:prSet/>
+      <dgm:spPr/>
+      <dgm:t>
+        <a:bodyPr/>
+        <a:lstStyle/>
+        <a:p>
+          <a:endParaRPr lang="en-US"/>
+        </a:p>
+      </dgm:t>
+    </dgm:pt>
+    <dgm:pt modelId="{A327B8CA-AB27-8C42-8639-913D4B58E346}" type="sibTrans" cxnId="{22EAB0E2-F7E8-D940-9122-D4B7520D9CC8}">
+      <dgm:prSet/>
+      <dgm:spPr/>
+      <dgm:t>
+        <a:bodyPr/>
+        <a:lstStyle/>
+        <a:p>
+          <a:endParaRPr lang="en-US"/>
+        </a:p>
+      </dgm:t>
+    </dgm:pt>
+    <dgm:pt modelId="{14D62FFC-5626-664F-AC08-2223F78FA741}">
+      <dgm:prSet phldrT="[Text]"/>
+      <dgm:spPr/>
+      <dgm:t>
+        <a:bodyPr/>
+        <a:lstStyle/>
+        <a:p>
+          <a:r>
+            <a:rPr lang="en-US" dirty="0" smtClean="0"/>
+            <a:t>Product Cloud</a:t>
+          </a:r>
+          <a:endParaRPr lang="en-US" dirty="0"/>
+        </a:p>
+      </dgm:t>
+    </dgm:pt>
+    <dgm:pt modelId="{565394EA-B597-F348-9AD1-5926806B0409}" type="parTrans" cxnId="{7E79F74F-6937-0247-ACE0-7ADA258B4179}">
+      <dgm:prSet/>
+      <dgm:spPr/>
+      <dgm:t>
+        <a:bodyPr/>
+        <a:lstStyle/>
+        <a:p>
+          <a:endParaRPr lang="en-US"/>
+        </a:p>
+      </dgm:t>
+    </dgm:pt>
+    <dgm:pt modelId="{EF1289E6-D893-F548-88D9-69BBB2896F39}" type="sibTrans" cxnId="{7E79F74F-6937-0247-ACE0-7ADA258B4179}">
+      <dgm:prSet/>
+      <dgm:spPr/>
+      <dgm:t>
+        <a:bodyPr/>
+        <a:lstStyle/>
+        <a:p>
+          <a:endParaRPr lang="en-US"/>
+        </a:p>
+      </dgm:t>
+    </dgm:pt>
+    <dgm:pt modelId="{472C6EC8-C86D-3142-A00B-B7AF9BD4A4E3}">
+      <dgm:prSet phldrT="[Text]"/>
+      <dgm:spPr/>
+      <dgm:t>
+        <a:bodyPr/>
+        <a:lstStyle/>
+        <a:p>
+          <a:r>
+            <a:rPr lang="en-US" dirty="0" smtClean="0"/>
+            <a:t>App platform that supports iOS, Android.</a:t>
+          </a:r>
+          <a:endParaRPr lang="en-US" dirty="0"/>
+        </a:p>
+      </dgm:t>
+    </dgm:pt>
+    <dgm:pt modelId="{9E4BC3D5-8337-124D-850A-A7D372F79DC4}" type="parTrans" cxnId="{C881D173-A773-1D42-B4D3-2BABF408AE48}">
+      <dgm:prSet/>
+      <dgm:spPr/>
+      <dgm:t>
+        <a:bodyPr/>
+        <a:lstStyle/>
+        <a:p>
+          <a:endParaRPr lang="en-US"/>
+        </a:p>
+      </dgm:t>
+    </dgm:pt>
+    <dgm:pt modelId="{582852A4-DD9B-4B46-BD31-65C05CEE3C6B}" type="sibTrans" cxnId="{C881D173-A773-1D42-B4D3-2BABF408AE48}">
+      <dgm:prSet/>
+      <dgm:spPr/>
+      <dgm:t>
+        <a:bodyPr/>
+        <a:lstStyle/>
+        <a:p>
+          <a:endParaRPr lang="en-US"/>
+        </a:p>
+      </dgm:t>
+    </dgm:pt>
+    <dgm:pt modelId="{EAC71CA8-AF13-F04D-B88F-F11046F0D062}">
+      <dgm:prSet phldrT="[Text]" phldr="1"/>
+      <dgm:spPr/>
+      <dgm:t>
+        <a:bodyPr/>
+        <a:lstStyle/>
+        <a:p>
+          <a:endParaRPr lang="en-US" dirty="0"/>
+        </a:p>
+      </dgm:t>
+    </dgm:pt>
+    <dgm:pt modelId="{E05C4918-F999-BC41-8EC8-6F05D1AB3B90}" type="parTrans" cxnId="{2EE40358-01AF-784A-B804-48C650D6039F}">
+      <dgm:prSet/>
+      <dgm:spPr/>
+      <dgm:t>
+        <a:bodyPr/>
+        <a:lstStyle/>
+        <a:p>
+          <a:endParaRPr lang="en-US"/>
+        </a:p>
+      </dgm:t>
+    </dgm:pt>
+    <dgm:pt modelId="{939E14B5-6D0C-EF47-943C-3E2100E82AE2}" type="sibTrans" cxnId="{2EE40358-01AF-784A-B804-48C650D6039F}">
+      <dgm:prSet/>
+      <dgm:spPr/>
+      <dgm:t>
+        <a:bodyPr/>
+        <a:lstStyle/>
+        <a:p>
+          <a:endParaRPr lang="en-US"/>
+        </a:p>
+      </dgm:t>
+    </dgm:pt>
+    <dgm:pt modelId="{977C1F06-E86A-6F46-AA35-8054AAF64531}">
+      <dgm:prSet phldrT="[Text]" phldr="1"/>
+      <dgm:spPr/>
+      <dgm:t>
+        <a:bodyPr/>
+        <a:lstStyle/>
+        <a:p>
+          <a:endParaRPr lang="en-US"/>
+        </a:p>
+      </dgm:t>
+    </dgm:pt>
+    <dgm:pt modelId="{662C0A71-D070-AF4E-9F03-A6464027CBAB}" type="parTrans" cxnId="{91F7BA45-89D7-414F-8F0C-F1E1BE94A361}">
+      <dgm:prSet/>
+      <dgm:spPr/>
+      <dgm:t>
+        <a:bodyPr/>
+        <a:lstStyle/>
+        <a:p>
+          <a:endParaRPr lang="en-US"/>
+        </a:p>
+      </dgm:t>
+    </dgm:pt>
+    <dgm:pt modelId="{19E89CD2-5991-594F-AA3D-1DBB1D4A7705}" type="sibTrans" cxnId="{91F7BA45-89D7-414F-8F0C-F1E1BE94A361}">
+      <dgm:prSet/>
+      <dgm:spPr/>
+      <dgm:t>
+        <a:bodyPr/>
+        <a:lstStyle/>
+        <a:p>
+          <a:endParaRPr lang="en-US"/>
+        </a:p>
+      </dgm:t>
+    </dgm:pt>
+    <dgm:pt modelId="{759D36D9-278A-2E4E-8FC4-0096819949AD}">
+      <dgm:prSet phldrT="[Text]" phldr="1"/>
+      <dgm:spPr/>
+      <dgm:t>
+        <a:bodyPr/>
+        <a:lstStyle/>
+        <a:p>
+          <a:endParaRPr lang="en-US"/>
+        </a:p>
+      </dgm:t>
+    </dgm:pt>
+    <dgm:pt modelId="{BA7B68C5-7224-0F4E-84CA-7A7D274A8545}" type="parTrans" cxnId="{3EC3BBE5-4E72-3D45-BD92-4ECD5682B7F7}">
+      <dgm:prSet/>
+      <dgm:spPr/>
+      <dgm:t>
+        <a:bodyPr/>
+        <a:lstStyle/>
+        <a:p>
+          <a:endParaRPr lang="en-US"/>
+        </a:p>
+      </dgm:t>
+    </dgm:pt>
+    <dgm:pt modelId="{2BD8C27E-430D-854F-8BF6-95BE0D679F59}" type="sibTrans" cxnId="{3EC3BBE5-4E72-3D45-BD92-4ECD5682B7F7}">
+      <dgm:prSet/>
+      <dgm:spPr/>
+      <dgm:t>
+        <a:bodyPr/>
+        <a:lstStyle/>
+        <a:p>
+          <a:endParaRPr lang="en-US"/>
+        </a:p>
+      </dgm:t>
+    </dgm:pt>
+    <dgm:pt modelId="{5860A622-D195-CA4A-BB52-36E0F3CB499B}">
+      <dgm:prSet phldrT="[Text]" phldr="1"/>
+      <dgm:spPr/>
+      <dgm:t>
+        <a:bodyPr/>
+        <a:lstStyle/>
+        <a:p>
+          <a:endParaRPr lang="en-US"/>
+        </a:p>
+      </dgm:t>
+    </dgm:pt>
+    <dgm:pt modelId="{E96D4D2C-790F-1147-BDCC-948C215F6381}" type="parTrans" cxnId="{2F581BAD-00C2-824F-9EB4-7951A10C4622}">
+      <dgm:prSet/>
+      <dgm:spPr/>
+      <dgm:t>
+        <a:bodyPr/>
+        <a:lstStyle/>
+        <a:p>
+          <a:endParaRPr lang="en-US"/>
+        </a:p>
+      </dgm:t>
+    </dgm:pt>
+    <dgm:pt modelId="{B32C69CA-6784-0E44-A681-4D885D48FADB}" type="sibTrans" cxnId="{2F581BAD-00C2-824F-9EB4-7951A10C4622}">
+      <dgm:prSet/>
+      <dgm:spPr/>
+      <dgm:t>
+        <a:bodyPr/>
+        <a:lstStyle/>
+        <a:p>
+          <a:endParaRPr lang="en-US"/>
+        </a:p>
+      </dgm:t>
+    </dgm:pt>
+    <dgm:pt modelId="{92F0D0A9-EB87-6945-BCE6-6DB3A72FD60B}">
+      <dgm:prSet/>
+      <dgm:spPr/>
+      <dgm:t>
+        <a:bodyPr/>
+        <a:lstStyle/>
+        <a:p>
+          <a:endParaRPr lang="en-US"/>
+        </a:p>
+      </dgm:t>
+    </dgm:pt>
+    <dgm:pt modelId="{FAFC803B-3820-AC40-882D-CBCB2B698D9A}" type="parTrans" cxnId="{9A4445D5-CAFF-CB4E-82BA-C36B2CBC02CF}">
+      <dgm:prSet/>
+      <dgm:spPr/>
+      <dgm:t>
+        <a:bodyPr/>
+        <a:lstStyle/>
+        <a:p>
+          <a:endParaRPr lang="en-US"/>
+        </a:p>
+      </dgm:t>
+    </dgm:pt>
+    <dgm:pt modelId="{2F9D4AF6-5519-6C4B-8856-B251AFEEDF0D}" type="sibTrans" cxnId="{9A4445D5-CAFF-CB4E-82BA-C36B2CBC02CF}">
+      <dgm:prSet/>
+      <dgm:spPr/>
+      <dgm:t>
+        <a:bodyPr/>
+        <a:lstStyle/>
+        <a:p>
+          <a:endParaRPr lang="en-US"/>
+        </a:p>
+      </dgm:t>
+    </dgm:pt>
+    <dgm:pt modelId="{A456EA5D-8518-B54B-AB06-0538D71E6ECE}" type="pres">
+      <dgm:prSet presAssocID="{6398A917-0180-D447-B8D9-09D301527380}" presName="linearFlow" presStyleCnt="0">
+        <dgm:presLayoutVars>
+          <dgm:dir/>
+          <dgm:animLvl val="lvl"/>
+          <dgm:resizeHandles val="exact"/>
+        </dgm:presLayoutVars>
+      </dgm:prSet>
+      <dgm:spPr/>
+    </dgm:pt>
+    <dgm:pt modelId="{478CBB8E-C7B4-784A-83E3-3B3C65AA0E28}" type="pres">
+      <dgm:prSet presAssocID="{FB0BC376-0C42-3548-ACCF-269014E7C684}" presName="composite" presStyleCnt="0"/>
+      <dgm:spPr/>
+    </dgm:pt>
+    <dgm:pt modelId="{B7107ED0-007D-5649-85B9-F2DAA01D8984}" type="pres">
+      <dgm:prSet presAssocID="{FB0BC376-0C42-3548-ACCF-269014E7C684}" presName="parentText" presStyleLbl="alignNode1" presStyleIdx="0" presStyleCnt="4">
+        <dgm:presLayoutVars>
+          <dgm:chMax val="1"/>
+          <dgm:bulletEnabled val="1"/>
+        </dgm:presLayoutVars>
+      </dgm:prSet>
+      <dgm:spPr/>
+    </dgm:pt>
+    <dgm:pt modelId="{8011C9D7-3048-6140-AB27-1079EA91845B}" type="pres">
+      <dgm:prSet presAssocID="{FB0BC376-0C42-3548-ACCF-269014E7C684}" presName="descendantText" presStyleLbl="alignAcc1" presStyleIdx="0" presStyleCnt="4">
+        <dgm:presLayoutVars>
+          <dgm:bulletEnabled val="1"/>
+        </dgm:presLayoutVars>
+      </dgm:prSet>
+      <dgm:spPr/>
+    </dgm:pt>
+    <dgm:pt modelId="{20354E38-CE4B-7A43-9089-079C10775FDC}" type="pres">
+      <dgm:prSet presAssocID="{2952B97B-E9F1-D845-A2C8-0BA85328EE3D}" presName="sp" presStyleCnt="0"/>
+      <dgm:spPr/>
+    </dgm:pt>
+    <dgm:pt modelId="{911A76F5-0F34-8249-B23F-F63516559DA6}" type="pres">
+      <dgm:prSet presAssocID="{14D62FFC-5626-664F-AC08-2223F78FA741}" presName="composite" presStyleCnt="0"/>
+      <dgm:spPr/>
+    </dgm:pt>
+    <dgm:pt modelId="{254B58AE-43DA-7543-B4CB-861CF89358E7}" type="pres">
+      <dgm:prSet presAssocID="{14D62FFC-5626-664F-AC08-2223F78FA741}" presName="parentText" presStyleLbl="alignNode1" presStyleIdx="1" presStyleCnt="4">
+        <dgm:presLayoutVars>
+          <dgm:chMax val="1"/>
+          <dgm:bulletEnabled val="1"/>
+        </dgm:presLayoutVars>
+      </dgm:prSet>
+      <dgm:spPr/>
+    </dgm:pt>
+    <dgm:pt modelId="{B8ADEE56-7036-1B41-8A42-4EA2B2CD03B4}" type="pres">
+      <dgm:prSet presAssocID="{14D62FFC-5626-664F-AC08-2223F78FA741}" presName="descendantText" presStyleLbl="alignAcc1" presStyleIdx="1" presStyleCnt="4">
+        <dgm:presLayoutVars>
+          <dgm:bulletEnabled val="1"/>
+        </dgm:presLayoutVars>
+      </dgm:prSet>
+      <dgm:spPr/>
+    </dgm:pt>
+    <dgm:pt modelId="{BBCB4052-3435-FC49-8999-5DB28C56B882}" type="pres">
+      <dgm:prSet presAssocID="{EF1289E6-D893-F548-88D9-69BBB2896F39}" presName="sp" presStyleCnt="0"/>
+      <dgm:spPr/>
+    </dgm:pt>
+    <dgm:pt modelId="{34B0F7DC-629F-1541-A5CA-D807BBFF59E6}" type="pres">
+      <dgm:prSet presAssocID="{977C1F06-E86A-6F46-AA35-8054AAF64531}" presName="composite" presStyleCnt="0"/>
+      <dgm:spPr/>
+    </dgm:pt>
+    <dgm:pt modelId="{8AB332C1-6C3F-1640-B492-3BCE9176D3DC}" type="pres">
+      <dgm:prSet presAssocID="{977C1F06-E86A-6F46-AA35-8054AAF64531}" presName="parentText" presStyleLbl="alignNode1" presStyleIdx="2" presStyleCnt="4">
+        <dgm:presLayoutVars>
+          <dgm:chMax val="1"/>
+          <dgm:bulletEnabled val="1"/>
+        </dgm:presLayoutVars>
+      </dgm:prSet>
+      <dgm:spPr/>
+    </dgm:pt>
+    <dgm:pt modelId="{C1270033-955B-9440-AB6D-D1C7A299F8F3}" type="pres">
+      <dgm:prSet presAssocID="{977C1F06-E86A-6F46-AA35-8054AAF64531}" presName="descendantText" presStyleLbl="alignAcc1" presStyleIdx="2" presStyleCnt="4">
+        <dgm:presLayoutVars>
+          <dgm:bulletEnabled val="1"/>
+        </dgm:presLayoutVars>
+      </dgm:prSet>
+      <dgm:spPr/>
+    </dgm:pt>
+    <dgm:pt modelId="{55F380A0-832A-D04D-AC9E-68DFBF211F68}" type="pres">
+      <dgm:prSet presAssocID="{19E89CD2-5991-594F-AA3D-1DBB1D4A7705}" presName="sp" presStyleCnt="0"/>
+      <dgm:spPr/>
+    </dgm:pt>
+    <dgm:pt modelId="{517D8E99-E325-EC44-9243-C827435BEF24}" type="pres">
+      <dgm:prSet presAssocID="{92F0D0A9-EB87-6945-BCE6-6DB3A72FD60B}" presName="composite" presStyleCnt="0"/>
+      <dgm:spPr/>
+    </dgm:pt>
+    <dgm:pt modelId="{CBE0D47B-F51C-6945-999B-50928C2463B5}" type="pres">
+      <dgm:prSet presAssocID="{92F0D0A9-EB87-6945-BCE6-6DB3A72FD60B}" presName="parentText" presStyleLbl="alignNode1" presStyleIdx="3" presStyleCnt="4">
+        <dgm:presLayoutVars>
+          <dgm:chMax val="1"/>
+          <dgm:bulletEnabled val="1"/>
+        </dgm:presLayoutVars>
+      </dgm:prSet>
+      <dgm:spPr/>
+    </dgm:pt>
+    <dgm:pt modelId="{BBEEE3A0-CFAA-5146-AFD0-D60991A55050}" type="pres">
+      <dgm:prSet presAssocID="{92F0D0A9-EB87-6945-BCE6-6DB3A72FD60B}" presName="descendantText" presStyleLbl="alignAcc1" presStyleIdx="3" presStyleCnt="4">
+        <dgm:presLayoutVars>
+          <dgm:bulletEnabled val="1"/>
+        </dgm:presLayoutVars>
+      </dgm:prSet>
+      <dgm:spPr/>
+    </dgm:pt>
+  </dgm:ptLst>
+  <dgm:cxnLst>
+    <dgm:cxn modelId="{7E79F74F-6937-0247-ACE0-7ADA258B4179}" srcId="{6398A917-0180-D447-B8D9-09D301527380}" destId="{14D62FFC-5626-664F-AC08-2223F78FA741}" srcOrd="1" destOrd="0" parTransId="{565394EA-B597-F348-9AD1-5926806B0409}" sibTransId="{EF1289E6-D893-F548-88D9-69BBB2896F39}"/>
+    <dgm:cxn modelId="{2F581BAD-00C2-824F-9EB4-7951A10C4622}" srcId="{977C1F06-E86A-6F46-AA35-8054AAF64531}" destId="{5860A622-D195-CA4A-BB52-36E0F3CB499B}" srcOrd="1" destOrd="0" parTransId="{E96D4D2C-790F-1147-BDCC-948C215F6381}" sibTransId="{B32C69CA-6784-0E44-A681-4D885D48FADB}"/>
+    <dgm:cxn modelId="{3EC3BBE5-4E72-3D45-BD92-4ECD5682B7F7}" srcId="{977C1F06-E86A-6F46-AA35-8054AAF64531}" destId="{759D36D9-278A-2E4E-8FC4-0096819949AD}" srcOrd="0" destOrd="0" parTransId="{BA7B68C5-7224-0F4E-84CA-7A7D274A8545}" sibTransId="{2BD8C27E-430D-854F-8BF6-95BE0D679F59}"/>
+    <dgm:cxn modelId="{C8AD120B-B1B4-254B-8642-72A165527335}" type="presOf" srcId="{5860A622-D195-CA4A-BB52-36E0F3CB499B}" destId="{C1270033-955B-9440-AB6D-D1C7A299F8F3}" srcOrd="0" destOrd="1" presId="urn:microsoft.com/office/officeart/2005/8/layout/chevron2"/>
+    <dgm:cxn modelId="{85767EAB-4AFE-2541-8D67-8CFC9CCED076}" srcId="{6398A917-0180-D447-B8D9-09D301527380}" destId="{FB0BC376-0C42-3548-ACCF-269014E7C684}" srcOrd="0" destOrd="0" parTransId="{ADBAEFDA-6E69-7345-9D69-5BD9FDDF8C96}" sibTransId="{2952B97B-E9F1-D845-A2C8-0BA85328EE3D}"/>
+    <dgm:cxn modelId="{BA7A07AB-2976-F347-9A23-C4C7EC8CDFFF}" type="presOf" srcId="{14D62FFC-5626-664F-AC08-2223F78FA741}" destId="{254B58AE-43DA-7543-B4CB-861CF89358E7}" srcOrd="0" destOrd="0" presId="urn:microsoft.com/office/officeart/2005/8/layout/chevron2"/>
+    <dgm:cxn modelId="{9A4445D5-CAFF-CB4E-82BA-C36B2CBC02CF}" srcId="{6398A917-0180-D447-B8D9-09D301527380}" destId="{92F0D0A9-EB87-6945-BCE6-6DB3A72FD60B}" srcOrd="3" destOrd="0" parTransId="{FAFC803B-3820-AC40-882D-CBCB2B698D9A}" sibTransId="{2F9D4AF6-5519-6C4B-8856-B251AFEEDF0D}"/>
+    <dgm:cxn modelId="{E6060930-EB1D-B240-80AA-4E79C1E7413F}" srcId="{FB0BC376-0C42-3548-ACCF-269014E7C684}" destId="{F0B2BA1C-6DB4-614D-9F14-FAB31CA2AFD5}" srcOrd="0" destOrd="0" parTransId="{46C440E7-02CA-A74C-98EE-FB7E48A06BFD}" sibTransId="{AFC9B692-BE2D-1741-AFC4-05418E43496F}"/>
+    <dgm:cxn modelId="{22EAB0E2-F7E8-D940-9122-D4B7520D9CC8}" srcId="{FB0BC376-0C42-3548-ACCF-269014E7C684}" destId="{BC72EE67-6690-FF4E-B9A6-715DDE1ED2FD}" srcOrd="1" destOrd="0" parTransId="{B60837CA-FFDC-2446-8B7C-7A4B9A10EEEC}" sibTransId="{A327B8CA-AB27-8C42-8639-913D4B58E346}"/>
+    <dgm:cxn modelId="{2EE40358-01AF-784A-B804-48C650D6039F}" srcId="{14D62FFC-5626-664F-AC08-2223F78FA741}" destId="{EAC71CA8-AF13-F04D-B88F-F11046F0D062}" srcOrd="1" destOrd="0" parTransId="{E05C4918-F999-BC41-8EC8-6F05D1AB3B90}" sibTransId="{939E14B5-6D0C-EF47-943C-3E2100E82AE2}"/>
+    <dgm:cxn modelId="{AFE9A60B-1E3B-764F-B204-404A1CE19D3A}" type="presOf" srcId="{FB0BC376-0C42-3548-ACCF-269014E7C684}" destId="{B7107ED0-007D-5649-85B9-F2DAA01D8984}" srcOrd="0" destOrd="0" presId="urn:microsoft.com/office/officeart/2005/8/layout/chevron2"/>
+    <dgm:cxn modelId="{41D99B22-DA74-D541-9819-7A921B9EE12C}" type="presOf" srcId="{EAC71CA8-AF13-F04D-B88F-F11046F0D062}" destId="{B8ADEE56-7036-1B41-8A42-4EA2B2CD03B4}" srcOrd="0" destOrd="1" presId="urn:microsoft.com/office/officeart/2005/8/layout/chevron2"/>
+    <dgm:cxn modelId="{7C466CB8-8D4B-CA49-8FB0-D40B2E2CD65B}" type="presOf" srcId="{472C6EC8-C86D-3142-A00B-B7AF9BD4A4E3}" destId="{B8ADEE56-7036-1B41-8A42-4EA2B2CD03B4}" srcOrd="0" destOrd="0" presId="urn:microsoft.com/office/officeart/2005/8/layout/chevron2"/>
+    <dgm:cxn modelId="{C881D173-A773-1D42-B4D3-2BABF408AE48}" srcId="{14D62FFC-5626-664F-AC08-2223F78FA741}" destId="{472C6EC8-C86D-3142-A00B-B7AF9BD4A4E3}" srcOrd="0" destOrd="0" parTransId="{9E4BC3D5-8337-124D-850A-A7D372F79DC4}" sibTransId="{582852A4-DD9B-4B46-BD31-65C05CEE3C6B}"/>
+    <dgm:cxn modelId="{4C06E583-114D-AB4B-A095-41051C24ED60}" type="presOf" srcId="{F0B2BA1C-6DB4-614D-9F14-FAB31CA2AFD5}" destId="{8011C9D7-3048-6140-AB27-1079EA91845B}" srcOrd="0" destOrd="0" presId="urn:microsoft.com/office/officeart/2005/8/layout/chevron2"/>
+    <dgm:cxn modelId="{4B92C261-B8D2-E949-8C59-F5AC49339B00}" type="presOf" srcId="{BC72EE67-6690-FF4E-B9A6-715DDE1ED2FD}" destId="{8011C9D7-3048-6140-AB27-1079EA91845B}" srcOrd="0" destOrd="1" presId="urn:microsoft.com/office/officeart/2005/8/layout/chevron2"/>
+    <dgm:cxn modelId="{BD0A8894-4600-DE40-98B9-5854A08009E7}" type="presOf" srcId="{92F0D0A9-EB87-6945-BCE6-6DB3A72FD60B}" destId="{CBE0D47B-F51C-6945-999B-50928C2463B5}" srcOrd="0" destOrd="0" presId="urn:microsoft.com/office/officeart/2005/8/layout/chevron2"/>
+    <dgm:cxn modelId="{F40C25FE-1425-4942-8D99-7B7CD21BC7DB}" type="presOf" srcId="{977C1F06-E86A-6F46-AA35-8054AAF64531}" destId="{8AB332C1-6C3F-1640-B492-3BCE9176D3DC}" srcOrd="0" destOrd="0" presId="urn:microsoft.com/office/officeart/2005/8/layout/chevron2"/>
+    <dgm:cxn modelId="{91F7BA45-89D7-414F-8F0C-F1E1BE94A361}" srcId="{6398A917-0180-D447-B8D9-09D301527380}" destId="{977C1F06-E86A-6F46-AA35-8054AAF64531}" srcOrd="2" destOrd="0" parTransId="{662C0A71-D070-AF4E-9F03-A6464027CBAB}" sibTransId="{19E89CD2-5991-594F-AA3D-1DBB1D4A7705}"/>
+    <dgm:cxn modelId="{84DACDA2-97EB-564C-9684-5F938CF2F596}" type="presOf" srcId="{6398A917-0180-D447-B8D9-09D301527380}" destId="{A456EA5D-8518-B54B-AB06-0538D71E6ECE}" srcOrd="0" destOrd="0" presId="urn:microsoft.com/office/officeart/2005/8/layout/chevron2"/>
+    <dgm:cxn modelId="{DCA7FE07-EDFE-6A4B-94B0-451C99DB856B}" type="presOf" srcId="{759D36D9-278A-2E4E-8FC4-0096819949AD}" destId="{C1270033-955B-9440-AB6D-D1C7A299F8F3}" srcOrd="0" destOrd="0" presId="urn:microsoft.com/office/officeart/2005/8/layout/chevron2"/>
+    <dgm:cxn modelId="{757B10D8-BF2C-D645-A1B5-DE5B6FA7ABF0}" type="presParOf" srcId="{A456EA5D-8518-B54B-AB06-0538D71E6ECE}" destId="{478CBB8E-C7B4-784A-83E3-3B3C65AA0E28}" srcOrd="0" destOrd="0" presId="urn:microsoft.com/office/officeart/2005/8/layout/chevron2"/>
+    <dgm:cxn modelId="{4F7FAA59-A5B9-C246-B061-06DAB76F17CA}" type="presParOf" srcId="{478CBB8E-C7B4-784A-83E3-3B3C65AA0E28}" destId="{B7107ED0-007D-5649-85B9-F2DAA01D8984}" srcOrd="0" destOrd="0" presId="urn:microsoft.com/office/officeart/2005/8/layout/chevron2"/>
+    <dgm:cxn modelId="{32E6F148-2F22-1047-8194-9A2D9E801AA3}" type="presParOf" srcId="{478CBB8E-C7B4-784A-83E3-3B3C65AA0E28}" destId="{8011C9D7-3048-6140-AB27-1079EA91845B}" srcOrd="1" destOrd="0" presId="urn:microsoft.com/office/officeart/2005/8/layout/chevron2"/>
+    <dgm:cxn modelId="{0D9AFC75-BDA0-B045-A12B-C0DE351DC093}" type="presParOf" srcId="{A456EA5D-8518-B54B-AB06-0538D71E6ECE}" destId="{20354E38-CE4B-7A43-9089-079C10775FDC}" srcOrd="1" destOrd="0" presId="urn:microsoft.com/office/officeart/2005/8/layout/chevron2"/>
+    <dgm:cxn modelId="{9A0E0031-7193-A84A-989F-F0FE739EDE18}" type="presParOf" srcId="{A456EA5D-8518-B54B-AB06-0538D71E6ECE}" destId="{911A76F5-0F34-8249-B23F-F63516559DA6}" srcOrd="2" destOrd="0" presId="urn:microsoft.com/office/officeart/2005/8/layout/chevron2"/>
+    <dgm:cxn modelId="{858FFA5D-834B-244E-B264-CB25750F0C30}" type="presParOf" srcId="{911A76F5-0F34-8249-B23F-F63516559DA6}" destId="{254B58AE-43DA-7543-B4CB-861CF89358E7}" srcOrd="0" destOrd="0" presId="urn:microsoft.com/office/officeart/2005/8/layout/chevron2"/>
+    <dgm:cxn modelId="{7FC9C6D6-3F15-4645-AE75-6B35F8132001}" type="presParOf" srcId="{911A76F5-0F34-8249-B23F-F63516559DA6}" destId="{B8ADEE56-7036-1B41-8A42-4EA2B2CD03B4}" srcOrd="1" destOrd="0" presId="urn:microsoft.com/office/officeart/2005/8/layout/chevron2"/>
+    <dgm:cxn modelId="{6CEF6964-55F8-954B-BB46-2ADBAC32CB53}" type="presParOf" srcId="{A456EA5D-8518-B54B-AB06-0538D71E6ECE}" destId="{BBCB4052-3435-FC49-8999-5DB28C56B882}" srcOrd="3" destOrd="0" presId="urn:microsoft.com/office/officeart/2005/8/layout/chevron2"/>
+    <dgm:cxn modelId="{B64BB605-818C-E148-AD9B-4CD0D3B8862B}" type="presParOf" srcId="{A456EA5D-8518-B54B-AB06-0538D71E6ECE}" destId="{34B0F7DC-629F-1541-A5CA-D807BBFF59E6}" srcOrd="4" destOrd="0" presId="urn:microsoft.com/office/officeart/2005/8/layout/chevron2"/>
+    <dgm:cxn modelId="{3834C7A1-4E79-DB45-9115-012C7E0D2889}" type="presParOf" srcId="{34B0F7DC-629F-1541-A5CA-D807BBFF59E6}" destId="{8AB332C1-6C3F-1640-B492-3BCE9176D3DC}" srcOrd="0" destOrd="0" presId="urn:microsoft.com/office/officeart/2005/8/layout/chevron2"/>
+    <dgm:cxn modelId="{217A5B66-8584-2D45-93DE-6BE159B0B27D}" type="presParOf" srcId="{34B0F7DC-629F-1541-A5CA-D807BBFF59E6}" destId="{C1270033-955B-9440-AB6D-D1C7A299F8F3}" srcOrd="1" destOrd="0" presId="urn:microsoft.com/office/officeart/2005/8/layout/chevron2"/>
+    <dgm:cxn modelId="{CBC095B5-D2CA-1247-9ABC-981B70F6FDC9}" type="presParOf" srcId="{A456EA5D-8518-B54B-AB06-0538D71E6ECE}" destId="{55F380A0-832A-D04D-AC9E-68DFBF211F68}" srcOrd="5" destOrd="0" presId="urn:microsoft.com/office/officeart/2005/8/layout/chevron2"/>
+    <dgm:cxn modelId="{1931FE8B-C9AE-654A-B35F-5F6790EC953A}" type="presParOf" srcId="{A456EA5D-8518-B54B-AB06-0538D71E6ECE}" destId="{517D8E99-E325-EC44-9243-C827435BEF24}" srcOrd="6" destOrd="0" presId="urn:microsoft.com/office/officeart/2005/8/layout/chevron2"/>
+    <dgm:cxn modelId="{56AE2474-1D5D-7647-8F44-386A65009588}" type="presParOf" srcId="{517D8E99-E325-EC44-9243-C827435BEF24}" destId="{CBE0D47B-F51C-6945-999B-50928C2463B5}" srcOrd="0" destOrd="0" presId="urn:microsoft.com/office/officeart/2005/8/layout/chevron2"/>
+    <dgm:cxn modelId="{0A8E59AD-4CA2-414E-B80A-0D786713A79F}" type="presParOf" srcId="{517D8E99-E325-EC44-9243-C827435BEF24}" destId="{BBEEE3A0-CFAA-5146-AFD0-D60991A55050}" srcOrd="1" destOrd="0" presId="urn:microsoft.com/office/officeart/2005/8/layout/chevron2"/>
+  </dgm:cxnLst>
+  <dgm:bg/>
+  <dgm:whole/>
+  <dgm:extLst>
+    <a:ext uri="http://schemas.microsoft.com/office/drawing/2008/diagram">
+      <dsp:dataModelExt xmlns:dsp="http://schemas.microsoft.com/office/drawing/2008/diagram" relId="rId6" minVer="http://schemas.openxmlformats.org/drawingml/2006/diagram"/>
+    </a:ext>
+  </dgm:extLst>
+</dgm:dataModel>
+</file>
+
+<file path=ppt/diagrams/drawing1.xml><?xml version="1.0" encoding="utf-8"?>
+<dsp:drawing xmlns:dgm="http://schemas.openxmlformats.org/drawingml/2006/diagram" xmlns:dsp="http://schemas.microsoft.com/office/drawing/2008/diagram" xmlns:a="http://schemas.openxmlformats.org/drawingml/2006/main">
+  <dsp:spTree>
+    <dsp:nvGrpSpPr>
+      <dsp:cNvPr id="0" name=""/>
+      <dsp:cNvGrpSpPr/>
+    </dsp:nvGrpSpPr>
+    <dsp:grpSpPr/>
+    <dsp:sp modelId="{B7107ED0-007D-5649-85B9-F2DAA01D8984}">
+      <dsp:nvSpPr>
+        <dsp:cNvPr id="0" name=""/>
+        <dsp:cNvSpPr/>
+      </dsp:nvSpPr>
+      <dsp:spPr>
+        <a:xfrm rot="5400000">
+          <a:off x="-141430" y="142967"/>
+          <a:ext cx="942872" cy="660010"/>
+        </a:xfrm>
+        <a:prstGeom prst="chevron">
+          <a:avLst/>
+        </a:prstGeom>
+        <a:blipFill rotWithShape="0">
+          <a:blip xmlns:r="http://schemas.openxmlformats.org/officeDocument/2006/relationships" r:embed="rId1">
+            <a:duotone>
+              <a:schemeClr val="accent1">
+                <a:hueOff val="0"/>
+                <a:satOff val="0"/>
+                <a:lumOff val="0"/>
+                <a:alphaOff val="0"/>
+                <a:shade val="74000"/>
+                <a:satMod val="130000"/>
+                <a:lumMod val="90000"/>
+              </a:schemeClr>
+              <a:schemeClr val="accent1">
+                <a:hueOff val="0"/>
+                <a:satOff val="0"/>
+                <a:lumOff val="0"/>
+                <a:alphaOff val="0"/>
+                <a:tint val="94000"/>
+                <a:satMod val="120000"/>
+                <a:lumMod val="104000"/>
+              </a:schemeClr>
+            </a:duotone>
+          </a:blip>
+          <a:tile tx="0" ty="0" sx="100000" sy="100000" flip="none" algn="tl"/>
+        </a:blipFill>
+        <a:ln w="9525" cap="flat" cmpd="sng" algn="ctr">
+          <a:solidFill>
+            <a:schemeClr val="accent1">
+              <a:hueOff val="0"/>
+              <a:satOff val="0"/>
+              <a:lumOff val="0"/>
+              <a:alphaOff val="0"/>
+            </a:schemeClr>
+          </a:solidFill>
+          <a:prstDash val="solid"/>
+        </a:ln>
+        <a:effectLst>
+          <a:innerShdw blurRad="25400" dist="12700" dir="13500000">
+            <a:srgbClr val="000000">
+              <a:alpha val="45000"/>
+            </a:srgbClr>
+          </a:innerShdw>
+        </a:effectLst>
+      </dsp:spPr>
+      <dsp:style>
+        <a:lnRef idx="1">
+          <a:scrgbClr r="0" g="0" b="0"/>
+        </a:lnRef>
+        <a:fillRef idx="3">
+          <a:scrgbClr r="0" g="0" b="0"/>
+        </a:fillRef>
+        <a:effectRef idx="2">
+          <a:scrgbClr r="0" g="0" b="0"/>
+        </a:effectRef>
+        <a:fontRef idx="minor">
+          <a:schemeClr val="lt1"/>
+        </a:fontRef>
+      </dsp:style>
+      <dsp:txBody>
+        <a:bodyPr spcFirstLastPara="0" vert="horz" wrap="square" lIns="6350" tIns="6350" rIns="6350" bIns="6350" numCol="1" spcCol="1270" anchor="ctr" anchorCtr="0">
+          <a:noAutofit/>
+        </a:bodyPr>
+        <a:lstStyle/>
+        <a:p>
+          <a:pPr lvl="0" algn="ctr" defTabSz="444500">
+            <a:lnSpc>
+              <a:spcPct val="90000"/>
+            </a:lnSpc>
+            <a:spcBef>
+              <a:spcPct val="0"/>
+            </a:spcBef>
+            <a:spcAft>
+              <a:spcPct val="35000"/>
+            </a:spcAft>
+          </a:pPr>
+          <a:r>
+            <a:rPr lang="en-US" sz="1000" kern="1200" dirty="0" smtClean="0"/>
+            <a:t>Security</a:t>
+          </a:r>
+          <a:endParaRPr lang="en-US" sz="1000" kern="1200" dirty="0"/>
+        </a:p>
+      </dsp:txBody>
+      <dsp:txXfrm rot="-5400000">
+        <a:off x="1" y="331541"/>
+        <a:ext cx="660010" cy="282862"/>
+      </dsp:txXfrm>
+    </dsp:sp>
+    <dsp:sp modelId="{8011C9D7-3048-6140-AB27-1079EA91845B}">
+      <dsp:nvSpPr>
+        <dsp:cNvPr id="0" name=""/>
+        <dsp:cNvSpPr/>
+      </dsp:nvSpPr>
+      <dsp:spPr>
+        <a:xfrm rot="5400000">
+          <a:off x="4824171" y="-4162624"/>
+          <a:ext cx="612867" cy="8941189"/>
+        </a:xfrm>
+        <a:prstGeom prst="round2SameRect">
+          <a:avLst/>
+        </a:prstGeom>
+        <a:solidFill>
+          <a:schemeClr val="lt1">
+            <a:alpha val="90000"/>
+            <a:hueOff val="0"/>
+            <a:satOff val="0"/>
+            <a:lumOff val="0"/>
+            <a:alphaOff val="0"/>
+          </a:schemeClr>
+        </a:solidFill>
+        <a:ln w="9525" cap="flat" cmpd="sng" algn="ctr">
+          <a:solidFill>
+            <a:schemeClr val="accent1">
+              <a:hueOff val="0"/>
+              <a:satOff val="0"/>
+              <a:lumOff val="0"/>
+              <a:alphaOff val="0"/>
+            </a:schemeClr>
+          </a:solidFill>
+          <a:prstDash val="solid"/>
+        </a:ln>
+        <a:effectLst/>
+      </dsp:spPr>
+      <dsp:style>
+        <a:lnRef idx="1">
+          <a:scrgbClr r="0" g="0" b="0"/>
+        </a:lnRef>
+        <a:fillRef idx="1">
+          <a:scrgbClr r="0" g="0" b="0"/>
+        </a:fillRef>
+        <a:effectRef idx="0">
+          <a:scrgbClr r="0" g="0" b="0"/>
+        </a:effectRef>
+        <a:fontRef idx="minor"/>
+      </dsp:style>
+      <dsp:txBody>
+        <a:bodyPr spcFirstLastPara="0" vert="horz" wrap="square" lIns="128016" tIns="11430" rIns="11430" bIns="11430" numCol="1" spcCol="1270" anchor="ctr" anchorCtr="0">
+          <a:noAutofit/>
+        </a:bodyPr>
+        <a:lstStyle/>
+        <a:p>
+          <a:pPr marL="228600" marR="0" lvl="1" indent="-228600" algn="l" defTabSz="1066800" rtl="0" eaLnBrk="1" fontAlgn="auto" latinLnBrk="0" hangingPunct="1">
+            <a:lnSpc>
+              <a:spcPct val="90000"/>
+            </a:lnSpc>
+            <a:spcBef>
+              <a:spcPct val="0"/>
+            </a:spcBef>
+            <a:spcAft>
+              <a:spcPct val="15000"/>
+            </a:spcAft>
+            <a:buClrTx/>
+            <a:buSzTx/>
+            <a:buFontTx/>
+            <a:buChar char="••"/>
+            <a:tabLst/>
+            <a:defRPr/>
+          </a:pPr>
+          <a:r>
+            <a:rPr lang="en-US" sz="1800" kern="1200" dirty="0" smtClean="0"/>
+            <a:t>Connected</a:t>
+          </a:r>
+          <a:r>
+            <a:rPr lang="en-US" sz="1800" kern="1200" baseline="0" dirty="0" smtClean="0"/>
+            <a:t> via LE Bluetooth with security</a:t>
+          </a:r>
+          <a:endParaRPr lang="en-US" sz="1800" kern="1200" dirty="0"/>
+        </a:p>
+        <a:p>
+          <a:pPr marL="228600" lvl="1" indent="0" algn="l" defTabSz="1066800">
+            <a:lnSpc>
+              <a:spcPct val="90000"/>
+            </a:lnSpc>
+            <a:spcBef>
+              <a:spcPct val="0"/>
+            </a:spcBef>
+            <a:spcAft>
+              <a:spcPct val="15000"/>
+            </a:spcAft>
+            <a:buChar char="••"/>
+          </a:pPr>
+          <a:r>
+            <a:rPr lang="en-US" sz="1800" kern="1200" dirty="0" smtClean="0"/>
+            <a:t> Generates</a:t>
+          </a:r>
+          <a:r>
+            <a:rPr lang="en-US" sz="1800" kern="1200" baseline="0" dirty="0" smtClean="0"/>
+            <a:t> OTP to connect to central server</a:t>
+          </a:r>
+          <a:endParaRPr lang="en-US" sz="1800" kern="1200" dirty="0"/>
+        </a:p>
+      </dsp:txBody>
+      <dsp:txXfrm rot="-5400000">
+        <a:off x="660010" y="31455"/>
+        <a:ext cx="8911271" cy="553031"/>
+      </dsp:txXfrm>
+    </dsp:sp>
+    <dsp:sp modelId="{254B58AE-43DA-7543-B4CB-861CF89358E7}">
+      <dsp:nvSpPr>
+        <dsp:cNvPr id="0" name=""/>
+        <dsp:cNvSpPr/>
+      </dsp:nvSpPr>
+      <dsp:spPr>
+        <a:xfrm rot="5400000">
+          <a:off x="-141430" y="933610"/>
+          <a:ext cx="942872" cy="660010"/>
+        </a:xfrm>
+        <a:prstGeom prst="chevron">
+          <a:avLst/>
+        </a:prstGeom>
+        <a:blipFill rotWithShape="0">
+          <a:blip xmlns:r="http://schemas.openxmlformats.org/officeDocument/2006/relationships" r:embed="rId1">
+            <a:duotone>
+              <a:schemeClr val="accent1">
+                <a:hueOff val="0"/>
+                <a:satOff val="0"/>
+                <a:lumOff val="0"/>
+                <a:alphaOff val="0"/>
+                <a:shade val="74000"/>
+                <a:satMod val="130000"/>
+                <a:lumMod val="90000"/>
+              </a:schemeClr>
+              <a:schemeClr val="accent1">
+                <a:hueOff val="0"/>
+                <a:satOff val="0"/>
+                <a:lumOff val="0"/>
+                <a:alphaOff val="0"/>
+                <a:tint val="94000"/>
+                <a:satMod val="120000"/>
+                <a:lumMod val="104000"/>
+              </a:schemeClr>
+            </a:duotone>
+          </a:blip>
+          <a:tile tx="0" ty="0" sx="100000" sy="100000" flip="none" algn="tl"/>
+        </a:blipFill>
+        <a:ln w="9525" cap="flat" cmpd="sng" algn="ctr">
+          <a:solidFill>
+            <a:schemeClr val="accent1">
+              <a:hueOff val="0"/>
+              <a:satOff val="0"/>
+              <a:lumOff val="0"/>
+              <a:alphaOff val="0"/>
+            </a:schemeClr>
+          </a:solidFill>
+          <a:prstDash val="solid"/>
+        </a:ln>
+        <a:effectLst>
+          <a:innerShdw blurRad="25400" dist="12700" dir="13500000">
+            <a:srgbClr val="000000">
+              <a:alpha val="45000"/>
+            </a:srgbClr>
+          </a:innerShdw>
+        </a:effectLst>
+      </dsp:spPr>
+      <dsp:style>
+        <a:lnRef idx="1">
+          <a:scrgbClr r="0" g="0" b="0"/>
+        </a:lnRef>
+        <a:fillRef idx="3">
+          <a:scrgbClr r="0" g="0" b="0"/>
+        </a:fillRef>
+        <a:effectRef idx="2">
+          <a:scrgbClr r="0" g="0" b="0"/>
+        </a:effectRef>
+        <a:fontRef idx="minor">
+          <a:schemeClr val="lt1"/>
+        </a:fontRef>
+      </dsp:style>
+      <dsp:txBody>
+        <a:bodyPr spcFirstLastPara="0" vert="horz" wrap="square" lIns="6350" tIns="6350" rIns="6350" bIns="6350" numCol="1" spcCol="1270" anchor="ctr" anchorCtr="0">
+          <a:noAutofit/>
+        </a:bodyPr>
+        <a:lstStyle/>
+        <a:p>
+          <a:pPr lvl="0" algn="ctr" defTabSz="444500">
+            <a:lnSpc>
+              <a:spcPct val="90000"/>
+            </a:lnSpc>
+            <a:spcBef>
+              <a:spcPct val="0"/>
+            </a:spcBef>
+            <a:spcAft>
+              <a:spcPct val="35000"/>
+            </a:spcAft>
+          </a:pPr>
+          <a:r>
+            <a:rPr lang="en-US" sz="1000" kern="1200" dirty="0" smtClean="0"/>
+            <a:t>Product Cloud</a:t>
+          </a:r>
+          <a:endParaRPr lang="en-US" sz="1000" kern="1200" dirty="0"/>
+        </a:p>
+      </dsp:txBody>
+      <dsp:txXfrm rot="-5400000">
+        <a:off x="1" y="1122184"/>
+        <a:ext cx="660010" cy="282862"/>
+      </dsp:txXfrm>
+    </dsp:sp>
+    <dsp:sp modelId="{B8ADEE56-7036-1B41-8A42-4EA2B2CD03B4}">
+      <dsp:nvSpPr>
+        <dsp:cNvPr id="0" name=""/>
+        <dsp:cNvSpPr/>
+      </dsp:nvSpPr>
+      <dsp:spPr>
+        <a:xfrm rot="5400000">
+          <a:off x="4824171" y="-3371981"/>
+          <a:ext cx="612867" cy="8941189"/>
+        </a:xfrm>
+        <a:prstGeom prst="round2SameRect">
+          <a:avLst/>
+        </a:prstGeom>
+        <a:solidFill>
+          <a:schemeClr val="lt1">
+            <a:alpha val="90000"/>
+            <a:hueOff val="0"/>
+            <a:satOff val="0"/>
+            <a:lumOff val="0"/>
+            <a:alphaOff val="0"/>
+          </a:schemeClr>
+        </a:solidFill>
+        <a:ln w="9525" cap="flat" cmpd="sng" algn="ctr">
+          <a:solidFill>
+            <a:schemeClr val="accent1">
+              <a:hueOff val="0"/>
+              <a:satOff val="0"/>
+              <a:lumOff val="0"/>
+              <a:alphaOff val="0"/>
+            </a:schemeClr>
+          </a:solidFill>
+          <a:prstDash val="solid"/>
+        </a:ln>
+        <a:effectLst/>
+      </dsp:spPr>
+      <dsp:style>
+        <a:lnRef idx="1">
+          <a:scrgbClr r="0" g="0" b="0"/>
+        </a:lnRef>
+        <a:fillRef idx="1">
+          <a:scrgbClr r="0" g="0" b="0"/>
+        </a:fillRef>
+        <a:effectRef idx="0">
+          <a:scrgbClr r="0" g="0" b="0"/>
+        </a:effectRef>
+        <a:fontRef idx="minor"/>
+      </dsp:style>
+      <dsp:txBody>
+        <a:bodyPr spcFirstLastPara="0" vert="horz" wrap="square" lIns="128016" tIns="11430" rIns="11430" bIns="11430" numCol="1" spcCol="1270" anchor="ctr" anchorCtr="0">
+          <a:noAutofit/>
+        </a:bodyPr>
+        <a:lstStyle/>
+        <a:p>
+          <a:pPr marL="171450" lvl="1" indent="-171450" algn="l" defTabSz="800100">
+            <a:lnSpc>
+              <a:spcPct val="90000"/>
+            </a:lnSpc>
+            <a:spcBef>
+              <a:spcPct val="0"/>
+            </a:spcBef>
+            <a:spcAft>
+              <a:spcPct val="15000"/>
+            </a:spcAft>
+            <a:buChar char="••"/>
+          </a:pPr>
+          <a:r>
+            <a:rPr lang="en-US" sz="1800" kern="1200" dirty="0" smtClean="0"/>
+            <a:t>App platform that supports iOS, Android.</a:t>
+          </a:r>
+          <a:endParaRPr lang="en-US" sz="1800" kern="1200" dirty="0"/>
+        </a:p>
+        <a:p>
+          <a:pPr marL="171450" lvl="1" indent="-171450" algn="l" defTabSz="800100">
+            <a:lnSpc>
+              <a:spcPct val="90000"/>
+            </a:lnSpc>
+            <a:spcBef>
+              <a:spcPct val="0"/>
+            </a:spcBef>
+            <a:spcAft>
+              <a:spcPct val="15000"/>
+            </a:spcAft>
+            <a:buChar char="••"/>
+          </a:pPr>
+          <a:endParaRPr lang="en-US" sz="1800" kern="1200"/>
+        </a:p>
+      </dsp:txBody>
+      <dsp:txXfrm rot="-5400000">
+        <a:off x="660010" y="822098"/>
+        <a:ext cx="8911271" cy="553031"/>
+      </dsp:txXfrm>
+    </dsp:sp>
+    <dsp:sp modelId="{8AB332C1-6C3F-1640-B492-3BCE9176D3DC}">
+      <dsp:nvSpPr>
+        <dsp:cNvPr id="0" name=""/>
+        <dsp:cNvSpPr/>
+      </dsp:nvSpPr>
+      <dsp:spPr>
+        <a:xfrm rot="5400000">
+          <a:off x="-141430" y="1724253"/>
+          <a:ext cx="942872" cy="660010"/>
+        </a:xfrm>
+        <a:prstGeom prst="chevron">
+          <a:avLst/>
+        </a:prstGeom>
+        <a:blipFill rotWithShape="0">
+          <a:blip xmlns:r="http://schemas.openxmlformats.org/officeDocument/2006/relationships" r:embed="rId1">
+            <a:duotone>
+              <a:schemeClr val="accent1">
+                <a:hueOff val="0"/>
+                <a:satOff val="0"/>
+                <a:lumOff val="0"/>
+                <a:alphaOff val="0"/>
+                <a:shade val="74000"/>
+                <a:satMod val="130000"/>
+                <a:lumMod val="90000"/>
+              </a:schemeClr>
+              <a:schemeClr val="accent1">
+                <a:hueOff val="0"/>
+                <a:satOff val="0"/>
+                <a:lumOff val="0"/>
+                <a:alphaOff val="0"/>
+                <a:tint val="94000"/>
+                <a:satMod val="120000"/>
+                <a:lumMod val="104000"/>
+              </a:schemeClr>
+            </a:duotone>
+          </a:blip>
+          <a:tile tx="0" ty="0" sx="100000" sy="100000" flip="none" algn="tl"/>
+        </a:blipFill>
+        <a:ln w="9525" cap="flat" cmpd="sng" algn="ctr">
+          <a:solidFill>
+            <a:schemeClr val="accent1">
+              <a:hueOff val="0"/>
+              <a:satOff val="0"/>
+              <a:lumOff val="0"/>
+              <a:alphaOff val="0"/>
+            </a:schemeClr>
+          </a:solidFill>
+          <a:prstDash val="solid"/>
+        </a:ln>
+        <a:effectLst>
+          <a:innerShdw blurRad="25400" dist="12700" dir="13500000">
+            <a:srgbClr val="000000">
+              <a:alpha val="45000"/>
+            </a:srgbClr>
+          </a:innerShdw>
+        </a:effectLst>
+      </dsp:spPr>
+      <dsp:style>
+        <a:lnRef idx="1">
+          <a:scrgbClr r="0" g="0" b="0"/>
+        </a:lnRef>
+        <a:fillRef idx="3">
+          <a:scrgbClr r="0" g="0" b="0"/>
+        </a:fillRef>
+        <a:effectRef idx="2">
+          <a:scrgbClr r="0" g="0" b="0"/>
+        </a:effectRef>
+        <a:fontRef idx="minor">
+          <a:schemeClr val="lt1"/>
+        </a:fontRef>
+      </dsp:style>
+      <dsp:txBody>
+        <a:bodyPr spcFirstLastPara="0" vert="horz" wrap="square" lIns="6350" tIns="6350" rIns="6350" bIns="6350" numCol="1" spcCol="1270" anchor="ctr" anchorCtr="0">
+          <a:noAutofit/>
+        </a:bodyPr>
+        <a:lstStyle/>
+        <a:p>
+          <a:pPr lvl="0" algn="ctr" defTabSz="444500">
+            <a:lnSpc>
+              <a:spcPct val="90000"/>
+            </a:lnSpc>
+            <a:spcBef>
+              <a:spcPct val="0"/>
+            </a:spcBef>
+            <a:spcAft>
+              <a:spcPct val="35000"/>
+            </a:spcAft>
+          </a:pPr>
+          <a:endParaRPr lang="en-US" sz="1000" kern="1200"/>
+        </a:p>
+      </dsp:txBody>
+      <dsp:txXfrm rot="-5400000">
+        <a:off x="1" y="1912827"/>
+        <a:ext cx="660010" cy="282862"/>
+      </dsp:txXfrm>
+    </dsp:sp>
+    <dsp:sp modelId="{C1270033-955B-9440-AB6D-D1C7A299F8F3}">
+      <dsp:nvSpPr>
+        <dsp:cNvPr id="0" name=""/>
+        <dsp:cNvSpPr/>
+      </dsp:nvSpPr>
+      <dsp:spPr>
+        <a:xfrm rot="5400000">
+          <a:off x="4824171" y="-2581338"/>
+          <a:ext cx="612867" cy="8941189"/>
+        </a:xfrm>
+        <a:prstGeom prst="round2SameRect">
+          <a:avLst/>
+        </a:prstGeom>
+        <a:solidFill>
+          <a:schemeClr val="lt1">
+            <a:alpha val="90000"/>
+            <a:hueOff val="0"/>
+            <a:satOff val="0"/>
+            <a:lumOff val="0"/>
+            <a:alphaOff val="0"/>
+          </a:schemeClr>
+        </a:solidFill>
+        <a:ln w="9525" cap="flat" cmpd="sng" algn="ctr">
+          <a:solidFill>
+            <a:schemeClr val="accent1">
+              <a:hueOff val="0"/>
+              <a:satOff val="0"/>
+              <a:lumOff val="0"/>
+              <a:alphaOff val="0"/>
+            </a:schemeClr>
+          </a:solidFill>
+          <a:prstDash val="solid"/>
+        </a:ln>
+        <a:effectLst/>
+      </dsp:spPr>
+      <dsp:style>
+        <a:lnRef idx="1">
+          <a:scrgbClr r="0" g="0" b="0"/>
+        </a:lnRef>
+        <a:fillRef idx="1">
+          <a:scrgbClr r="0" g="0" b="0"/>
+        </a:fillRef>
+        <a:effectRef idx="0">
+          <a:scrgbClr r="0" g="0" b="0"/>
+        </a:effectRef>
+        <a:fontRef idx="minor"/>
+      </dsp:style>
+      <dsp:txBody>
+        <a:bodyPr spcFirstLastPara="0" vert="horz" wrap="square" lIns="128016" tIns="11430" rIns="11430" bIns="11430" numCol="1" spcCol="1270" anchor="ctr" anchorCtr="0">
+          <a:noAutofit/>
+        </a:bodyPr>
+        <a:lstStyle/>
+        <a:p>
+          <a:pPr marL="171450" lvl="1" indent="-171450" algn="l" defTabSz="800100">
+            <a:lnSpc>
+              <a:spcPct val="90000"/>
+            </a:lnSpc>
+            <a:spcBef>
+              <a:spcPct val="0"/>
+            </a:spcBef>
+            <a:spcAft>
+              <a:spcPct val="15000"/>
+            </a:spcAft>
+            <a:buChar char="••"/>
+          </a:pPr>
+          <a:endParaRPr lang="en-US" sz="1800" kern="1200"/>
+        </a:p>
+        <a:p>
+          <a:pPr marL="171450" lvl="1" indent="-171450" algn="l" defTabSz="800100">
+            <a:lnSpc>
+              <a:spcPct val="90000"/>
+            </a:lnSpc>
+            <a:spcBef>
+              <a:spcPct val="0"/>
+            </a:spcBef>
+            <a:spcAft>
+              <a:spcPct val="15000"/>
+            </a:spcAft>
+            <a:buChar char="••"/>
+          </a:pPr>
+          <a:endParaRPr lang="en-US" sz="1800" kern="1200"/>
+        </a:p>
+      </dsp:txBody>
+      <dsp:txXfrm rot="-5400000">
+        <a:off x="660010" y="1612741"/>
+        <a:ext cx="8911271" cy="553031"/>
+      </dsp:txXfrm>
+    </dsp:sp>
+    <dsp:sp modelId="{CBE0D47B-F51C-6945-999B-50928C2463B5}">
+      <dsp:nvSpPr>
+        <dsp:cNvPr id="0" name=""/>
+        <dsp:cNvSpPr/>
+      </dsp:nvSpPr>
+      <dsp:spPr>
+        <a:xfrm rot="5400000">
+          <a:off x="-141430" y="2514897"/>
+          <a:ext cx="942872" cy="660010"/>
+        </a:xfrm>
+        <a:prstGeom prst="chevron">
+          <a:avLst/>
+        </a:prstGeom>
+        <a:blipFill rotWithShape="0">
+          <a:blip xmlns:r="http://schemas.openxmlformats.org/officeDocument/2006/relationships" r:embed="rId1">
+            <a:duotone>
+              <a:schemeClr val="accent1">
+                <a:hueOff val="0"/>
+                <a:satOff val="0"/>
+                <a:lumOff val="0"/>
+                <a:alphaOff val="0"/>
+                <a:shade val="74000"/>
+                <a:satMod val="130000"/>
+                <a:lumMod val="90000"/>
+              </a:schemeClr>
+              <a:schemeClr val="accent1">
+                <a:hueOff val="0"/>
+                <a:satOff val="0"/>
+                <a:lumOff val="0"/>
+                <a:alphaOff val="0"/>
+                <a:tint val="94000"/>
+                <a:satMod val="120000"/>
+                <a:lumMod val="104000"/>
+              </a:schemeClr>
+            </a:duotone>
+          </a:blip>
+          <a:tile tx="0" ty="0" sx="100000" sy="100000" flip="none" algn="tl"/>
+        </a:blipFill>
+        <a:ln w="9525" cap="flat" cmpd="sng" algn="ctr">
+          <a:solidFill>
+            <a:schemeClr val="accent1">
+              <a:hueOff val="0"/>
+              <a:satOff val="0"/>
+              <a:lumOff val="0"/>
+              <a:alphaOff val="0"/>
+            </a:schemeClr>
+          </a:solidFill>
+          <a:prstDash val="solid"/>
+        </a:ln>
+        <a:effectLst>
+          <a:innerShdw blurRad="25400" dist="12700" dir="13500000">
+            <a:srgbClr val="000000">
+              <a:alpha val="45000"/>
+            </a:srgbClr>
+          </a:innerShdw>
+        </a:effectLst>
+      </dsp:spPr>
+      <dsp:style>
+        <a:lnRef idx="1">
+          <a:scrgbClr r="0" g="0" b="0"/>
+        </a:lnRef>
+        <a:fillRef idx="3">
+          <a:scrgbClr r="0" g="0" b="0"/>
+        </a:fillRef>
+        <a:effectRef idx="2">
+          <a:scrgbClr r="0" g="0" b="0"/>
+        </a:effectRef>
+        <a:fontRef idx="minor">
+          <a:schemeClr val="lt1"/>
+        </a:fontRef>
+      </dsp:style>
+      <dsp:txBody>
+        <a:bodyPr spcFirstLastPara="0" vert="horz" wrap="square" lIns="6350" tIns="6350" rIns="6350" bIns="6350" numCol="1" spcCol="1270" anchor="ctr" anchorCtr="0">
+          <a:noAutofit/>
+        </a:bodyPr>
+        <a:lstStyle/>
+        <a:p>
+          <a:pPr lvl="0" algn="ctr" defTabSz="444500">
+            <a:lnSpc>
+              <a:spcPct val="90000"/>
+            </a:lnSpc>
+            <a:spcBef>
+              <a:spcPct val="0"/>
+            </a:spcBef>
+            <a:spcAft>
+              <a:spcPct val="35000"/>
+            </a:spcAft>
+          </a:pPr>
+          <a:endParaRPr lang="en-US" sz="1000" kern="1200"/>
+        </a:p>
+      </dsp:txBody>
+      <dsp:txXfrm rot="-5400000">
+        <a:off x="1" y="2703471"/>
+        <a:ext cx="660010" cy="282862"/>
+      </dsp:txXfrm>
+    </dsp:sp>
+    <dsp:sp modelId="{BBEEE3A0-CFAA-5146-AFD0-D60991A55050}">
+      <dsp:nvSpPr>
+        <dsp:cNvPr id="0" name=""/>
+        <dsp:cNvSpPr/>
+      </dsp:nvSpPr>
+      <dsp:spPr>
+        <a:xfrm rot="5400000">
+          <a:off x="4824171" y="-1790694"/>
+          <a:ext cx="612867" cy="8941189"/>
+        </a:xfrm>
+        <a:prstGeom prst="round2SameRect">
+          <a:avLst/>
+        </a:prstGeom>
+        <a:solidFill>
+          <a:schemeClr val="lt1">
+            <a:alpha val="90000"/>
+            <a:hueOff val="0"/>
+            <a:satOff val="0"/>
+            <a:lumOff val="0"/>
+            <a:alphaOff val="0"/>
+          </a:schemeClr>
+        </a:solidFill>
+        <a:ln w="9525" cap="flat" cmpd="sng" algn="ctr">
+          <a:solidFill>
+            <a:schemeClr val="accent1">
+              <a:hueOff val="0"/>
+              <a:satOff val="0"/>
+              <a:lumOff val="0"/>
+              <a:alphaOff val="0"/>
+            </a:schemeClr>
+          </a:solidFill>
+          <a:prstDash val="solid"/>
+        </a:ln>
+        <a:effectLst/>
+      </dsp:spPr>
+      <dsp:style>
+        <a:lnRef idx="1">
+          <a:scrgbClr r="0" g="0" b="0"/>
+        </a:lnRef>
+        <a:fillRef idx="1">
+          <a:scrgbClr r="0" g="0" b="0"/>
+        </a:fillRef>
+        <a:effectRef idx="0">
+          <a:scrgbClr r="0" g="0" b="0"/>
+        </a:effectRef>
+        <a:fontRef idx="minor"/>
+      </dsp:style>
+    </dsp:sp>
+  </dsp:spTree>
+</dsp:drawing>
+</file>
+
+<file path=ppt/diagrams/layout1.xml><?xml version="1.0" encoding="utf-8"?>
+<dgm:layoutDef xmlns:dgm="http://schemas.openxmlformats.org/drawingml/2006/diagram" xmlns:a="http://schemas.openxmlformats.org/drawingml/2006/main" uniqueId="urn:microsoft.com/office/officeart/2005/8/layout/chevron2">
+  <dgm:title val=""/>
+  <dgm:desc val=""/>
+  <dgm:catLst>
+    <dgm:cat type="process" pri="12000"/>
+    <dgm:cat type="list" pri="16000"/>
+    <dgm:cat type="convert" pri="11000"/>
+  </dgm:catLst>
+  <dgm:sampData>
+    <dgm:dataModel>
+      <dgm:ptLst>
+        <dgm:pt modelId="0" type="doc"/>
+        <dgm:pt modelId="1">
+          <dgm:prSet phldr="1"/>
+        </dgm:pt>
+        <dgm:pt modelId="11">
+          <dgm:prSet phldr="1"/>
+        </dgm:pt>
+        <dgm:pt modelId="12">
+          <dgm:prSet phldr="1"/>
+        </dgm:pt>
+        <dgm:pt modelId="2">
+          <dgm:prSet phldr="1"/>
+        </dgm:pt>
+        <dgm:pt modelId="21">
+          <dgm:prSet phldr="1"/>
+        </dgm:pt>
+        <dgm:pt modelId="22">
+          <dgm:prSet phldr="1"/>
+        </dgm:pt>
+        <dgm:pt modelId="3">
+          <dgm:prSet phldr="1"/>
+        </dgm:pt>
+        <dgm:pt modelId="31">
+          <dgm:prSet phldr="1"/>
+        </dgm:pt>
+        <dgm:pt modelId="32">
+          <dgm:prSet phldr="1"/>
+        </dgm:pt>
+      </dgm:ptLst>
+      <dgm:cxnLst>
+        <dgm:cxn modelId="4" srcId="0" destId="1" srcOrd="0" destOrd="0"/>
+        <dgm:cxn modelId="5" srcId="0" destId="2" srcOrd="1" destOrd="0"/>
+        <dgm:cxn modelId="6" srcId="0" destId="3" srcOrd="2" destOrd="0"/>
+        <dgm:cxn modelId="13" srcId="1" destId="11" srcOrd="0" destOrd="0"/>
+        <dgm:cxn modelId="14" srcId="1" destId="12" srcOrd="1" destOrd="0"/>
+        <dgm:cxn modelId="23" srcId="2" destId="21" srcOrd="0" destOrd="0"/>
+        <dgm:cxn modelId="24" srcId="2" destId="22" srcOrd="1" destOrd="0"/>
+        <dgm:cxn modelId="33" srcId="3" destId="31" srcOrd="0" destOrd="0"/>
+        <dgm:cxn modelId="34" srcId="3" destId="32" srcOrd="1" destOrd="0"/>
+      </dgm:cxnLst>
+      <dgm:bg/>
+      <dgm:whole/>
+    </dgm:dataModel>
+  </dgm:sampData>
+  <dgm:styleData>
+    <dgm:dataModel>
+      <dgm:ptLst>
+        <dgm:pt modelId="0" type="doc"/>
+        <dgm:pt modelId="1"/>
+      </dgm:ptLst>
+      <dgm:cxnLst>
+        <dgm:cxn modelId="4" srcId="0" destId="1" srcOrd="0" destOrd="0"/>
+      </dgm:cxnLst>
+      <dgm:bg/>
+      <dgm:whole/>
+    </dgm:dataModel>
+  </dgm:styleData>
+  <dgm:clrData>
+    <dgm:dataModel>
+      <dgm:ptLst>
+        <dgm:pt modelId="0" type="doc"/>
+        <dgm:pt modelId="1"/>
+        <dgm:pt modelId="11"/>
+        <dgm:pt modelId="2"/>
+        <dgm:pt modelId="21"/>
+        <dgm:pt modelId="3"/>
+        <dgm:pt modelId="31"/>
+        <dgm:pt modelId="4"/>
+        <dgm:pt modelId="41"/>
+      </dgm:ptLst>
+      <dgm:cxnLst>
+        <dgm:cxn modelId="5" srcId="0" destId="1" srcOrd="0" destOrd="0"/>
+        <dgm:cxn modelId="6" srcId="0" destId="2" srcOrd="1" destOrd="0"/>
+        <dgm:cxn modelId="7" srcId="0" destId="3" srcOrd="2" destOrd="0"/>
+        <dgm:cxn modelId="8" srcId="0" destId="4" srcOrd="3" destOrd="0"/>
+        <dgm:cxn modelId="13" srcId="1" destId="11" srcOrd="0" destOrd="0"/>
+        <dgm:cxn modelId="23" srcId="2" destId="21" srcOrd="0" destOrd="0"/>
+        <dgm:cxn modelId="33" srcId="3" destId="31" srcOrd="0" destOrd="0"/>
+        <dgm:cxn modelId="43" srcId="4" destId="41" srcOrd="0" destOrd="0"/>
+      </dgm:cxnLst>
+      <dgm:bg/>
+      <dgm:whole/>
+    </dgm:dataModel>
+  </dgm:clrData>
+  <dgm:layoutNode name="linearFlow">
+    <dgm:varLst>
+      <dgm:dir/>
+      <dgm:animLvl val="lvl"/>
+      <dgm:resizeHandles val="exact"/>
+    </dgm:varLst>
+    <dgm:alg type="lin">
+      <dgm:param type="linDir" val="fromT"/>
+      <dgm:param type="nodeHorzAlign" val="l"/>
+    </dgm:alg>
+    <dgm:shape xmlns:r="http://schemas.openxmlformats.org/officeDocument/2006/relationships" r:blip="">
+      <dgm:adjLst/>
+    </dgm:shape>
+    <dgm:presOf/>
+    <dgm:constrLst>
+      <dgm:constr type="h" for="ch" forName="composite" refType="h"/>
+      <dgm:constr type="w" for="ch" forName="composite" refType="w"/>
+      <dgm:constr type="h" for="des" forName="parentText" op="equ"/>
+      <dgm:constr type="h" for="ch" forName="sp" val="-14.88"/>
+      <dgm:constr type="h" for="ch" forName="sp" refType="w" refFor="des" refForName="parentText" op="gte" fact="-0.3"/>
+      <dgm:constr type="primFontSz" for="des" forName="parentText" op="equ" val="65"/>
+      <dgm:constr type="primFontSz" for="des" forName="descendantText" op="equ" val="65"/>
+    </dgm:constrLst>
+    <dgm:ruleLst/>
+    <dgm:forEach name="Name0" axis="ch" ptType="node">
+      <dgm:layoutNode name="composite">
+        <dgm:alg type="composite"/>
+        <dgm:shape xmlns:r="http://schemas.openxmlformats.org/officeDocument/2006/relationships" r:blip="">
+          <dgm:adjLst/>
+        </dgm:shape>
+        <dgm:presOf/>
+        <dgm:choose name="Name1">
+          <dgm:if name="Name2" func="var" arg="dir" op="equ" val="norm">
+            <dgm:constrLst>
+              <dgm:constr type="t" for="ch" forName="parentText"/>
+              <dgm:constr type="l" for="ch" forName="parentText"/>
+              <dgm:constr type="w" for="ch" forName="parentText" refType="w" fact="0.4"/>
+              <dgm:constr type="h" for="ch" forName="parentText" refType="h"/>
+              <dgm:constr type="w" for="ch" forName="parentText" refType="w" op="lte" fact="0.5"/>
+              <dgm:constr type="w" for="ch" forName="parentText" refType="h" refFor="ch" refForName="parentText" op="lte" fact="0.7"/>
+              <dgm:constr type="h" for="ch" forName="parentText" refType="w" refFor="ch" refForName="parentText" op="lte" fact="3"/>
+              <dgm:constr type="l" for="ch" forName="descendantText" refType="w" refFor="ch" refForName="parentText"/>
+              <dgm:constr type="w" for="ch" forName="descendantText" refType="w"/>
+              <dgm:constr type="wOff" for="ch" forName="descendantText" refType="w" refFor="ch" refForName="parentText" fact="-1"/>
+              <dgm:constr type="t" for="ch" forName="descendantText"/>
+              <dgm:constr type="b" for="ch" forName="descendantText" refType="h" refFor="ch" refForName="parentText"/>
+              <dgm:constr type="bOff" for="ch" forName="descendantText" refType="w" refFor="ch" refForName="parentText" fact="-0.5"/>
+            </dgm:constrLst>
+          </dgm:if>
+          <dgm:else name="Name3">
+            <dgm:constrLst>
+              <dgm:constr type="t" for="ch" forName="parentText"/>
+              <dgm:constr type="r" for="ch" forName="parentText" refType="w"/>
+              <dgm:constr type="w" for="ch" forName="parentText" refType="w" fact="0.4"/>
+              <dgm:constr type="h" for="ch" forName="parentText" refType="h"/>
+              <dgm:constr type="w" for="ch" forName="parentText" refType="w" op="lte" fact="0.5"/>
+              <dgm:constr type="w" for="ch" forName="parentText" refType="h" refFor="ch" refForName="parentText" op="lte" fact="0.7"/>
+              <dgm:constr type="h" for="ch" forName="parentText" refType="w" refFor="ch" refForName="parentText" op="lte" fact="3"/>
+              <dgm:constr type="l" for="ch" forName="descendantText"/>
+              <dgm:constr type="w" for="ch" forName="descendantText" refType="w"/>
+              <dgm:constr type="wOff" for="ch" forName="descendantText" refType="w" refFor="ch" refForName="parentText" fact="-1"/>
+              <dgm:constr type="t" for="ch" forName="descendantText"/>
+              <dgm:constr type="b" for="ch" forName="descendantText" refType="h" refFor="ch" refForName="parentText"/>
+              <dgm:constr type="bOff" for="ch" forName="descendantText" refType="w" refFor="ch" refForName="parentText" fact="-0.5"/>
+            </dgm:constrLst>
+          </dgm:else>
+        </dgm:choose>
+        <dgm:ruleLst/>
+        <dgm:layoutNode name="parentText" styleLbl="alignNode1">
+          <dgm:varLst>
+            <dgm:chMax val="1"/>
+            <dgm:bulletEnabled val="1"/>
+          </dgm:varLst>
+          <dgm:alg type="tx"/>
+          <dgm:shape xmlns:r="http://schemas.openxmlformats.org/officeDocument/2006/relationships" rot="90" type="chevron" r:blip="">
+            <dgm:adjLst/>
+          </dgm:shape>
+          <dgm:presOf axis="self" ptType="node"/>
+          <dgm:constrLst>
+            <dgm:constr type="lMarg" refType="primFontSz" fact="0.05"/>
+            <dgm:constr type="rMarg" refType="primFontSz" fact="0.05"/>
+            <dgm:constr type="tMarg" refType="primFontSz" fact="0.05"/>
+            <dgm:constr type="bMarg" refType="primFontSz" fact="0.05"/>
+          </dgm:constrLst>
+          <dgm:ruleLst>
+            <dgm:rule type="h" val="100" fact="NaN" max="NaN"/>
+            <dgm:rule type="primFontSz" val="24" fact="NaN" max="NaN"/>
+            <dgm:rule type="h" val="110" fact="NaN" max="NaN"/>
+            <dgm:rule type="primFontSz" val="18" fact="NaN" max="NaN"/>
+            <dgm:rule type="h" val="INF" fact="NaN" max="NaN"/>
+            <dgm:rule type="primFontSz" val="5" fact="NaN" max="NaN"/>
+          </dgm:ruleLst>
+        </dgm:layoutNode>
+        <dgm:layoutNode name="descendantText" styleLbl="alignAcc1">
+          <dgm:varLst>
+            <dgm:bulletEnabled val="1"/>
+          </dgm:varLst>
+          <dgm:choose name="Name4">
+            <dgm:if name="Name5" func="var" arg="dir" op="equ" val="norm">
+              <dgm:alg type="tx">
+                <dgm:param type="stBulletLvl" val="1"/>
+                <dgm:param type="txAnchorVertCh" val="mid"/>
+              </dgm:alg>
+              <dgm:shape xmlns:r="http://schemas.openxmlformats.org/officeDocument/2006/relationships" rot="90" type="round2SameRect" r:blip="">
+                <dgm:adjLst/>
+              </dgm:shape>
+            </dgm:if>
+            <dgm:else name="Name6">
+              <dgm:alg type="tx">
+                <dgm:param type="stBulletLvl" val="1"/>
+                <dgm:param type="txAnchorVertCh" val="mid"/>
+              </dgm:alg>
+              <dgm:shape xmlns:r="http://schemas.openxmlformats.org/officeDocument/2006/relationships" rot="-90" type="round2SameRect" r:blip="">
+                <dgm:adjLst/>
+              </dgm:shape>
+            </dgm:else>
+          </dgm:choose>
+          <dgm:presOf axis="des" ptType="node"/>
+          <dgm:choose name="Name7">
+            <dgm:if name="Name8" func="var" arg="dir" op="equ" val="norm">
+              <dgm:constrLst>
+                <dgm:constr type="secFontSz" refType="primFontSz"/>
+                <dgm:constr type="tMarg" refType="primFontSz" fact="0.05"/>
+                <dgm:constr type="bMarg" refType="primFontSz" fact="0.05"/>
+                <dgm:constr type="rMarg" refType="primFontSz" fact="0.05"/>
+              </dgm:constrLst>
+            </dgm:if>
+            <dgm:else name="Name9">
+              <dgm:constrLst>
+                <dgm:constr type="secFontSz" refType="primFontSz"/>
+                <dgm:constr type="tMarg" refType="primFontSz" fact="0.05"/>
+                <dgm:constr type="bMarg" refType="primFontSz" fact="0.05"/>
+                <dgm:constr type="lMarg" refType="primFontSz" fact="0.05"/>
+              </dgm:constrLst>
+            </dgm:else>
+          </dgm:choose>
+          <dgm:ruleLst>
+            <dgm:rule type="primFontSz" val="5" fact="NaN" max="NaN"/>
+          </dgm:ruleLst>
+        </dgm:layoutNode>
+      </dgm:layoutNode>
+      <dgm:forEach name="Name10" axis="followSib" ptType="sibTrans" cnt="1">
+        <dgm:layoutNode name="sp">
+          <dgm:alg type="sp"/>
+          <dgm:shape xmlns:r="http://schemas.openxmlformats.org/officeDocument/2006/relationships" r:blip="">
+            <dgm:adjLst/>
+          </dgm:shape>
+          <dgm:presOf axis="self"/>
+          <dgm:constrLst>
+            <dgm:constr type="w" val="1"/>
+            <dgm:constr type="h" val="37.5"/>
+          </dgm:constrLst>
+          <dgm:ruleLst/>
+        </dgm:layoutNode>
+      </dgm:forEach>
+    </dgm:forEach>
+  </dgm:layoutNode>
+</dgm:layoutDef>
+</file>
+
+<file path=ppt/diagrams/quickStyle1.xml><?xml version="1.0" encoding="utf-8"?>
+<dgm:styleDef xmlns:dgm="http://schemas.openxmlformats.org/drawingml/2006/diagram" xmlns:a="http://schemas.openxmlformats.org/drawingml/2006/main" uniqueId="urn:microsoft.com/office/officeart/2005/8/quickstyle/simple4">
+  <dgm:title val=""/>
+  <dgm:desc val=""/>
+  <dgm:catLst>
+    <dgm:cat type="simple" pri="10400"/>
+  </dgm:catLst>
+  <dgm:scene3d>
+    <a:camera prst="orthographicFront"/>
+    <a:lightRig rig="threePt" dir="t"/>
+  </dgm:scene3d>
+  <dgm:styleLbl name="node0">
+    <dgm:scene3d>
+      <a:camera prst="orthographicFront"/>
+      <a:lightRig rig="threePt" dir="t"/>
+    </dgm:scene3d>
+    <dgm:sp3d/>
+    <dgm:txPr/>
+    <dgm:style>
+      <a:lnRef idx="0">
+        <a:scrgbClr r="0" g="0" b="0"/>
+      </a:lnRef>
+      <a:fillRef idx="3">
+        <a:scrgbClr r="0" g="0" b="0"/>
+      </a:fillRef>
+      <a:effectRef idx="2">
+        <a:scrgbClr r="0" g="0" b="0"/>
+      </a:effectRef>
+      <a:fontRef idx="minor">
+        <a:schemeClr val="lt1"/>
+      </a:fontRef>
+    </dgm:style>
+  </dgm:styleLbl>
+  <dgm:styleLbl name="lnNode1">
+    <dgm:scene3d>
+      <a:camera prst="orthographicFront"/>
+      <a:lightRig rig="threePt" dir="t"/>
+    </dgm:scene3d>
+    <dgm:sp3d/>
+    <dgm:txPr/>
+    <dgm:style>
+      <a:lnRef idx="1">
+        <a:scrgbClr r="0" g="0" b="0"/>
+      </a:lnRef>
+      <a:fillRef idx="3">
+        <a:scrgbClr r="0" g="0" b="0"/>
+      </a:fillRef>
+      <a:effectRef idx="2">
+        <a:scrgbClr r="0" g="0" b="0"/>
+      </a:effectRef>
+      <a:fontRef idx="minor">
+        <a:schemeClr val="lt1"/>
+      </a:fontRef>
+    </dgm:style>
+  </dgm:styleLbl>
+  <dgm:styleLbl name="vennNode1">
+    <dgm:scene3d>
+      <a:camera prst="orthographicFront"/>
+      <a:lightRig rig="threePt" dir="t"/>
+    </dgm:scene3d>
+    <dgm:sp3d/>
+    <dgm:txPr/>
+    <dgm:style>
+      <a:lnRef idx="0">
+        <a:scrgbClr r="0" g="0" b="0"/>
+      </a:lnRef>
+      <a:fillRef idx="3">
+        <a:scrgbClr r="0" g="0" b="0"/>
+      </a:fillRef>
+      <a:effectRef idx="0">
+        <a:scrgbClr r="0" g="0" b="0"/>
+      </a:effectRef>
+      <a:fontRef idx="minor">
+        <a:schemeClr val="tx1"/>
+      </a:fontRef>
+    </dgm:style>
+  </dgm:styleLbl>
+  <dgm:styleLbl name="alignNode1">
+    <dgm:scene3d>
+      <a:camera prst="orthographicFront"/>
+      <a:lightRig rig="threePt" dir="t"/>
+    </dgm:scene3d>
+    <dgm:sp3d/>
+    <dgm:txPr/>
+    <dgm:style>
+      <a:lnRef idx="1">
+        <a:scrgbClr r="0" g="0" b="0"/>
+      </a:lnRef>
+      <a:fillRef idx="3">
+        <a:scrgbClr r="0" g="0" b="0"/>
+      </a:fillRef>
+      <a:effectRef idx="2">
+        <a:scrgbClr r="0" g="0" b="0"/>
+      </a:effectRef>
+      <a:fontRef idx="minor">
+        <a:schemeClr val="lt1"/>
+      </a:fontRef>
+    </dgm:style>
+  </dgm:styleLbl>
+  <dgm:styleLbl name="node1">
+    <dgm:scene3d>
+      <a:camera prst="orthographicFront"/>
+      <a:lightRig rig="threePt" dir="t"/>
+    </dgm:scene3d>
+    <dgm:sp3d/>
+    <dgm:txPr/>
+    <dgm:style>
+      <a:lnRef idx="0">
+        <a:scrgbClr r="0" g="0" b="0"/>
+      </a:lnRef>
+      <a:fillRef idx="3">
+        <a:scrgbClr r="0" g="0" b="0"/>
+      </a:fillRef>
+      <a:effectRef idx="2">
+        <a:scrgbClr r="0" g="0" b="0"/>
+      </a:effectRef>
+      <a:fontRef idx="minor">
+        <a:schemeClr val="lt1"/>
+      </a:fontRef>
+    </dgm:style>
+  </dgm:styleLbl>
+  <dgm:styleLbl name="node2">
+    <dgm:scene3d>
+      <a:camera prst="orthographicFront"/>
+      <a:lightRig rig="threePt" dir="t"/>
+    </dgm:scene3d>
+    <dgm:sp3d/>
+    <dgm:txPr/>
+    <dgm:style>
+      <a:lnRef idx="0">
+        <a:scrgbClr r="0" g="0" b="0"/>
+      </a:lnRef>
+      <a:fillRef idx="3">
+        <a:scrgbClr r="0" g="0" b="0"/>
+      </a:fillRef>
+      <a:effectRef idx="2">
+        <a:scrgbClr r="0" g="0" b="0"/>
+      </a:effectRef>
+      <a:fontRef idx="minor">
+        <a:schemeClr val="lt1"/>
+      </a:fontRef>
+    </dgm:style>
+  </dgm:styleLbl>
+  <dgm:styleLbl name="node3">
+    <dgm:scene3d>
+      <a:camera prst="orthographicFront"/>
+      <a:lightRig rig="threePt" dir="t"/>
+    </dgm:scene3d>
+    <dgm:sp3d/>
+    <dgm:txPr/>
+    <dgm:style>
+      <a:lnRef idx="0">
+        <a:scrgbClr r="0" g="0" b="0"/>
+      </a:lnRef>
+      <a:fillRef idx="3">
+        <a:scrgbClr r="0" g="0" b="0"/>
+      </a:fillRef>
+      <a:effectRef idx="2">
+        <a:scrgbClr r="0" g="0" b="0"/>
+      </a:effectRef>
+      <a:fontRef idx="minor">
+        <a:schemeClr val="lt1"/>
+      </a:fontRef>
+    </dgm:style>
+  </dgm:styleLbl>
+  <dgm:styleLbl name="node4">
+    <dgm:scene3d>
+      <a:camera prst="orthographicFront"/>
+      <a:lightRig rig="threePt" dir="t"/>
+    </dgm:scene3d>
+    <dgm:sp3d/>
+    <dgm:txPr/>
+    <dgm:style>
+      <a:lnRef idx="0">
+        <a:scrgbClr r="0" g="0" b="0"/>
+      </a:lnRef>
+      <a:fillRef idx="3">
+        <a:scrgbClr r="0" g="0" b="0"/>
+      </a:fillRef>
+      <a:effectRef idx="2">
+        <a:scrgbClr r="0" g="0" b="0"/>
+      </a:effectRef>
+      <a:fontRef idx="minor">
+        <a:schemeClr val="lt1"/>
+      </a:fontRef>
+    </dgm:style>
+  </dgm:styleLbl>
+  <dgm:styleLbl name="fgImgPlace1">
+    <dgm:scene3d>
+      <a:camera prst="orthographicFront"/>
+      <a:lightRig rig="threePt" dir="t"/>
+    </dgm:scene3d>
+    <dgm:sp3d/>
+    <dgm:txPr/>
+    <dgm:style>
+      <a:lnRef idx="0">
+        <a:scrgbClr r="0" g="0" b="0"/>
+      </a:lnRef>
+      <a:fillRef idx="1">
+        <a:scrgbClr r="0" g="0" b="0"/>
+      </a:fillRef>
+      <a:effectRef idx="2">
+        <a:scrgbClr r="0" g="0" b="0"/>
+      </a:effectRef>
+      <a:fontRef idx="minor"/>
+    </dgm:style>
+  </dgm:styleLbl>
+  <dgm:styleLbl name="alignImgPlace1">
+    <dgm:scene3d>
+      <a:camera prst="orthographicFront"/>
+      <a:lightRig rig="threePt" dir="t"/>
+    </dgm:scene3d>
+    <dgm:sp3d/>
+    <dgm:txPr/>
+    <dgm:style>
+      <a:lnRef idx="0">
+        <a:scrgbClr r="0" g="0" b="0"/>
+      </a:lnRef>
+      <a:fillRef idx="1">
+        <a:scrgbClr r="0" g="0" b="0"/>
+      </a:fillRef>
+      <a:effectRef idx="2">
+        <a:scrgbClr r="0" g="0" b="0"/>
+      </a:effectRef>
+      <a:fontRef idx="minor"/>
+    </dgm:style>
+  </dgm:styleLbl>
+  <dgm:styleLbl name="bgImgPlace1">
+    <dgm:scene3d>
+      <a:camera prst="orthographicFront"/>
+      <a:lightRig rig="threePt" dir="t"/>
+    </dgm:scene3d>
+    <dgm:sp3d/>
+    <dgm:txPr/>
+    <dgm:style>
+      <a:lnRef idx="0">
+        <a:scrgbClr r="0" g="0" b="0"/>
+      </a:lnRef>
+      <a:fillRef idx="1">
+        <a:scrgbClr r="0" g="0" b="0"/>
+      </a:fillRef>
+      <a:effectRef idx="2">
+        <a:scrgbClr r="0" g="0" b="0"/>
+      </a:effectRef>
+      <a:fontRef idx="minor"/>
+    </dgm:style>
+  </dgm:styleLbl>
+  <dgm:styleLbl name="sibTrans2D1">
+    <dgm:scene3d>
+      <a:camera prst="orthographicFront"/>
+      <a:lightRig rig="threePt" dir="t"/>
+    </dgm:scene3d>
+    <dgm:sp3d/>
+    <dgm:txPr/>
+    <dgm:style>
+      <a:lnRef idx="0">
+        <a:scrgbClr r="0" g="0" b="0"/>
+      </a:lnRef>
+      <a:fillRef idx="3">
+        <a:scrgbClr r="0" g="0" b="0"/>
+      </a:fillRef>
+      <a:effectRef idx="2">
+        <a:scrgbClr r="0" g="0" b="0"/>
+      </a:effectRef>
+      <a:fontRef idx="minor">
+        <a:schemeClr val="lt1"/>
+      </a:fontRef>
+    </dgm:style>
+  </dgm:styleLbl>
+  <dgm:styleLbl name="fgSibTrans2D1">
+    <dgm:scene3d>
+      <a:camera prst="orthographicFront"/>
+      <a:lightRig rig="threePt" dir="t"/>
+    </dgm:scene3d>
+    <dgm:sp3d/>
+    <dgm:txPr/>
+    <dgm:style>
+      <a:lnRef idx="0">
+        <a:scrgbClr r="0" g="0" b="0"/>
+      </a:lnRef>
+      <a:fillRef idx="3">
+        <a:scrgbClr r="0" g="0" b="0"/>
+      </a:fillRef>
+      <a:effectRef idx="2">
+        <a:scrgbClr r="0" g="0" b="0"/>
+      </a:effectRef>
+      <a:fontRef idx="minor">
+        <a:schemeClr val="lt1"/>
+      </a:fontRef>
+    </dgm:style>
+  </dgm:styleLbl>
+  <dgm:styleLbl name="bgSibTrans2D1">
+    <dgm:scene3d>
+      <a:camera prst="orthographicFront"/>
+      <a:lightRig rig="threePt" dir="t"/>
+    </dgm:scene3d>
+    <dgm:sp3d/>
+    <dgm:txPr/>
+    <dgm:style>
+      <a:lnRef idx="0">
+        <a:scrgbClr r="0" g="0" b="0"/>
+      </a:lnRef>
+      <a:fillRef idx="3">
+        <a:scrgbClr r="0" g="0" b="0"/>
+      </a:fillRef>
+      <a:effectRef idx="2">
+        <a:scrgbClr r="0" g="0" b="0"/>
+      </a:effectRef>
+      <a:fontRef idx="minor">
+        <a:schemeClr val="lt1"/>
+      </a:fontRef>
+    </dgm:style>
+  </dgm:styleLbl>
+  <dgm:styleLbl name="sibTrans1D1">
+    <dgm:scene3d>
+      <a:camera prst="orthographicFront"/>
+      <a:lightRig rig="threePt" dir="t"/>
+    </dgm:scene3d>
+    <dgm:sp3d/>
+    <dgm:txPr/>
+    <dgm:style>
+      <a:lnRef idx="1">
+        <a:scrgbClr r="0" g="0" b="0"/>
+      </a:lnRef>
+      <a:fillRef idx="0">
+        <a:scrgbClr r="0" g="0" b="0"/>
+      </a:fillRef>
+      <a:effectRef idx="0">
+        <a:scrgbClr r="0" g="0" b="0"/>
+      </a:effectRef>
+      <a:fontRef idx="minor"/>
+    </dgm:style>
+  </dgm:styleLbl>
+  <dgm:styleLbl name="callout">
+    <dgm:scene3d>
+      <a:camera prst="orthographicFront"/>
+      <a:lightRig rig="threePt" dir="t"/>
+    </dgm:scene3d>
+    <dgm:sp3d/>
+    <dgm:txPr/>
+    <dgm:style>
+      <a:lnRef idx="2">
+        <a:scrgbClr r="0" g="0" b="0"/>
+      </a:lnRef>
+      <a:fillRef idx="1">
+        <a:scrgbClr r="0" g="0" b="0"/>
+      </a:fillRef>
+      <a:effectRef idx="1">
+        <a:scrgbClr r="0" g="0" b="0"/>
+      </a:effectRef>
+      <a:fontRef idx="minor"/>
+    </dgm:style>
+  </dgm:styleLbl>
+  <dgm:styleLbl name="asst0">
+    <dgm:scene3d>
+      <a:camera prst="orthographicFront"/>
+      <a:lightRig rig="threePt" dir="t"/>
+    </dgm:scene3d>
+    <dgm:sp3d/>
+    <dgm:txPr/>
+    <dgm:style>
+      <a:lnRef idx="0">
+        <a:scrgbClr r="0" g="0" b="0"/>
+      </a:lnRef>
+      <a:fillRef idx="3">
+        <a:scrgbClr r="0" g="0" b="0"/>
+      </a:fillRef>
+      <a:effectRef idx="2">
+        <a:scrgbClr r="0" g="0" b="0"/>
+      </a:effectRef>
+      <a:fontRef idx="minor">
+        <a:schemeClr val="lt1"/>
+      </a:fontRef>
+    </dgm:style>
+  </dgm:styleLbl>
+  <dgm:styleLbl name="asst1">
+    <dgm:scene3d>
+      <a:camera prst="orthographicFront"/>
+      <a:lightRig rig="threePt" dir="t"/>
+    </dgm:scene3d>
+    <dgm:sp3d/>
+    <dgm:txPr/>
+    <dgm:style>
+      <a:lnRef idx="0">
+        <a:scrgbClr r="0" g="0" b="0"/>
+      </a:lnRef>
+      <a:fillRef idx="3">
+        <a:scrgbClr r="0" g="0" b="0"/>
+      </a:fillRef>
+      <a:effectRef idx="2">
+        <a:scrgbClr r="0" g="0" b="0"/>
+      </a:effectRef>
+      <a:fontRef idx="minor">
+        <a:schemeClr val="lt1"/>
+      </a:fontRef>
+    </dgm:style>
+  </dgm:styleLbl>
+  <dgm:styleLbl name="asst2">
+    <dgm:scene3d>
+      <a:camera prst="orthographicFront"/>
+      <a:lightRig rig="threePt" dir="t"/>
+    </dgm:scene3d>
+    <dgm:sp3d/>
+    <dgm:txPr/>
+    <dgm:style>
+      <a:lnRef idx="0">
+        <a:scrgbClr r="0" g="0" b="0"/>
+      </a:lnRef>
+      <a:fillRef idx="3">
+        <a:scrgbClr r="0" g="0" b="0"/>
+      </a:fillRef>
+      <a:effectRef idx="2">
+        <a:scrgbClr r="0" g="0" b="0"/>
+      </a:effectRef>
+      <a:fontRef idx="minor">
+        <a:schemeClr val="lt1"/>
+      </a:fontRef>
+    </dgm:style>
+  </dgm:styleLbl>
+  <dgm:styleLbl name="asst3">
+    <dgm:scene3d>
+      <a:camera prst="orthographicFront"/>
+      <a:lightRig rig="threePt" dir="t"/>
+    </dgm:scene3d>
+    <dgm:sp3d/>
+    <dgm:txPr/>
+    <dgm:style>
+      <a:lnRef idx="0">
+        <a:scrgbClr r="0" g="0" b="0"/>
+      </a:lnRef>
+      <a:fillRef idx="3">
+        <a:scrgbClr r="0" g="0" b="0"/>
+      </a:fillRef>
+      <a:effectRef idx="2">
+        <a:scrgbClr r="0" g="0" b="0"/>
+      </a:effectRef>
+      <a:fontRef idx="minor">
+        <a:schemeClr val="lt1"/>
+      </a:fontRef>
+    </dgm:style>
+  </dgm:styleLbl>
+  <dgm:styleLbl name="asst4">
+    <dgm:scene3d>
+      <a:camera prst="orthographicFront"/>
+      <a:lightRig rig="threePt" dir="t"/>
+    </dgm:scene3d>
+    <dgm:sp3d/>
+    <dgm:txPr/>
+    <dgm:style>
+      <a:lnRef idx="0">
+        <a:scrgbClr r="0" g="0" b="0"/>
+      </a:lnRef>
+      <a:fillRef idx="3">
+        <a:scrgbClr r="0" g="0" b="0"/>
+      </a:fillRef>
+      <a:effectRef idx="2">
+        <a:scrgbClr r="0" g="0" b="0"/>
+      </a:effectRef>
+      <a:fontRef idx="minor">
+        <a:schemeClr val="lt1"/>
+      </a:fontRef>
+    </dgm:style>
+  </dgm:styleLbl>
+  <dgm:styleLbl name="parChTrans2D1">
+    <dgm:scene3d>
+      <a:camera prst="orthographicFront"/>
+      <a:lightRig rig="threePt" dir="t"/>
+    </dgm:scene3d>
+    <dgm:sp3d/>
+    <dgm:txPr/>
+    <dgm:style>
+      <a:lnRef idx="0">
+        <a:scrgbClr r="0" g="0" b="0"/>
+      </a:lnRef>
+      <a:fillRef idx="3">
+        <a:scrgbClr r="0" g="0" b="0"/>
+      </a:fillRef>
+      <a:effectRef idx="2">
+        <a:scrgbClr r="0" g="0" b="0"/>
+      </a:effectRef>
+      <a:fontRef idx="minor">
+        <a:schemeClr val="lt1"/>
+      </a:fontRef>
+    </dgm:style>
+  </dgm:styleLbl>
+  <dgm:styleLbl name="parChTrans2D2">
+    <dgm:scene3d>
+      <a:camera prst="orthographicFront"/>
+      <a:lightRig rig="threePt" dir="t"/>
+    </dgm:scene3d>
+    <dgm:sp3d/>
+    <dgm:txPr/>
+    <dgm:style>
+      <a:lnRef idx="0">
+        <a:scrgbClr r="0" g="0" b="0"/>
+      </a:lnRef>
+      <a:fillRef idx="3">
+        <a:scrgbClr r="0" g="0" b="0"/>
+      </a:fillRef>
+      <a:effectRef idx="2">
+        <a:scrgbClr r="0" g="0" b="0"/>
+      </a:effectRef>
+      <a:fontRef idx="minor">
+        <a:schemeClr val="lt1"/>
+      </a:fontRef>
+    </dgm:style>
+  </dgm:styleLbl>
+  <dgm:styleLbl name="parChTrans2D3">
+    <dgm:scene3d>
+      <a:camera prst="orthographicFront"/>
+      <a:lightRig rig="threePt" dir="t"/>
+    </dgm:scene3d>
+    <dgm:sp3d/>
+    <dgm:txPr/>
+    <dgm:style>
+      <a:lnRef idx="1">
+        <a:scrgbClr r="0" g="0" b="0"/>
+      </a:lnRef>
+      <a:fillRef idx="3">
+        <a:scrgbClr r="0" g="0" b="0"/>
+      </a:fillRef>
+      <a:effectRef idx="2">
+        <a:scrgbClr r="0" g="0" b="0"/>
+      </a:effectRef>
+      <a:fontRef idx="minor">
+        <a:schemeClr val="lt1"/>
+      </a:fontRef>
+    </dgm:style>
+  </dgm:styleLbl>
+  <dgm:styleLbl name="parChTrans2D4">
+    <dgm:scene3d>
+      <a:camera prst="orthographicFront"/>
+      <a:lightRig rig="threePt" dir="t"/>
+    </dgm:scene3d>
+    <dgm:sp3d/>
+    <dgm:txPr/>
+    <dgm:style>
+      <a:lnRef idx="1">
+        <a:scrgbClr r="0" g="0" b="0"/>
+      </a:lnRef>
+      <a:fillRef idx="3">
+        <a:scrgbClr r="0" g="0" b="0"/>
+      </a:fillRef>
+      <a:effectRef idx="2">
+        <a:scrgbClr r="0" g="0" b="0"/>
+      </a:effectRef>
+      <a:fontRef idx="minor">
+        <a:schemeClr val="lt1"/>
+      </a:fontRef>
+    </dgm:style>
+  </dgm:styleLbl>
+  <dgm:styleLbl name="parChTrans1D1">
+    <dgm:scene3d>
+      <a:camera prst="orthographicFront"/>
+      <a:lightRig rig="threePt" dir="t"/>
+    </dgm:scene3d>
+    <dgm:sp3d/>
+    <dgm:txPr/>
+    <dgm:style>
+      <a:lnRef idx="1">
+        <a:scrgbClr r="0" g="0" b="0"/>
+      </a:lnRef>
+      <a:fillRef idx="0">
+        <a:scrgbClr r="0" g="0" b="0"/>
+      </a:fillRef>
+      <a:effectRef idx="0">
+        <a:scrgbClr r="0" g="0" b="0"/>
+      </a:effectRef>
+      <a:fontRef idx="minor"/>
+    </dgm:style>
+  </dgm:styleLbl>
+  <dgm:styleLbl name="parChTrans1D2">
+    <dgm:scene3d>
+      <a:camera prst="orthographicFront"/>
+      <a:lightRig rig="threePt" dir="t"/>
+    </dgm:scene3d>
+    <dgm:sp3d/>
+    <dgm:txPr/>
+    <dgm:style>
+      <a:lnRef idx="1">
+        <a:scrgbClr r="0" g="0" b="0"/>
+      </a:lnRef>
+      <a:fillRef idx="0">
+        <a:scrgbClr r="0" g="0" b="0"/>
+      </a:fillRef>
+      <a:effectRef idx="0">
+        <a:scrgbClr r="0" g="0" b="0"/>
+      </a:effectRef>
+      <a:fontRef idx="minor"/>
+    </dgm:style>
+  </dgm:styleLbl>
+  <dgm:styleLbl name="parChTrans1D3">
+    <dgm:scene3d>
+      <a:camera prst="orthographicFront"/>
+      <a:lightRig rig="threePt" dir="t"/>
+    </dgm:scene3d>
+    <dgm:sp3d/>
+    <dgm:txPr/>
+    <dgm:style>
+      <a:lnRef idx="1">
+        <a:scrgbClr r="0" g="0" b="0"/>
+      </a:lnRef>
+      <a:fillRef idx="0">
+        <a:scrgbClr r="0" g="0" b="0"/>
+      </a:fillRef>
+      <a:effectRef idx="0">
+        <a:scrgbClr r="0" g="0" b="0"/>
+      </a:effectRef>
+      <a:fontRef idx="minor"/>
+    </dgm:style>
+  </dgm:styleLbl>
+  <dgm:styleLbl name="parChTrans1D4">
+    <dgm:scene3d>
+      <a:camera prst="orthographicFront"/>
+      <a:lightRig rig="threePt" dir="t"/>
+    </dgm:scene3d>
+    <dgm:sp3d/>
+    <dgm:txPr/>
+    <dgm:style>
+      <a:lnRef idx="1">
+        <a:scrgbClr r="0" g="0" b="0"/>
+      </a:lnRef>
+      <a:fillRef idx="0">
+        <a:scrgbClr r="0" g="0" b="0"/>
+      </a:fillRef>
+      <a:effectRef idx="0">
+        <a:scrgbClr r="0" g="0" b="0"/>
+      </a:effectRef>
+      <a:fontRef idx="minor"/>
+    </dgm:style>
+  </dgm:styleLbl>
+  <dgm:styleLbl name="fgAcc1">
+    <dgm:scene3d>
+      <a:camera prst="orthographicFront"/>
+      <a:lightRig rig="threePt" dir="t"/>
+    </dgm:scene3d>
+    <dgm:sp3d/>
+    <dgm:txPr/>
+    <dgm:style>
+      <a:lnRef idx="1">
+        <a:scrgbClr r="0" g="0" b="0"/>
+      </a:lnRef>
+      <a:fillRef idx="1">
+        <a:scrgbClr r="0" g="0" b="0"/>
+      </a:fillRef>
+      <a:effectRef idx="0">
+        <a:scrgbClr r="0" g="0" b="0"/>
+      </a:effectRef>
+      <a:fontRef idx="minor"/>
+    </dgm:style>
+  </dgm:styleLbl>
+  <dgm:styleLbl name="conFgAcc1">
+    <dgm:scene3d>
+      <a:camera prst="orthographicFront"/>
+      <a:lightRig rig="threePt" dir="t"/>
+    </dgm:scene3d>
+    <dgm:sp3d/>
+    <dgm:txPr/>
+    <dgm:style>
+      <a:lnRef idx="1">
+        <a:scrgbClr r="0" g="0" b="0"/>
+      </a:lnRef>
+      <a:fillRef idx="1">
+        <a:scrgbClr r="0" g="0" b="0"/>
+      </a:fillRef>
+      <a:effectRef idx="0">
+        <a:scrgbClr r="0" g="0" b="0"/>
+      </a:effectRef>
+      <a:fontRef idx="minor"/>
+    </dgm:style>
+  </dgm:styleLbl>
+  <dgm:styleLbl name="alignAcc1">
+    <dgm:scene3d>
+      <a:camera prst="orthographicFront"/>
+      <a:lightRig rig="threePt" dir="t"/>
+    </dgm:scene3d>
+    <dgm:sp3d/>
+    <dgm:txPr/>
+    <dgm:style>
+      <a:lnRef idx="1">
+        <a:scrgbClr r="0" g="0" b="0"/>
+      </a:lnRef>
+      <a:fillRef idx="1">
+        <a:scrgbClr r="0" g="0" b="0"/>
+      </a:fillRef>
+      <a:effectRef idx="0">
+        <a:scrgbClr r="0" g="0" b="0"/>
+      </a:effectRef>
+      <a:fontRef idx="minor"/>
+    </dgm:style>
+  </dgm:styleLbl>
+  <dgm:styleLbl name="trAlignAcc1">
+    <dgm:scene3d>
+      <a:camera prst="orthographicFront"/>
+      <a:lightRig rig="threePt" dir="t"/>
+    </dgm:scene3d>
+    <dgm:sp3d/>
+    <dgm:txPr/>
+    <dgm:style>
+      <a:lnRef idx="1">
+        <a:scrgbClr r="0" g="0" b="0"/>
+      </a:lnRef>
+      <a:fillRef idx="1">
+        <a:scrgbClr r="0" g="0" b="0"/>
+      </a:fillRef>
+      <a:effectRef idx="0">
+        <a:scrgbClr r="0" g="0" b="0"/>
+      </a:effectRef>
+      <a:fontRef idx="minor"/>
+    </dgm:style>
+  </dgm:styleLbl>
+  <dgm:styleLbl name="bgAcc1">
+    <dgm:scene3d>
+      <a:camera prst="orthographicFront"/>
+      <a:lightRig rig="threePt" dir="t"/>
+    </dgm:scene3d>
+    <dgm:sp3d/>
+    <dgm:txPr/>
+    <dgm:style>
+      <a:lnRef idx="1">
+        <a:scrgbClr r="0" g="0" b="0"/>
+      </a:lnRef>
+      <a:fillRef idx="1">
+        <a:scrgbClr r="0" g="0" b="0"/>
+      </a:fillRef>
+      <a:effectRef idx="0">
+        <a:scrgbClr r="0" g="0" b="0"/>
+      </a:effectRef>
+      <a:fontRef idx="minor"/>
+    </dgm:style>
+  </dgm:styleLbl>
+  <dgm:styleLbl name="solidFgAcc1">
+    <dgm:scene3d>
+      <a:camera prst="orthographicFront"/>
+      <a:lightRig rig="threePt" dir="t"/>
+    </dgm:scene3d>
+    <dgm:sp3d/>
+    <dgm:txPr/>
+    <dgm:style>
+      <a:lnRef idx="1">
+        <a:scrgbClr r="0" g="0" b="0"/>
+      </a:lnRef>
+      <a:fillRef idx="1">
+        <a:scrgbClr r="0" g="0" b="0"/>
+      </a:fillRef>
+      <a:effectRef idx="0">
+        <a:scrgbClr r="0" g="0" b="0"/>
+      </a:effectRef>
+      <a:fontRef idx="minor"/>
+    </dgm:style>
+  </dgm:styleLbl>
+  <dgm:styleLbl name="solidAlignAcc1">
+    <dgm:scene3d>
+      <a:camera prst="orthographicFront"/>
+      <a:lightRig rig="threePt" dir="t"/>
+    </dgm:scene3d>
+    <dgm:sp3d/>
+    <dgm:txPr/>
+    <dgm:style>
+      <a:lnRef idx="1">
+        <a:scrgbClr r="0" g="0" b="0"/>
+      </a:lnRef>
+      <a:fillRef idx="1">
+        <a:scrgbClr r="0" g="0" b="0"/>
+      </a:fillRef>
+      <a:effectRef idx="0">
+        <a:scrgbClr r="0" g="0" b="0"/>
+      </a:effectRef>
+      <a:fontRef idx="minor"/>
+    </dgm:style>
+  </dgm:styleLbl>
+  <dgm:styleLbl name="solidBgAcc1">
+    <dgm:scene3d>
+      <a:camera prst="orthographicFront"/>
+      <a:lightRig rig="threePt" dir="t"/>
+    </dgm:scene3d>
+    <dgm:sp3d/>
+    <dgm:txPr/>
+    <dgm:style>
+      <a:lnRef idx="1">
+        <a:scrgbClr r="0" g="0" b="0"/>
+      </a:lnRef>
+      <a:fillRef idx="1">
+        <a:scrgbClr r="0" g="0" b="0"/>
+      </a:fillRef>
+      <a:effectRef idx="0">
+        <a:scrgbClr r="0" g="0" b="0"/>
+      </a:effectRef>
+      <a:fontRef idx="minor"/>
+    </dgm:style>
+  </dgm:styleLbl>
+  <dgm:styleLbl name="fgAccFollowNode1">
+    <dgm:scene3d>
+      <a:camera prst="orthographicFront"/>
+      <a:lightRig rig="threePt" dir="t"/>
+    </dgm:scene3d>
+    <dgm:sp3d/>
+    <dgm:txPr/>
+    <dgm:style>
+      <a:lnRef idx="1">
+        <a:scrgbClr r="0" g="0" b="0"/>
+      </a:lnRef>
+      <a:fillRef idx="1">
+        <a:scrgbClr r="0" g="0" b="0"/>
+      </a:fillRef>
+      <a:effectRef idx="0">
+        <a:scrgbClr r="0" g="0" b="0"/>
+      </a:effectRef>
+      <a:fontRef idx="minor"/>
+    </dgm:style>
+  </dgm:styleLbl>
+  <dgm:styleLbl name="alignAccFollowNode1">
+    <dgm:scene3d>
+      <a:camera prst="orthographicFront"/>
+      <a:lightRig rig="threePt" dir="t"/>
+    </dgm:scene3d>
+    <dgm:sp3d/>
+    <dgm:txPr/>
+    <dgm:style>
+      <a:lnRef idx="1">
+        <a:scrgbClr r="0" g="0" b="0"/>
+      </a:lnRef>
+      <a:fillRef idx="1">
+        <a:scrgbClr r="0" g="0" b="0"/>
+      </a:fillRef>
+      <a:effectRef idx="0">
+        <a:scrgbClr r="0" g="0" b="0"/>
+      </a:effectRef>
+      <a:fontRef idx="minor"/>
+    </dgm:style>
+  </dgm:styleLbl>
+  <dgm:styleLbl name="bgAccFollowNode1">
+    <dgm:scene3d>
+      <a:camera prst="orthographicFront"/>
+      <a:lightRig rig="threePt" dir="t"/>
+    </dgm:scene3d>
+    <dgm:sp3d/>
+    <dgm:txPr/>
+    <dgm:style>
+      <a:lnRef idx="1">
+        <a:scrgbClr r="0" g="0" b="0"/>
+      </a:lnRef>
+      <a:fillRef idx="1">
+        <a:scrgbClr r="0" g="0" b="0"/>
+      </a:fillRef>
+      <a:effectRef idx="0">
+        <a:scrgbClr r="0" g="0" b="0"/>
+      </a:effectRef>
+      <a:fontRef idx="minor"/>
+    </dgm:style>
+  </dgm:styleLbl>
+  <dgm:styleLbl name="fgAcc0">
+    <dgm:scene3d>
+      <a:camera prst="orthographicFront"/>
+      <a:lightRig rig="threePt" dir="t"/>
+    </dgm:scene3d>
+    <dgm:sp3d/>
+    <dgm:txPr/>
+    <dgm:style>
+      <a:lnRef idx="1">
+        <a:scrgbClr r="0" g="0" b="0"/>
+      </a:lnRef>
+      <a:fillRef idx="1">
+        <a:scrgbClr r="0" g="0" b="0"/>
+      </a:fillRef>
+      <a:effectRef idx="0">
+        <a:scrgbClr r="0" g="0" b="0"/>
+      </a:effectRef>
+      <a:fontRef idx="minor"/>
+    </dgm:style>
+  </dgm:styleLbl>
+  <dgm:styleLbl name="fgAcc2">
+    <dgm:scene3d>
+      <a:camera prst="orthographicFront"/>
+      <a:lightRig rig="threePt" dir="t"/>
+    </dgm:scene3d>
+    <dgm:sp3d/>
+    <dgm:txPr/>
+    <dgm:style>
+      <a:lnRef idx="1">
+        <a:scrgbClr r="0" g="0" b="0"/>
+      </a:lnRef>
+      <a:fillRef idx="1">
+        <a:scrgbClr r="0" g="0" b="0"/>
+      </a:fillRef>
+      <a:effectRef idx="0">
+        <a:scrgbClr r="0" g="0" b="0"/>
+      </a:effectRef>
+      <a:fontRef idx="minor"/>
+    </dgm:style>
+  </dgm:styleLbl>
+  <dgm:styleLbl name="fgAcc3">
+    <dgm:scene3d>
+      <a:camera prst="orthographicFront"/>
+      <a:lightRig rig="threePt" dir="t"/>
+    </dgm:scene3d>
+    <dgm:sp3d/>
+    <dgm:txPr/>
+    <dgm:style>
+      <a:lnRef idx="1">
+        <a:scrgbClr r="0" g="0" b="0"/>
+      </a:lnRef>
+      <a:fillRef idx="1">
+        <a:scrgbClr r="0" g="0" b="0"/>
+      </a:fillRef>
+      <a:effectRef idx="0">
+        <a:scrgbClr r="0" g="0" b="0"/>
+      </a:effectRef>
+      <a:fontRef idx="minor"/>
+    </dgm:style>
+  </dgm:styleLbl>
+  <dgm:styleLbl name="fgAcc4">
+    <dgm:scene3d>
+      <a:camera prst="orthographicFront"/>
+      <a:lightRig rig="threePt" dir="t"/>
+    </dgm:scene3d>
+    <dgm:sp3d/>
+    <dgm:txPr/>
+    <dgm:style>
+      <a:lnRef idx="1">
+        <a:scrgbClr r="0" g="0" b="0"/>
+      </a:lnRef>
+      <a:fillRef idx="1">
+        <a:scrgbClr r="0" g="0" b="0"/>
+      </a:fillRef>
+      <a:effectRef idx="0">
+        <a:scrgbClr r="0" g="0" b="0"/>
+      </a:effectRef>
+      <a:fontRef idx="minor"/>
+    </dgm:style>
+  </dgm:styleLbl>
+  <dgm:styleLbl name="bgShp">
+    <dgm:scene3d>
+      <a:camera prst="orthographicFront"/>
+      <a:lightRig rig="threePt" dir="t"/>
+    </dgm:scene3d>
+    <dgm:sp3d/>
+    <dgm:txPr/>
+    <dgm:style>
+      <a:lnRef idx="0">
+        <a:scrgbClr r="0" g="0" b="0"/>
+      </a:lnRef>
+      <a:fillRef idx="1">
+        <a:scrgbClr r="0" g="0" b="0"/>
+      </a:fillRef>
+      <a:effectRef idx="2">
+        <a:scrgbClr r="0" g="0" b="0"/>
+      </a:effectRef>
+      <a:fontRef idx="minor"/>
+    </dgm:style>
+  </dgm:styleLbl>
+  <dgm:styleLbl name="dkBgShp">
+    <dgm:scene3d>
+      <a:camera prst="orthographicFront"/>
+      <a:lightRig rig="threePt" dir="t"/>
+    </dgm:scene3d>
+    <dgm:sp3d/>
+    <dgm:txPr/>
+    <dgm:style>
+      <a:lnRef idx="0">
+        <a:scrgbClr r="0" g="0" b="0"/>
+      </a:lnRef>
+      <a:fillRef idx="1">
+        <a:scrgbClr r="0" g="0" b="0"/>
+      </a:fillRef>
+      <a:effectRef idx="2">
+        <a:scrgbClr r="0" g="0" b="0"/>
+      </a:effectRef>
+      <a:fontRef idx="minor"/>
+    </dgm:style>
+  </dgm:styleLbl>
+  <dgm:styleLbl name="trBgShp">
+    <dgm:scene3d>
+      <a:camera prst="orthographicFront"/>
+      <a:lightRig rig="threePt" dir="t"/>
+    </dgm:scene3d>
+    <dgm:sp3d/>
+    <dgm:txPr/>
+    <dgm:style>
+      <a:lnRef idx="0">
+        <a:scrgbClr r="0" g="0" b="0"/>
+      </a:lnRef>
+      <a:fillRef idx="1">
+        <a:scrgbClr r="0" g="0" b="0"/>
+      </a:fillRef>
+      <a:effectRef idx="0">
+        <a:scrgbClr r="0" g="0" b="0"/>
+      </a:effectRef>
+      <a:fontRef idx="minor"/>
+    </dgm:style>
+  </dgm:styleLbl>
+  <dgm:styleLbl name="fgShp">
+    <dgm:scene3d>
+      <a:camera prst="orthographicFront"/>
+      <a:lightRig rig="threePt" dir="t"/>
+    </dgm:scene3d>
+    <dgm:sp3d/>
+    <dgm:txPr/>
+    <dgm:style>
+      <a:lnRef idx="0">
+        <a:scrgbClr r="0" g="0" b="0"/>
+      </a:lnRef>
+      <a:fillRef idx="3">
+        <a:scrgbClr r="0" g="0" b="0"/>
+      </a:fillRef>
+      <a:effectRef idx="2">
+        <a:scrgbClr r="0" g="0" b="0"/>
+      </a:effectRef>
+      <a:fontRef idx="minor"/>
+    </dgm:style>
+  </dgm:styleLbl>
+  <dgm:styleLbl name="revTx">
+    <dgm:scene3d>
+      <a:camera prst="orthographicFront"/>
+      <a:lightRig rig="threePt" dir="t"/>
+    </dgm:scene3d>
+    <dgm:sp3d/>
+    <dgm:txPr/>
+    <dgm:style>
+      <a:lnRef idx="0">
+        <a:scrgbClr r="0" g="0" b="0"/>
+      </a:lnRef>
+      <a:fillRef idx="0">
+        <a:scrgbClr r="0" g="0" b="0"/>
+      </a:fillRef>
+      <a:effectRef idx="0">
+        <a:scrgbClr r="0" g="0" b="0"/>
+      </a:effectRef>
+      <a:fontRef idx="minor"/>
+    </dgm:style>
+  </dgm:styleLbl>
+</dgm:styleDef>
 </file>
 
 <file path=ppt/slideLayouts/slideLayout1.xml><?xml version="1.0" encoding="utf-8"?>
@@ -449,7 +3783,7 @@
           <a:p>
             <a:fld id="{0BCE4439-E337-7647-8BE8-4A4D11C1FA42}" type="datetimeFigureOut">
               <a:rPr lang="en-US" smtClean="0"/>
-              <a:t>9/18/2016</a:t>
+              <a:t>9/18/16</a:t>
             </a:fld>
             <a:endParaRPr lang="en-US"/>
           </a:p>
@@ -773,7 +4107,7 @@
           <a:p>
             <a:fld id="{0BCE4439-E337-7647-8BE8-4A4D11C1FA42}" type="datetimeFigureOut">
               <a:rPr lang="en-US" smtClean="0"/>
-              <a:t>9/18/2016</a:t>
+              <a:t>9/18/16</a:t>
             </a:fld>
             <a:endParaRPr lang="en-US"/>
           </a:p>
@@ -1021,7 +4355,7 @@
           <a:p>
             <a:fld id="{0BCE4439-E337-7647-8BE8-4A4D11C1FA42}" type="datetimeFigureOut">
               <a:rPr lang="en-US" smtClean="0"/>
-              <a:t>9/18/2016</a:t>
+              <a:t>9/18/16</a:t>
             </a:fld>
             <a:endParaRPr lang="en-US"/>
           </a:p>
@@ -1360,7 +4694,7 @@
           <a:p>
             <a:fld id="{0BCE4439-E337-7647-8BE8-4A4D11C1FA42}" type="datetimeFigureOut">
               <a:rPr lang="en-US" smtClean="0"/>
-              <a:t>9/18/2016</a:t>
+              <a:t>9/18/16</a:t>
             </a:fld>
             <a:endParaRPr lang="en-US"/>
           </a:p>
@@ -1707,7 +5041,7 @@
           <a:p>
             <a:fld id="{0BCE4439-E337-7647-8BE8-4A4D11C1FA42}" type="datetimeFigureOut">
               <a:rPr lang="en-US" smtClean="0"/>
-              <a:t>9/18/2016</a:t>
+              <a:t>9/18/16</a:t>
             </a:fld>
             <a:endParaRPr lang="en-US"/>
           </a:p>
@@ -2081,7 +5415,7 @@
           <a:p>
             <a:fld id="{0BCE4439-E337-7647-8BE8-4A4D11C1FA42}" type="datetimeFigureOut">
               <a:rPr lang="en-US" smtClean="0"/>
-              <a:t>9/18/2016</a:t>
+              <a:t>9/18/16</a:t>
             </a:fld>
             <a:endParaRPr lang="en-US"/>
           </a:p>
@@ -2551,7 +5885,7 @@
           <a:p>
             <a:fld id="{0BCE4439-E337-7647-8BE8-4A4D11C1FA42}" type="datetimeFigureOut">
               <a:rPr lang="en-US" smtClean="0"/>
-              <a:t>9/18/2016</a:t>
+              <a:t>9/18/16</a:t>
             </a:fld>
             <a:endParaRPr lang="en-US"/>
           </a:p>
@@ -2756,7 +6090,7 @@
           <a:p>
             <a:fld id="{0BCE4439-E337-7647-8BE8-4A4D11C1FA42}" type="datetimeFigureOut">
               <a:rPr lang="en-US" smtClean="0"/>
-              <a:t>9/18/2016</a:t>
+              <a:t>9/18/16</a:t>
             </a:fld>
             <a:endParaRPr lang="en-US"/>
           </a:p>
@@ -2967,7 +6301,7 @@
           <a:p>
             <a:fld id="{0BCE4439-E337-7647-8BE8-4A4D11C1FA42}" type="datetimeFigureOut">
               <a:rPr lang="en-US" smtClean="0"/>
-              <a:t>9/18/2016</a:t>
+              <a:t>9/18/16</a:t>
             </a:fld>
             <a:endParaRPr lang="en-US"/>
           </a:p>
@@ -3199,7 +6533,7 @@
           <a:p>
             <a:fld id="{0BCE4439-E337-7647-8BE8-4A4D11C1FA42}" type="datetimeFigureOut">
               <a:rPr lang="en-US" smtClean="0"/>
-              <a:t>9/18/2016</a:t>
+              <a:t>9/18/16</a:t>
             </a:fld>
             <a:endParaRPr lang="en-US"/>
           </a:p>
@@ -3447,7 +6781,7 @@
           <a:p>
             <a:fld id="{0BCE4439-E337-7647-8BE8-4A4D11C1FA42}" type="datetimeFigureOut">
               <a:rPr lang="en-US" smtClean="0"/>
-              <a:t>9/18/2016</a:t>
+              <a:t>9/18/16</a:t>
             </a:fld>
             <a:endParaRPr lang="en-US"/>
           </a:p>
@@ -3745,7 +7079,7 @@
           <a:p>
             <a:fld id="{0BCE4439-E337-7647-8BE8-4A4D11C1FA42}" type="datetimeFigureOut">
               <a:rPr lang="en-US" smtClean="0"/>
-              <a:t>9/18/2016</a:t>
+              <a:t>9/18/16</a:t>
             </a:fld>
             <a:endParaRPr lang="en-US"/>
           </a:p>
@@ -4139,7 +7473,7 @@
           <a:p>
             <a:fld id="{0BCE4439-E337-7647-8BE8-4A4D11C1FA42}" type="datetimeFigureOut">
               <a:rPr lang="en-US" smtClean="0"/>
-              <a:t>9/18/2016</a:t>
+              <a:t>9/18/16</a:t>
             </a:fld>
             <a:endParaRPr lang="en-US"/>
           </a:p>
@@ -4288,7 +7622,7 @@
           <a:p>
             <a:fld id="{0BCE4439-E337-7647-8BE8-4A4D11C1FA42}" type="datetimeFigureOut">
               <a:rPr lang="en-US" smtClean="0"/>
-              <a:t>9/18/2016</a:t>
+              <a:t>9/18/16</a:t>
             </a:fld>
             <a:endParaRPr lang="en-US"/>
           </a:p>
@@ -4414,7 +7748,7 @@
           <a:p>
             <a:fld id="{0BCE4439-E337-7647-8BE8-4A4D11C1FA42}" type="datetimeFigureOut">
               <a:rPr lang="en-US" smtClean="0"/>
-              <a:t>9/18/2016</a:t>
+              <a:t>9/18/16</a:t>
             </a:fld>
             <a:endParaRPr lang="en-US"/>
           </a:p>
@@ -4669,7 +8003,7 @@
           <a:p>
             <a:fld id="{0BCE4439-E337-7647-8BE8-4A4D11C1FA42}" type="datetimeFigureOut">
               <a:rPr lang="en-US" smtClean="0"/>
-              <a:t>9/18/2016</a:t>
+              <a:t>9/18/16</a:t>
             </a:fld>
             <a:endParaRPr lang="en-US"/>
           </a:p>
@@ -4984,7 +8318,7 @@
           <a:p>
             <a:fld id="{0BCE4439-E337-7647-8BE8-4A4D11C1FA42}" type="datetimeFigureOut">
               <a:rPr lang="en-US" smtClean="0"/>
-              <a:t>9/18/2016</a:t>
+              <a:t>9/18/16</a:t>
             </a:fld>
             <a:endParaRPr lang="en-US"/>
           </a:p>
@@ -5335,7 +8669,7 @@
           <a:p>
             <a:fld id="{0BCE4439-E337-7647-8BE8-4A4D11C1FA42}" type="datetimeFigureOut">
               <a:rPr lang="en-US" smtClean="0"/>
-              <a:t>9/18/2016</a:t>
+              <a:t>9/18/16</a:t>
             </a:fld>
             <a:endParaRPr lang="en-US"/>
           </a:p>
@@ -5925,15 +9259,7 @@
           <a:p>
             <a:r>
               <a:rPr lang="en-US" dirty="0" smtClean="0"/>
-              <a:t>By </a:t>
-            </a:r>
-            <a:r>
-              <a:rPr lang="en-US" dirty="0" smtClean="0"/>
-              <a:t>Thomas Li </a:t>
-            </a:r>
-            <a:r>
-              <a:rPr lang="en-US" dirty="0" smtClean="0"/>
-              <a:t>and John </a:t>
+              <a:t>By Thomas Li and John </a:t>
             </a:r>
             <a:r>
               <a:rPr lang="en-US" dirty="0" err="1" smtClean="0"/>
@@ -6101,22 +9427,391 @@
           </a:p>
         </p:txBody>
       </p:sp>
-      <p:sp>
-        <p:nvSpPr>
-          <p:cNvPr id="3" name="Content Placeholder 2"/>
-          <p:cNvSpPr>
-            <a:spLocks noGrp="1"/>
-          </p:cNvSpPr>
+      <p:pic>
+        <p:nvPicPr>
+          <p:cNvPr id="4" name="Content Placeholder 3"/>
+          <p:cNvPicPr>
+            <a:picLocks noGrp="1" noChangeAspect="1"/>
+          </p:cNvPicPr>
           <p:nvPr>
             <p:ph idx="1"/>
           </p:nvPr>
-        </p:nvSpPr>
-        <p:spPr/>
-        <p:txBody>
-          <a:bodyPr/>
+        </p:nvPicPr>
+        <p:blipFill>
+          <a:blip r:embed="rId2">
+            <a:extLst>
+              <a:ext uri="{28A0092B-C50C-407E-A947-70E740481C1C}">
+                <a14:useLocalDpi xmlns:a14="http://schemas.microsoft.com/office/drawing/2010/main" val="0"/>
+              </a:ext>
+            </a:extLst>
+          </a:blip>
+          <a:stretch>
+            <a:fillRect/>
+          </a:stretch>
+        </p:blipFill>
+        <p:spPr>
+          <a:xfrm>
+            <a:off x="3934920" y="2514051"/>
+            <a:ext cx="3851105" cy="3317875"/>
+          </a:xfrm>
+        </p:spPr>
+      </p:pic>
+      <p:cxnSp>
+        <p:nvCxnSpPr>
+          <p:cNvPr id="8" name="Elbow Connector 7"/>
+          <p:cNvCxnSpPr/>
+          <p:nvPr/>
+        </p:nvCxnSpPr>
+        <p:spPr>
+          <a:xfrm>
+            <a:off x="3350029" y="2709949"/>
+            <a:ext cx="2510444" cy="1463040"/>
+          </a:xfrm>
+          <a:prstGeom prst="bentConnector3">
+            <a:avLst/>
+          </a:prstGeom>
+          <a:ln w="38100">
+            <a:solidFill>
+              <a:srgbClr val="FFFF00"/>
+            </a:solidFill>
+            <a:tailEnd type="triangle"/>
+          </a:ln>
+        </p:spPr>
+        <p:style>
+          <a:lnRef idx="1">
+            <a:schemeClr val="accent1"/>
+          </a:lnRef>
+          <a:fillRef idx="0">
+            <a:schemeClr val="accent1"/>
+          </a:fillRef>
+          <a:effectRef idx="0">
+            <a:schemeClr val="accent1"/>
+          </a:effectRef>
+          <a:fontRef idx="minor">
+            <a:schemeClr val="tx1"/>
+          </a:fontRef>
+        </p:style>
+      </p:cxnSp>
+      <p:cxnSp>
+        <p:nvCxnSpPr>
+          <p:cNvPr id="10" name="Elbow Connector 9"/>
+          <p:cNvCxnSpPr/>
+          <p:nvPr/>
+        </p:nvCxnSpPr>
+        <p:spPr>
+          <a:xfrm rot="10800000" flipV="1">
+            <a:off x="6758247" y="2826327"/>
+            <a:ext cx="1961804" cy="1163782"/>
+          </a:xfrm>
+          <a:prstGeom prst="bentConnector3">
+            <a:avLst/>
+          </a:prstGeom>
+          <a:ln w="28575">
+            <a:solidFill>
+              <a:srgbClr val="FFFF00"/>
+            </a:solidFill>
+            <a:tailEnd type="triangle"/>
+          </a:ln>
+        </p:spPr>
+        <p:style>
+          <a:lnRef idx="1">
+            <a:schemeClr val="accent1"/>
+          </a:lnRef>
+          <a:fillRef idx="0">
+            <a:schemeClr val="accent1"/>
+          </a:fillRef>
+          <a:effectRef idx="0">
+            <a:schemeClr val="accent1"/>
+          </a:effectRef>
+          <a:fontRef idx="minor">
+            <a:schemeClr val="tx1"/>
+          </a:fontRef>
+        </p:style>
+      </p:cxnSp>
+      <p:cxnSp>
+        <p:nvCxnSpPr>
+          <p:cNvPr id="12" name="Straight Arrow Connector 11"/>
+          <p:cNvCxnSpPr/>
+          <p:nvPr/>
+        </p:nvCxnSpPr>
+        <p:spPr>
+          <a:xfrm flipH="1" flipV="1">
+            <a:off x="6475615" y="4823734"/>
+            <a:ext cx="2244436" cy="58189"/>
+          </a:xfrm>
+          <a:prstGeom prst="straightConnector1">
+            <a:avLst/>
+          </a:prstGeom>
+          <a:ln w="38100">
+            <a:solidFill>
+              <a:srgbClr val="FFFF00"/>
+            </a:solidFill>
+            <a:tailEnd type="triangle"/>
+          </a:ln>
+        </p:spPr>
+        <p:style>
+          <a:lnRef idx="1">
+            <a:schemeClr val="accent1"/>
+          </a:lnRef>
+          <a:fillRef idx="0">
+            <a:schemeClr val="accent1"/>
+          </a:fillRef>
+          <a:effectRef idx="0">
+            <a:schemeClr val="accent1"/>
+          </a:effectRef>
+          <a:fontRef idx="minor">
+            <a:schemeClr val="tx1"/>
+          </a:fontRef>
+        </p:style>
+      </p:cxnSp>
+      <p:sp>
+        <p:nvSpPr>
+          <p:cNvPr id="15" name="Rectangle 14"/>
+          <p:cNvSpPr/>
+          <p:nvPr/>
+        </p:nvSpPr>
+        <p:spPr>
+          <a:xfrm>
+            <a:off x="822070" y="2478226"/>
+            <a:ext cx="2536272" cy="646331"/>
+          </a:xfrm>
+          <a:prstGeom prst="rect">
+            <a:avLst/>
+          </a:prstGeom>
+          <a:ln>
+            <a:solidFill>
+              <a:srgbClr val="FFFF00"/>
+            </a:solidFill>
+          </a:ln>
+        </p:spPr>
+        <p:style>
+          <a:lnRef idx="2">
+            <a:schemeClr val="accent6"/>
+          </a:lnRef>
+          <a:fillRef idx="1">
+            <a:schemeClr val="lt1"/>
+          </a:fillRef>
+          <a:effectRef idx="0">
+            <a:schemeClr val="accent6"/>
+          </a:effectRef>
+          <a:fontRef idx="minor">
+            <a:schemeClr val="dk1"/>
+          </a:fontRef>
+        </p:style>
+        <p:txBody>
+          <a:bodyPr wrap="none" lIns="91440" tIns="45720" rIns="91440" bIns="45720">
+            <a:spAutoFit/>
+          </a:bodyPr>
           <a:lstStyle/>
           <a:p>
-            <a:endParaRPr lang="en-US" dirty="0"/>
+            <a:pPr algn="ctr"/>
+            <a:r>
+              <a:rPr lang="en-US" sz="3600" b="1" dirty="0" smtClean="0">
+                <a:ln w="22225">
+                  <a:solidFill>
+                    <a:schemeClr val="accent2"/>
+                  </a:solidFill>
+                  <a:prstDash val="solid"/>
+                </a:ln>
+                <a:solidFill>
+                  <a:schemeClr val="accent2">
+                    <a:lumMod val="40000"/>
+                    <a:lumOff val="60000"/>
+                  </a:schemeClr>
+                </a:solidFill>
+              </a:rPr>
+              <a:t>Solar panels</a:t>
+            </a:r>
+            <a:endParaRPr lang="en-US" sz="3600" b="1" dirty="0">
+              <a:ln w="22225">
+                <a:solidFill>
+                  <a:schemeClr val="accent2"/>
+                </a:solidFill>
+                <a:prstDash val="solid"/>
+              </a:ln>
+              <a:solidFill>
+                <a:schemeClr val="accent2">
+                  <a:lumMod val="40000"/>
+                  <a:lumOff val="60000"/>
+                </a:schemeClr>
+              </a:solidFill>
+            </a:endParaRPr>
+          </a:p>
+        </p:txBody>
+      </p:sp>
+      <p:sp>
+        <p:nvSpPr>
+          <p:cNvPr id="16" name="Rectangle 15"/>
+          <p:cNvSpPr/>
+          <p:nvPr/>
+        </p:nvSpPr>
+        <p:spPr>
+          <a:xfrm>
+            <a:off x="8676910" y="2580621"/>
+            <a:ext cx="2430474" cy="1200329"/>
+          </a:xfrm>
+          <a:prstGeom prst="rect">
+            <a:avLst/>
+          </a:prstGeom>
+          <a:ln>
+            <a:solidFill>
+              <a:srgbClr val="FFFF00"/>
+            </a:solidFill>
+          </a:ln>
+        </p:spPr>
+        <p:style>
+          <a:lnRef idx="2">
+            <a:schemeClr val="accent6"/>
+          </a:lnRef>
+          <a:fillRef idx="1">
+            <a:schemeClr val="lt1"/>
+          </a:fillRef>
+          <a:effectRef idx="0">
+            <a:schemeClr val="accent6"/>
+          </a:effectRef>
+          <a:fontRef idx="minor">
+            <a:schemeClr val="dk1"/>
+          </a:fontRef>
+        </p:style>
+        <p:txBody>
+          <a:bodyPr wrap="none" lIns="91440" tIns="45720" rIns="91440" bIns="45720">
+            <a:spAutoFit/>
+          </a:bodyPr>
+          <a:lstStyle/>
+          <a:p>
+            <a:pPr algn="ctr"/>
+            <a:r>
+              <a:rPr lang="en-US" sz="3600" b="1" dirty="0" smtClean="0">
+                <a:ln w="22225">
+                  <a:solidFill>
+                    <a:schemeClr val="accent2"/>
+                  </a:solidFill>
+                  <a:prstDash val="solid"/>
+                </a:ln>
+                <a:solidFill>
+                  <a:schemeClr val="accent2">
+                    <a:lumMod val="40000"/>
+                    <a:lumOff val="60000"/>
+                  </a:schemeClr>
+                </a:solidFill>
+              </a:rPr>
+              <a:t>Waterproof</a:t>
+            </a:r>
+          </a:p>
+          <a:p>
+            <a:pPr algn="ctr"/>
+            <a:r>
+              <a:rPr lang="en-US" sz="3600" b="1" dirty="0" smtClean="0">
+                <a:ln w="22225">
+                  <a:solidFill>
+                    <a:schemeClr val="accent2"/>
+                  </a:solidFill>
+                  <a:prstDash val="solid"/>
+                </a:ln>
+                <a:solidFill>
+                  <a:schemeClr val="accent2">
+                    <a:lumMod val="40000"/>
+                    <a:lumOff val="60000"/>
+                  </a:schemeClr>
+                </a:solidFill>
+              </a:rPr>
+              <a:t>ABS plastic</a:t>
+            </a:r>
+            <a:endParaRPr lang="en-US" sz="3600" b="1" dirty="0">
+              <a:ln w="22225">
+                <a:solidFill>
+                  <a:schemeClr val="accent2"/>
+                </a:solidFill>
+                <a:prstDash val="solid"/>
+              </a:ln>
+              <a:solidFill>
+                <a:schemeClr val="accent2">
+                  <a:lumMod val="40000"/>
+                  <a:lumOff val="60000"/>
+                </a:schemeClr>
+              </a:solidFill>
+            </a:endParaRPr>
+          </a:p>
+        </p:txBody>
+      </p:sp>
+      <p:sp>
+        <p:nvSpPr>
+          <p:cNvPr id="17" name="Rectangle 16"/>
+          <p:cNvSpPr/>
+          <p:nvPr/>
+        </p:nvSpPr>
+        <p:spPr>
+          <a:xfrm>
+            <a:off x="8024909" y="4631597"/>
+            <a:ext cx="3424142" cy="1200329"/>
+          </a:xfrm>
+          <a:prstGeom prst="rect">
+            <a:avLst/>
+          </a:prstGeom>
+          <a:ln>
+            <a:solidFill>
+              <a:srgbClr val="FFFF00"/>
+            </a:solidFill>
+          </a:ln>
+        </p:spPr>
+        <p:style>
+          <a:lnRef idx="2">
+            <a:schemeClr val="accent6"/>
+          </a:lnRef>
+          <a:fillRef idx="1">
+            <a:schemeClr val="lt1"/>
+          </a:fillRef>
+          <a:effectRef idx="0">
+            <a:schemeClr val="accent6"/>
+          </a:effectRef>
+          <a:fontRef idx="minor">
+            <a:schemeClr val="dk1"/>
+          </a:fontRef>
+        </p:style>
+        <p:txBody>
+          <a:bodyPr wrap="none" lIns="91440" tIns="45720" rIns="91440" bIns="45720">
+            <a:spAutoFit/>
+          </a:bodyPr>
+          <a:lstStyle/>
+          <a:p>
+            <a:pPr algn="ctr"/>
+            <a:r>
+              <a:rPr lang="en-US" sz="3600" b="1" dirty="0" smtClean="0">
+                <a:ln w="22225">
+                  <a:solidFill>
+                    <a:schemeClr val="accent2"/>
+                  </a:solidFill>
+                  <a:prstDash val="solid"/>
+                </a:ln>
+                <a:solidFill>
+                  <a:schemeClr val="accent2">
+                    <a:lumMod val="40000"/>
+                    <a:lumOff val="60000"/>
+                  </a:schemeClr>
+                </a:solidFill>
+              </a:rPr>
+              <a:t>PH/moisture/</a:t>
+            </a:r>
+          </a:p>
+          <a:p>
+            <a:pPr algn="ctr"/>
+            <a:r>
+              <a:rPr lang="en-US" sz="3600" b="1" dirty="0" smtClean="0">
+                <a:ln w="22225">
+                  <a:solidFill>
+                    <a:schemeClr val="accent2"/>
+                  </a:solidFill>
+                  <a:prstDash val="solid"/>
+                </a:ln>
+                <a:solidFill>
+                  <a:schemeClr val="accent2">
+                    <a:lumMod val="40000"/>
+                    <a:lumOff val="60000"/>
+                  </a:schemeClr>
+                </a:solidFill>
+              </a:rPr>
+              <a:t>Element sensors</a:t>
+            </a:r>
           </a:p>
         </p:txBody>
       </p:sp>
@@ -6160,7 +9855,12 @@
             <p:ph type="title"/>
           </p:nvPr>
         </p:nvSpPr>
-        <p:spPr/>
+        <p:spPr>
+          <a:xfrm>
+            <a:off x="1295400" y="982132"/>
+            <a:ext cx="9601196" cy="1303867"/>
+          </a:xfrm>
+        </p:spPr>
         <p:txBody>
           <a:bodyPr/>
           <a:lstStyle/>
@@ -6177,25 +9877,31 @@
           </a:p>
         </p:txBody>
       </p:sp>
-      <p:sp>
-        <p:nvSpPr>
-          <p:cNvPr id="3" name="Content Placeholder 2"/>
-          <p:cNvSpPr>
-            <a:spLocks noGrp="1"/>
-          </p:cNvSpPr>
+      <p:graphicFrame>
+        <p:nvGraphicFramePr>
+          <p:cNvPr id="6" name="Content Placeholder 5"/>
+          <p:cNvGraphicFramePr>
+            <a:graphicFrameLocks noGrp="1"/>
+          </p:cNvGraphicFramePr>
           <p:nvPr>
             <p:ph idx="1"/>
-          </p:nvPr>
-        </p:nvSpPr>
-        <p:spPr/>
-        <p:txBody>
-          <a:bodyPr/>
-          <a:lstStyle/>
-          <a:p>
-            <a:endParaRPr lang="en-US" dirty="0"/>
-          </a:p>
-        </p:txBody>
-      </p:sp>
+            <p:extLst>
+              <p:ext uri="{D42A27DB-BD31-4B8C-83A1-F6EECF244321}">
+                <p14:modId xmlns:p14="http://schemas.microsoft.com/office/powerpoint/2010/main" val="482152658"/>
+              </p:ext>
+            </p:extLst>
+          </p:nvPr>
+        </p:nvGraphicFramePr>
+        <p:xfrm>
+          <a:off x="1295400" y="2557463"/>
+          <a:ext cx="9601200" cy="3317875"/>
+        </p:xfrm>
+        <a:graphic>
+          <a:graphicData uri="http://schemas.openxmlformats.org/drawingml/2006/diagram">
+            <dgm:relIds xmlns:dgm="http://schemas.openxmlformats.org/drawingml/2006/diagram" xmlns:r="http://schemas.openxmlformats.org/officeDocument/2006/relationships" r:dm="rId2" r:lo="rId3" r:qs="rId4" r:cs="rId5"/>
+          </a:graphicData>
+        </a:graphic>
+      </p:graphicFrame>
     </p:spTree>
     <p:extLst>
       <p:ext uri="{BB962C8B-B14F-4D97-AF65-F5344CB8AC3E}">

</xml_diff>

<commit_message>
finish v1 of HW1.pptx
</commit_message>
<xml_diff>
--- a/HW1.pptx
+++ b/HW1.pptx
@@ -946,7 +946,7 @@
           </a:r>
           <a:r>
             <a:rPr lang="en-US" baseline="0" dirty="0" smtClean="0"/>
-            <a:t> via LE Bluetooth with security</a:t>
+            <a:t> via WLAN with WPA2 security</a:t>
           </a:r>
           <a:endParaRPr lang="en-US" dirty="0"/>
         </a:p>
@@ -995,7 +995,11 @@
           </a:pPr>
           <a:r>
             <a:rPr lang="en-US" dirty="0" smtClean="0"/>
-            <a:t> Generates</a:t>
+            <a:t> Generates </a:t>
+          </a:r>
+          <a:r>
+            <a:rPr lang="en-US" dirty="0" smtClean="0"/>
+            <a:t>an internal</a:t>
           </a:r>
           <a:r>
             <a:rPr lang="en-US" baseline="0" dirty="0" smtClean="0"/>
@@ -1102,12 +1106,20 @@
       </dgm:t>
     </dgm:pt>
     <dgm:pt modelId="{EAC71CA8-AF13-F04D-B88F-F11046F0D062}">
-      <dgm:prSet phldrT="[Text]" phldr="1"/>
+      <dgm:prSet phldrT="[Text]"/>
       <dgm:spPr/>
       <dgm:t>
         <a:bodyPr/>
         <a:lstStyle/>
         <a:p>
+          <a:r>
+            <a:rPr lang="en-US" smtClean="0"/>
+            <a:t>Pebble </a:t>
+          </a:r>
+          <a:r>
+            <a:rPr lang="en-US" baseline="0" smtClean="0"/>
+            <a:t>gets localized weather info via the server.</a:t>
+          </a:r>
           <a:endParaRPr lang="en-US" dirty="0"/>
         </a:p>
       </dgm:t>
@@ -1135,13 +1147,17 @@
       </dgm:t>
     </dgm:pt>
     <dgm:pt modelId="{977C1F06-E86A-6F46-AA35-8054AAF64531}">
-      <dgm:prSet phldrT="[Text]" phldr="1"/>
+      <dgm:prSet phldrT="[Text]"/>
       <dgm:spPr/>
       <dgm:t>
         <a:bodyPr/>
         <a:lstStyle/>
         <a:p>
-          <a:endParaRPr lang="en-US"/>
+          <a:r>
+            <a:rPr lang="en-US" dirty="0" smtClean="0"/>
+            <a:t>Connectivity</a:t>
+          </a:r>
+          <a:endParaRPr lang="en-US" dirty="0"/>
         </a:p>
       </dgm:t>
     </dgm:pt>
@@ -1168,13 +1184,21 @@
       </dgm:t>
     </dgm:pt>
     <dgm:pt modelId="{759D36D9-278A-2E4E-8FC4-0096819949AD}">
-      <dgm:prSet phldrT="[Text]" phldr="1"/>
+      <dgm:prSet phldrT="[Text]"/>
       <dgm:spPr/>
       <dgm:t>
         <a:bodyPr/>
         <a:lstStyle/>
         <a:p>
-          <a:endParaRPr lang="en-US"/>
+          <a:r>
+            <a:rPr lang="en-US" dirty="0" smtClean="0"/>
+            <a:t>REST API’s with a client-server configuration</a:t>
+          </a:r>
+          <a:r>
+            <a:rPr lang="en-US" baseline="0" dirty="0" smtClean="0"/>
+            <a:t> keeps the Pebble modular and disposable</a:t>
+          </a:r>
+          <a:endParaRPr lang="en-US" dirty="0"/>
         </a:p>
       </dgm:t>
     </dgm:pt>
@@ -1201,13 +1225,21 @@
       </dgm:t>
     </dgm:pt>
     <dgm:pt modelId="{5860A622-D195-CA4A-BB52-36E0F3CB499B}">
-      <dgm:prSet phldrT="[Text]" phldr="1"/>
+      <dgm:prSet phldrT="[Text]"/>
       <dgm:spPr/>
       <dgm:t>
         <a:bodyPr/>
         <a:lstStyle/>
         <a:p>
-          <a:endParaRPr lang="en-US"/>
+          <a:r>
+            <a:rPr lang="en-US" dirty="0" smtClean="0"/>
+            <a:t>Users retrieve</a:t>
+          </a:r>
+          <a:r>
+            <a:rPr lang="en-US" baseline="0" dirty="0" smtClean="0"/>
+            <a:t> processed data from the server</a:t>
+          </a:r>
+          <a:endParaRPr lang="en-US" dirty="0"/>
         </a:p>
       </dgm:t>
     </dgm:pt>
@@ -1240,7 +1272,11 @@
         <a:bodyPr/>
         <a:lstStyle/>
         <a:p>
-          <a:endParaRPr lang="en-US"/>
+          <a:r>
+            <a:rPr lang="en-US" dirty="0" smtClean="0"/>
+            <a:t>Product</a:t>
+          </a:r>
+          <a:endParaRPr lang="en-US" dirty="0"/>
         </a:p>
       </dgm:t>
     </dgm:pt>
@@ -1266,6 +1302,98 @@
         </a:p>
       </dgm:t>
     </dgm:pt>
+    <dgm:pt modelId="{6E7EC735-6244-B949-966B-49092C801925}">
+      <dgm:prSet/>
+      <dgm:spPr/>
+      <dgm:t>
+        <a:bodyPr/>
+        <a:lstStyle/>
+        <a:p>
+          <a:r>
+            <a:rPr lang="en-US" dirty="0" smtClean="0"/>
+            <a:t>Array of sensors capture the environment around it</a:t>
+          </a:r>
+          <a:endParaRPr lang="en-US" dirty="0"/>
+        </a:p>
+      </dgm:t>
+    </dgm:pt>
+    <dgm:pt modelId="{1B8D070D-5FDE-1646-8D87-AE76CBB768E0}" type="parTrans" cxnId="{C6B80EA2-11AF-6B43-A01A-440300AAADA9}">
+      <dgm:prSet/>
+      <dgm:spPr/>
+    </dgm:pt>
+    <dgm:pt modelId="{7FC6D380-A937-1447-8F41-B347D5587508}" type="sibTrans" cxnId="{C6B80EA2-11AF-6B43-A01A-440300AAADA9}">
+      <dgm:prSet/>
+      <dgm:spPr/>
+    </dgm:pt>
+    <dgm:pt modelId="{52529E94-7FB0-D740-8A7A-6DF63043871B}">
+      <dgm:prSet/>
+      <dgm:spPr/>
+      <dgm:t>
+        <a:bodyPr/>
+        <a:lstStyle/>
+        <a:p>
+          <a:r>
+            <a:rPr lang="en-US" dirty="0" smtClean="0"/>
+            <a:t>Onboard embedded software written in easily maintainable Python</a:t>
+          </a:r>
+          <a:endParaRPr lang="en-US" dirty="0"/>
+        </a:p>
+      </dgm:t>
+    </dgm:pt>
+    <dgm:pt modelId="{C35A95CE-8866-8741-A928-B90AE5D42386}" type="parTrans" cxnId="{F3CC3662-33F6-0447-BCB9-69A2CB1AB488}">
+      <dgm:prSet/>
+      <dgm:spPr/>
+    </dgm:pt>
+    <dgm:pt modelId="{DF4564F9-BC6C-B24D-B0DA-8326CBF143F3}" type="sibTrans" cxnId="{F3CC3662-33F6-0447-BCB9-69A2CB1AB488}">
+      <dgm:prSet/>
+      <dgm:spPr/>
+    </dgm:pt>
+    <dgm:pt modelId="{B5C3A3F5-496F-A443-B620-8659E57E4960}">
+      <dgm:prSet/>
+      <dgm:spPr/>
+      <dgm:t>
+        <a:bodyPr/>
+        <a:lstStyle/>
+        <a:p>
+          <a:r>
+            <a:rPr lang="en-US" dirty="0" smtClean="0"/>
+            <a:t>Analytics</a:t>
+          </a:r>
+          <a:endParaRPr lang="en-US" dirty="0"/>
+        </a:p>
+      </dgm:t>
+    </dgm:pt>
+    <dgm:pt modelId="{A55E6679-F4EE-D74A-9632-1EC53DB9AABC}" type="parTrans" cxnId="{178AC7FF-6174-7C49-BA6B-AEFF171AAC8A}">
+      <dgm:prSet/>
+      <dgm:spPr/>
+    </dgm:pt>
+    <dgm:pt modelId="{4E81EF87-30B3-064B-9F13-5DAF0729DBF1}" type="sibTrans" cxnId="{178AC7FF-6174-7C49-BA6B-AEFF171AAC8A}">
+      <dgm:prSet/>
+      <dgm:spPr/>
+    </dgm:pt>
+    <dgm:pt modelId="{64CC150B-9811-5B4C-8B9A-A0C1C966787F}">
+      <dgm:prSet/>
+      <dgm:spPr/>
+      <dgm:t>
+        <a:bodyPr/>
+        <a:lstStyle/>
+        <a:p>
+          <a:r>
+            <a:rPr lang="en-US" dirty="0" smtClean="0"/>
+            <a:t>Crowdsourced anonymous data allow servers to tweak their algorithms autonomously.</a:t>
+          </a:r>
+          <a:endParaRPr lang="en-US" dirty="0"/>
+        </a:p>
+      </dgm:t>
+    </dgm:pt>
+    <dgm:pt modelId="{8A11EE79-DC05-364B-8A96-C2DA6786F52E}" type="parTrans" cxnId="{E81EC6B9-E460-334F-87C7-5B125806B4CE}">
+      <dgm:prSet/>
+      <dgm:spPr/>
+    </dgm:pt>
+    <dgm:pt modelId="{3D4FB06D-2405-4A4F-96A8-625815FB943C}" type="sibTrans" cxnId="{E81EC6B9-E460-334F-87C7-5B125806B4CE}">
+      <dgm:prSet/>
+      <dgm:spPr/>
+    </dgm:pt>
     <dgm:pt modelId="{A456EA5D-8518-B54B-AB06-0538D71E6ECE}" type="pres">
       <dgm:prSet presAssocID="{6398A917-0180-D447-B8D9-09D301527380}" presName="linearFlow" presStyleCnt="0">
         <dgm:presLayoutVars>
@@ -1288,7 +1416,7 @@
       <dgm:spPr/>
     </dgm:pt>
     <dgm:pt modelId="{B7107ED0-007D-5649-85B9-F2DAA01D8984}" type="pres">
-      <dgm:prSet presAssocID="{FB0BC376-0C42-3548-ACCF-269014E7C684}" presName="parentText" presStyleLbl="alignNode1" presStyleIdx="0" presStyleCnt="4">
+      <dgm:prSet presAssocID="{FB0BC376-0C42-3548-ACCF-269014E7C684}" presName="parentText" presStyleLbl="alignNode1" presStyleIdx="0" presStyleCnt="5">
         <dgm:presLayoutVars>
           <dgm:chMax val="1"/>
           <dgm:bulletEnabled val="1"/>
@@ -1304,7 +1432,7 @@
       </dgm:t>
     </dgm:pt>
     <dgm:pt modelId="{8011C9D7-3048-6140-AB27-1079EA91845B}" type="pres">
-      <dgm:prSet presAssocID="{FB0BC376-0C42-3548-ACCF-269014E7C684}" presName="descendantText" presStyleLbl="alignAcc1" presStyleIdx="0" presStyleCnt="4">
+      <dgm:prSet presAssocID="{FB0BC376-0C42-3548-ACCF-269014E7C684}" presName="descendantText" presStyleLbl="alignAcc1" presStyleIdx="0" presStyleCnt="5">
         <dgm:presLayoutVars>
           <dgm:bulletEnabled val="1"/>
         </dgm:presLayoutVars>
@@ -1327,7 +1455,7 @@
       <dgm:spPr/>
     </dgm:pt>
     <dgm:pt modelId="{254B58AE-43DA-7543-B4CB-861CF89358E7}" type="pres">
-      <dgm:prSet presAssocID="{14D62FFC-5626-664F-AC08-2223F78FA741}" presName="parentText" presStyleLbl="alignNode1" presStyleIdx="1" presStyleCnt="4">
+      <dgm:prSet presAssocID="{14D62FFC-5626-664F-AC08-2223F78FA741}" presName="parentText" presStyleLbl="alignNode1" presStyleIdx="1" presStyleCnt="5">
         <dgm:presLayoutVars>
           <dgm:chMax val="1"/>
           <dgm:bulletEnabled val="1"/>
@@ -1343,7 +1471,7 @@
       </dgm:t>
     </dgm:pt>
     <dgm:pt modelId="{B8ADEE56-7036-1B41-8A42-4EA2B2CD03B4}" type="pres">
-      <dgm:prSet presAssocID="{14D62FFC-5626-664F-AC08-2223F78FA741}" presName="descendantText" presStyleLbl="alignAcc1" presStyleIdx="1" presStyleCnt="4">
+      <dgm:prSet presAssocID="{14D62FFC-5626-664F-AC08-2223F78FA741}" presName="descendantText" presStyleLbl="alignAcc1" presStyleIdx="1" presStyleCnt="5">
         <dgm:presLayoutVars>
           <dgm:bulletEnabled val="1"/>
         </dgm:presLayoutVars>
@@ -1366,7 +1494,7 @@
       <dgm:spPr/>
     </dgm:pt>
     <dgm:pt modelId="{8AB332C1-6C3F-1640-B492-3BCE9176D3DC}" type="pres">
-      <dgm:prSet presAssocID="{977C1F06-E86A-6F46-AA35-8054AAF64531}" presName="parentText" presStyleLbl="alignNode1" presStyleIdx="2" presStyleCnt="4">
+      <dgm:prSet presAssocID="{977C1F06-E86A-6F46-AA35-8054AAF64531}" presName="parentText" presStyleLbl="alignNode1" presStyleIdx="2" presStyleCnt="5">
         <dgm:presLayoutVars>
           <dgm:chMax val="1"/>
           <dgm:bulletEnabled val="1"/>
@@ -1382,7 +1510,7 @@
       </dgm:t>
     </dgm:pt>
     <dgm:pt modelId="{C1270033-955B-9440-AB6D-D1C7A299F8F3}" type="pres">
-      <dgm:prSet presAssocID="{977C1F06-E86A-6F46-AA35-8054AAF64531}" presName="descendantText" presStyleLbl="alignAcc1" presStyleIdx="2" presStyleCnt="4">
+      <dgm:prSet presAssocID="{977C1F06-E86A-6F46-AA35-8054AAF64531}" presName="descendantText" presStyleLbl="alignAcc1" presStyleIdx="2" presStyleCnt="5">
         <dgm:presLayoutVars>
           <dgm:bulletEnabled val="1"/>
         </dgm:presLayoutVars>
@@ -1405,7 +1533,7 @@
       <dgm:spPr/>
     </dgm:pt>
     <dgm:pt modelId="{CBE0D47B-F51C-6945-999B-50928C2463B5}" type="pres">
-      <dgm:prSet presAssocID="{92F0D0A9-EB87-6945-BCE6-6DB3A72FD60B}" presName="parentText" presStyleLbl="alignNode1" presStyleIdx="3" presStyleCnt="4">
+      <dgm:prSet presAssocID="{92F0D0A9-EB87-6945-BCE6-6DB3A72FD60B}" presName="parentText" presStyleLbl="alignNode1" presStyleIdx="3" presStyleCnt="5">
         <dgm:presLayoutVars>
           <dgm:chMax val="1"/>
           <dgm:bulletEnabled val="1"/>
@@ -1421,36 +1549,90 @@
       </dgm:t>
     </dgm:pt>
     <dgm:pt modelId="{BBEEE3A0-CFAA-5146-AFD0-D60991A55050}" type="pres">
-      <dgm:prSet presAssocID="{92F0D0A9-EB87-6945-BCE6-6DB3A72FD60B}" presName="descendantText" presStyleLbl="alignAcc1" presStyleIdx="3" presStyleCnt="4">
+      <dgm:prSet presAssocID="{92F0D0A9-EB87-6945-BCE6-6DB3A72FD60B}" presName="descendantText" presStyleLbl="alignAcc1" presStyleIdx="3" presStyleCnt="5">
         <dgm:presLayoutVars>
           <dgm:bulletEnabled val="1"/>
         </dgm:presLayoutVars>
       </dgm:prSet>
       <dgm:spPr/>
+      <dgm:t>
+        <a:bodyPr/>
+        <a:lstStyle/>
+        <a:p>
+          <a:endParaRPr lang="en-US"/>
+        </a:p>
+      </dgm:t>
+    </dgm:pt>
+    <dgm:pt modelId="{5FC51C57-1256-D04B-B246-106E61732968}" type="pres">
+      <dgm:prSet presAssocID="{2F9D4AF6-5519-6C4B-8856-B251AFEEDF0D}" presName="sp" presStyleCnt="0"/>
+      <dgm:spPr/>
+    </dgm:pt>
+    <dgm:pt modelId="{A7DC1D63-4654-964D-A972-8EC17AE0DDF9}" type="pres">
+      <dgm:prSet presAssocID="{B5C3A3F5-496F-A443-B620-8659E57E4960}" presName="composite" presStyleCnt="0"/>
+      <dgm:spPr/>
+    </dgm:pt>
+    <dgm:pt modelId="{5C902887-AF36-2E4D-804B-381E2921CB7B}" type="pres">
+      <dgm:prSet presAssocID="{B5C3A3F5-496F-A443-B620-8659E57E4960}" presName="parentText" presStyleLbl="alignNode1" presStyleIdx="4" presStyleCnt="5">
+        <dgm:presLayoutVars>
+          <dgm:chMax val="1"/>
+          <dgm:bulletEnabled val="1"/>
+        </dgm:presLayoutVars>
+      </dgm:prSet>
+      <dgm:spPr/>
+      <dgm:t>
+        <a:bodyPr/>
+        <a:lstStyle/>
+        <a:p>
+          <a:endParaRPr lang="en-US"/>
+        </a:p>
+      </dgm:t>
+    </dgm:pt>
+    <dgm:pt modelId="{EA0975DF-4971-DF46-83A9-F12C69998F7F}" type="pres">
+      <dgm:prSet presAssocID="{B5C3A3F5-496F-A443-B620-8659E57E4960}" presName="descendantText" presStyleLbl="alignAcc1" presStyleIdx="4" presStyleCnt="5">
+        <dgm:presLayoutVars>
+          <dgm:bulletEnabled val="1"/>
+        </dgm:presLayoutVars>
+      </dgm:prSet>
+      <dgm:spPr/>
+      <dgm:t>
+        <a:bodyPr/>
+        <a:lstStyle/>
+        <a:p>
+          <a:endParaRPr lang="en-US"/>
+        </a:p>
+      </dgm:t>
     </dgm:pt>
   </dgm:ptLst>
   <dgm:cxnLst>
+    <dgm:cxn modelId="{C881D173-A773-1D42-B4D3-2BABF408AE48}" srcId="{14D62FFC-5626-664F-AC08-2223F78FA741}" destId="{472C6EC8-C86D-3142-A00B-B7AF9BD4A4E3}" srcOrd="0" destOrd="0" parTransId="{9E4BC3D5-8337-124D-850A-A7D372F79DC4}" sibTransId="{582852A4-DD9B-4B46-BD31-65C05CEE3C6B}"/>
+    <dgm:cxn modelId="{F3CC3662-33F6-0447-BCB9-69A2CB1AB488}" srcId="{92F0D0A9-EB87-6945-BCE6-6DB3A72FD60B}" destId="{52529E94-7FB0-D740-8A7A-6DF63043871B}" srcOrd="1" destOrd="0" parTransId="{C35A95CE-8866-8741-A928-B90AE5D42386}" sibTransId="{DF4564F9-BC6C-B24D-B0DA-8326CBF143F3}"/>
+    <dgm:cxn modelId="{D79C6C71-8184-7048-8C1A-CF2C4FDBDFC6}" type="presOf" srcId="{6E7EC735-6244-B949-966B-49092C801925}" destId="{BBEEE3A0-CFAA-5146-AFD0-D60991A55050}" srcOrd="0" destOrd="0" presId="urn:microsoft.com/office/officeart/2005/8/layout/chevron2"/>
+    <dgm:cxn modelId="{7C466CB8-8D4B-CA49-8FB0-D40B2E2CD65B}" type="presOf" srcId="{472C6EC8-C86D-3142-A00B-B7AF9BD4A4E3}" destId="{B8ADEE56-7036-1B41-8A42-4EA2B2CD03B4}" srcOrd="0" destOrd="0" presId="urn:microsoft.com/office/officeart/2005/8/layout/chevron2"/>
+    <dgm:cxn modelId="{E6060930-EB1D-B240-80AA-4E79C1E7413F}" srcId="{FB0BC376-0C42-3548-ACCF-269014E7C684}" destId="{F0B2BA1C-6DB4-614D-9F14-FAB31CA2AFD5}" srcOrd="0" destOrd="0" parTransId="{46C440E7-02CA-A74C-98EE-FB7E48A06BFD}" sibTransId="{AFC9B692-BE2D-1741-AFC4-05418E43496F}"/>
+    <dgm:cxn modelId="{BD0A8894-4600-DE40-98B9-5854A08009E7}" type="presOf" srcId="{92F0D0A9-EB87-6945-BCE6-6DB3A72FD60B}" destId="{CBE0D47B-F51C-6945-999B-50928C2463B5}" srcOrd="0" destOrd="0" presId="urn:microsoft.com/office/officeart/2005/8/layout/chevron2"/>
+    <dgm:cxn modelId="{2EE40358-01AF-784A-B804-48C650D6039F}" srcId="{14D62FFC-5626-664F-AC08-2223F78FA741}" destId="{EAC71CA8-AF13-F04D-B88F-F11046F0D062}" srcOrd="1" destOrd="0" parTransId="{E05C4918-F999-BC41-8EC8-6F05D1AB3B90}" sibTransId="{939E14B5-6D0C-EF47-943C-3E2100E82AE2}"/>
+    <dgm:cxn modelId="{C6B80EA2-11AF-6B43-A01A-440300AAADA9}" srcId="{92F0D0A9-EB87-6945-BCE6-6DB3A72FD60B}" destId="{6E7EC735-6244-B949-966B-49092C801925}" srcOrd="0" destOrd="0" parTransId="{1B8D070D-5FDE-1646-8D87-AE76CBB768E0}" sibTransId="{7FC6D380-A937-1447-8F41-B347D5587508}"/>
+    <dgm:cxn modelId="{4B92C261-B8D2-E949-8C59-F5AC49339B00}" type="presOf" srcId="{BC72EE67-6690-FF4E-B9A6-715DDE1ED2FD}" destId="{8011C9D7-3048-6140-AB27-1079EA91845B}" srcOrd="0" destOrd="1" presId="urn:microsoft.com/office/officeart/2005/8/layout/chevron2"/>
+    <dgm:cxn modelId="{E81EC6B9-E460-334F-87C7-5B125806B4CE}" srcId="{B5C3A3F5-496F-A443-B620-8659E57E4960}" destId="{64CC150B-9811-5B4C-8B9A-A0C1C966787F}" srcOrd="0" destOrd="0" parTransId="{8A11EE79-DC05-364B-8A96-C2DA6786F52E}" sibTransId="{3D4FB06D-2405-4A4F-96A8-625815FB943C}"/>
+    <dgm:cxn modelId="{7E09DA8D-EC32-5E4F-951F-8B898E392EC5}" type="presOf" srcId="{52529E94-7FB0-D740-8A7A-6DF63043871B}" destId="{BBEEE3A0-CFAA-5146-AFD0-D60991A55050}" srcOrd="0" destOrd="1" presId="urn:microsoft.com/office/officeart/2005/8/layout/chevron2"/>
+    <dgm:cxn modelId="{85767EAB-4AFE-2541-8D67-8CFC9CCED076}" srcId="{6398A917-0180-D447-B8D9-09D301527380}" destId="{FB0BC376-0C42-3548-ACCF-269014E7C684}" srcOrd="0" destOrd="0" parTransId="{ADBAEFDA-6E69-7345-9D69-5BD9FDDF8C96}" sibTransId="{2952B97B-E9F1-D845-A2C8-0BA85328EE3D}"/>
+    <dgm:cxn modelId="{3EC3BBE5-4E72-3D45-BD92-4ECD5682B7F7}" srcId="{977C1F06-E86A-6F46-AA35-8054AAF64531}" destId="{759D36D9-278A-2E4E-8FC4-0096819949AD}" srcOrd="0" destOrd="0" parTransId="{BA7B68C5-7224-0F4E-84CA-7A7D274A8545}" sibTransId="{2BD8C27E-430D-854F-8BF6-95BE0D679F59}"/>
+    <dgm:cxn modelId="{22EAB0E2-F7E8-D940-9122-D4B7520D9CC8}" srcId="{FB0BC376-0C42-3548-ACCF-269014E7C684}" destId="{BC72EE67-6690-FF4E-B9A6-715DDE1ED2FD}" srcOrd="1" destOrd="0" parTransId="{B60837CA-FFDC-2446-8B7C-7A4B9A10EEEC}" sibTransId="{A327B8CA-AB27-8C42-8639-913D4B58E346}"/>
+    <dgm:cxn modelId="{9A4445D5-CAFF-CB4E-82BA-C36B2CBC02CF}" srcId="{6398A917-0180-D447-B8D9-09D301527380}" destId="{92F0D0A9-EB87-6945-BCE6-6DB3A72FD60B}" srcOrd="3" destOrd="0" parTransId="{FAFC803B-3820-AC40-882D-CBCB2B698D9A}" sibTransId="{2F9D4AF6-5519-6C4B-8856-B251AFEEDF0D}"/>
+    <dgm:cxn modelId="{84DACDA2-97EB-564C-9684-5F938CF2F596}" type="presOf" srcId="{6398A917-0180-D447-B8D9-09D301527380}" destId="{A456EA5D-8518-B54B-AB06-0538D71E6ECE}" srcOrd="0" destOrd="0" presId="urn:microsoft.com/office/officeart/2005/8/layout/chevron2"/>
+    <dgm:cxn modelId="{AFE9A60B-1E3B-764F-B204-404A1CE19D3A}" type="presOf" srcId="{FB0BC376-0C42-3548-ACCF-269014E7C684}" destId="{B7107ED0-007D-5649-85B9-F2DAA01D8984}" srcOrd="0" destOrd="0" presId="urn:microsoft.com/office/officeart/2005/8/layout/chevron2"/>
+    <dgm:cxn modelId="{07906526-94FC-3C42-A1A5-2E43381CB50E}" type="presOf" srcId="{64CC150B-9811-5B4C-8B9A-A0C1C966787F}" destId="{EA0975DF-4971-DF46-83A9-F12C69998F7F}" srcOrd="0" destOrd="0" presId="urn:microsoft.com/office/officeart/2005/8/layout/chevron2"/>
+    <dgm:cxn modelId="{91F7BA45-89D7-414F-8F0C-F1E1BE94A361}" srcId="{6398A917-0180-D447-B8D9-09D301527380}" destId="{977C1F06-E86A-6F46-AA35-8054AAF64531}" srcOrd="2" destOrd="0" parTransId="{662C0A71-D070-AF4E-9F03-A6464027CBAB}" sibTransId="{19E89CD2-5991-594F-AA3D-1DBB1D4A7705}"/>
+    <dgm:cxn modelId="{923DEAD7-83FD-5D49-8DE3-284EAF19DE21}" type="presOf" srcId="{B5C3A3F5-496F-A443-B620-8659E57E4960}" destId="{5C902887-AF36-2E4D-804B-381E2921CB7B}" srcOrd="0" destOrd="0" presId="urn:microsoft.com/office/officeart/2005/8/layout/chevron2"/>
+    <dgm:cxn modelId="{41D99B22-DA74-D541-9819-7A921B9EE12C}" type="presOf" srcId="{EAC71CA8-AF13-F04D-B88F-F11046F0D062}" destId="{B8ADEE56-7036-1B41-8A42-4EA2B2CD03B4}" srcOrd="0" destOrd="1" presId="urn:microsoft.com/office/officeart/2005/8/layout/chevron2"/>
+    <dgm:cxn modelId="{DCA7FE07-EDFE-6A4B-94B0-451C99DB856B}" type="presOf" srcId="{759D36D9-278A-2E4E-8FC4-0096819949AD}" destId="{C1270033-955B-9440-AB6D-D1C7A299F8F3}" srcOrd="0" destOrd="0" presId="urn:microsoft.com/office/officeart/2005/8/layout/chevron2"/>
+    <dgm:cxn modelId="{178AC7FF-6174-7C49-BA6B-AEFF171AAC8A}" srcId="{6398A917-0180-D447-B8D9-09D301527380}" destId="{B5C3A3F5-496F-A443-B620-8659E57E4960}" srcOrd="4" destOrd="0" parTransId="{A55E6679-F4EE-D74A-9632-1EC53DB9AABC}" sibTransId="{4E81EF87-30B3-064B-9F13-5DAF0729DBF1}"/>
     <dgm:cxn modelId="{7E79F74F-6937-0247-ACE0-7ADA258B4179}" srcId="{6398A917-0180-D447-B8D9-09D301527380}" destId="{14D62FFC-5626-664F-AC08-2223F78FA741}" srcOrd="1" destOrd="0" parTransId="{565394EA-B597-F348-9AD1-5926806B0409}" sibTransId="{EF1289E6-D893-F548-88D9-69BBB2896F39}"/>
+    <dgm:cxn modelId="{BA7A07AB-2976-F347-9A23-C4C7EC8CDFFF}" type="presOf" srcId="{14D62FFC-5626-664F-AC08-2223F78FA741}" destId="{254B58AE-43DA-7543-B4CB-861CF89358E7}" srcOrd="0" destOrd="0" presId="urn:microsoft.com/office/officeart/2005/8/layout/chevron2"/>
+    <dgm:cxn modelId="{C8AD120B-B1B4-254B-8642-72A165527335}" type="presOf" srcId="{5860A622-D195-CA4A-BB52-36E0F3CB499B}" destId="{C1270033-955B-9440-AB6D-D1C7A299F8F3}" srcOrd="0" destOrd="1" presId="urn:microsoft.com/office/officeart/2005/8/layout/chevron2"/>
+    <dgm:cxn modelId="{F40C25FE-1425-4942-8D99-7B7CD21BC7DB}" type="presOf" srcId="{977C1F06-E86A-6F46-AA35-8054AAF64531}" destId="{8AB332C1-6C3F-1640-B492-3BCE9176D3DC}" srcOrd="0" destOrd="0" presId="urn:microsoft.com/office/officeart/2005/8/layout/chevron2"/>
+    <dgm:cxn modelId="{4C06E583-114D-AB4B-A095-41051C24ED60}" type="presOf" srcId="{F0B2BA1C-6DB4-614D-9F14-FAB31CA2AFD5}" destId="{8011C9D7-3048-6140-AB27-1079EA91845B}" srcOrd="0" destOrd="0" presId="urn:microsoft.com/office/officeart/2005/8/layout/chevron2"/>
     <dgm:cxn modelId="{2F581BAD-00C2-824F-9EB4-7951A10C4622}" srcId="{977C1F06-E86A-6F46-AA35-8054AAF64531}" destId="{5860A622-D195-CA4A-BB52-36E0F3CB499B}" srcOrd="1" destOrd="0" parTransId="{E96D4D2C-790F-1147-BDCC-948C215F6381}" sibTransId="{B32C69CA-6784-0E44-A681-4D885D48FADB}"/>
-    <dgm:cxn modelId="{3EC3BBE5-4E72-3D45-BD92-4ECD5682B7F7}" srcId="{977C1F06-E86A-6F46-AA35-8054AAF64531}" destId="{759D36D9-278A-2E4E-8FC4-0096819949AD}" srcOrd="0" destOrd="0" parTransId="{BA7B68C5-7224-0F4E-84CA-7A7D274A8545}" sibTransId="{2BD8C27E-430D-854F-8BF6-95BE0D679F59}"/>
-    <dgm:cxn modelId="{C8AD120B-B1B4-254B-8642-72A165527335}" type="presOf" srcId="{5860A622-D195-CA4A-BB52-36E0F3CB499B}" destId="{C1270033-955B-9440-AB6D-D1C7A299F8F3}" srcOrd="0" destOrd="1" presId="urn:microsoft.com/office/officeart/2005/8/layout/chevron2"/>
-    <dgm:cxn modelId="{85767EAB-4AFE-2541-8D67-8CFC9CCED076}" srcId="{6398A917-0180-D447-B8D9-09D301527380}" destId="{FB0BC376-0C42-3548-ACCF-269014E7C684}" srcOrd="0" destOrd="0" parTransId="{ADBAEFDA-6E69-7345-9D69-5BD9FDDF8C96}" sibTransId="{2952B97B-E9F1-D845-A2C8-0BA85328EE3D}"/>
-    <dgm:cxn modelId="{BA7A07AB-2976-F347-9A23-C4C7EC8CDFFF}" type="presOf" srcId="{14D62FFC-5626-664F-AC08-2223F78FA741}" destId="{254B58AE-43DA-7543-B4CB-861CF89358E7}" srcOrd="0" destOrd="0" presId="urn:microsoft.com/office/officeart/2005/8/layout/chevron2"/>
-    <dgm:cxn modelId="{9A4445D5-CAFF-CB4E-82BA-C36B2CBC02CF}" srcId="{6398A917-0180-D447-B8D9-09D301527380}" destId="{92F0D0A9-EB87-6945-BCE6-6DB3A72FD60B}" srcOrd="3" destOrd="0" parTransId="{FAFC803B-3820-AC40-882D-CBCB2B698D9A}" sibTransId="{2F9D4AF6-5519-6C4B-8856-B251AFEEDF0D}"/>
-    <dgm:cxn modelId="{E6060930-EB1D-B240-80AA-4E79C1E7413F}" srcId="{FB0BC376-0C42-3548-ACCF-269014E7C684}" destId="{F0B2BA1C-6DB4-614D-9F14-FAB31CA2AFD5}" srcOrd="0" destOrd="0" parTransId="{46C440E7-02CA-A74C-98EE-FB7E48A06BFD}" sibTransId="{AFC9B692-BE2D-1741-AFC4-05418E43496F}"/>
-    <dgm:cxn modelId="{22EAB0E2-F7E8-D940-9122-D4B7520D9CC8}" srcId="{FB0BC376-0C42-3548-ACCF-269014E7C684}" destId="{BC72EE67-6690-FF4E-B9A6-715DDE1ED2FD}" srcOrd="1" destOrd="0" parTransId="{B60837CA-FFDC-2446-8B7C-7A4B9A10EEEC}" sibTransId="{A327B8CA-AB27-8C42-8639-913D4B58E346}"/>
-    <dgm:cxn modelId="{2EE40358-01AF-784A-B804-48C650D6039F}" srcId="{14D62FFC-5626-664F-AC08-2223F78FA741}" destId="{EAC71CA8-AF13-F04D-B88F-F11046F0D062}" srcOrd="1" destOrd="0" parTransId="{E05C4918-F999-BC41-8EC8-6F05D1AB3B90}" sibTransId="{939E14B5-6D0C-EF47-943C-3E2100E82AE2}"/>
-    <dgm:cxn modelId="{AFE9A60B-1E3B-764F-B204-404A1CE19D3A}" type="presOf" srcId="{FB0BC376-0C42-3548-ACCF-269014E7C684}" destId="{B7107ED0-007D-5649-85B9-F2DAA01D8984}" srcOrd="0" destOrd="0" presId="urn:microsoft.com/office/officeart/2005/8/layout/chevron2"/>
-    <dgm:cxn modelId="{41D99B22-DA74-D541-9819-7A921B9EE12C}" type="presOf" srcId="{EAC71CA8-AF13-F04D-B88F-F11046F0D062}" destId="{B8ADEE56-7036-1B41-8A42-4EA2B2CD03B4}" srcOrd="0" destOrd="1" presId="urn:microsoft.com/office/officeart/2005/8/layout/chevron2"/>
-    <dgm:cxn modelId="{7C466CB8-8D4B-CA49-8FB0-D40B2E2CD65B}" type="presOf" srcId="{472C6EC8-C86D-3142-A00B-B7AF9BD4A4E3}" destId="{B8ADEE56-7036-1B41-8A42-4EA2B2CD03B4}" srcOrd="0" destOrd="0" presId="urn:microsoft.com/office/officeart/2005/8/layout/chevron2"/>
-    <dgm:cxn modelId="{C881D173-A773-1D42-B4D3-2BABF408AE48}" srcId="{14D62FFC-5626-664F-AC08-2223F78FA741}" destId="{472C6EC8-C86D-3142-A00B-B7AF9BD4A4E3}" srcOrd="0" destOrd="0" parTransId="{9E4BC3D5-8337-124D-850A-A7D372F79DC4}" sibTransId="{582852A4-DD9B-4B46-BD31-65C05CEE3C6B}"/>
-    <dgm:cxn modelId="{4C06E583-114D-AB4B-A095-41051C24ED60}" type="presOf" srcId="{F0B2BA1C-6DB4-614D-9F14-FAB31CA2AFD5}" destId="{8011C9D7-3048-6140-AB27-1079EA91845B}" srcOrd="0" destOrd="0" presId="urn:microsoft.com/office/officeart/2005/8/layout/chevron2"/>
-    <dgm:cxn modelId="{4B92C261-B8D2-E949-8C59-F5AC49339B00}" type="presOf" srcId="{BC72EE67-6690-FF4E-B9A6-715DDE1ED2FD}" destId="{8011C9D7-3048-6140-AB27-1079EA91845B}" srcOrd="0" destOrd="1" presId="urn:microsoft.com/office/officeart/2005/8/layout/chevron2"/>
-    <dgm:cxn modelId="{BD0A8894-4600-DE40-98B9-5854A08009E7}" type="presOf" srcId="{92F0D0A9-EB87-6945-BCE6-6DB3A72FD60B}" destId="{CBE0D47B-F51C-6945-999B-50928C2463B5}" srcOrd="0" destOrd="0" presId="urn:microsoft.com/office/officeart/2005/8/layout/chevron2"/>
-    <dgm:cxn modelId="{F40C25FE-1425-4942-8D99-7B7CD21BC7DB}" type="presOf" srcId="{977C1F06-E86A-6F46-AA35-8054AAF64531}" destId="{8AB332C1-6C3F-1640-B492-3BCE9176D3DC}" srcOrd="0" destOrd="0" presId="urn:microsoft.com/office/officeart/2005/8/layout/chevron2"/>
-    <dgm:cxn modelId="{91F7BA45-89D7-414F-8F0C-F1E1BE94A361}" srcId="{6398A917-0180-D447-B8D9-09D301527380}" destId="{977C1F06-E86A-6F46-AA35-8054AAF64531}" srcOrd="2" destOrd="0" parTransId="{662C0A71-D070-AF4E-9F03-A6464027CBAB}" sibTransId="{19E89CD2-5991-594F-AA3D-1DBB1D4A7705}"/>
-    <dgm:cxn modelId="{DCA7FE07-EDFE-6A4B-94B0-451C99DB856B}" type="presOf" srcId="{759D36D9-278A-2E4E-8FC4-0096819949AD}" destId="{C1270033-955B-9440-AB6D-D1C7A299F8F3}" srcOrd="0" destOrd="0" presId="urn:microsoft.com/office/officeart/2005/8/layout/chevron2"/>
-    <dgm:cxn modelId="{84DACDA2-97EB-564C-9684-5F938CF2F596}" type="presOf" srcId="{6398A917-0180-D447-B8D9-09D301527380}" destId="{A456EA5D-8518-B54B-AB06-0538D71E6ECE}" srcOrd="0" destOrd="0" presId="urn:microsoft.com/office/officeart/2005/8/layout/chevron2"/>
     <dgm:cxn modelId="{757B10D8-BF2C-D645-A1B5-DE5B6FA7ABF0}" type="presParOf" srcId="{A456EA5D-8518-B54B-AB06-0538D71E6ECE}" destId="{478CBB8E-C7B4-784A-83E3-3B3C65AA0E28}" srcOrd="0" destOrd="0" presId="urn:microsoft.com/office/officeart/2005/8/layout/chevron2"/>
     <dgm:cxn modelId="{4F7FAA59-A5B9-C246-B061-06DAB76F17CA}" type="presParOf" srcId="{478CBB8E-C7B4-784A-83E3-3B3C65AA0E28}" destId="{B7107ED0-007D-5649-85B9-F2DAA01D8984}" srcOrd="0" destOrd="0" presId="urn:microsoft.com/office/officeart/2005/8/layout/chevron2"/>
     <dgm:cxn modelId="{32E6F148-2F22-1047-8194-9A2D9E801AA3}" type="presParOf" srcId="{478CBB8E-C7B4-784A-83E3-3B3C65AA0E28}" destId="{8011C9D7-3048-6140-AB27-1079EA91845B}" srcOrd="1" destOrd="0" presId="urn:microsoft.com/office/officeart/2005/8/layout/chevron2"/>
@@ -1466,6 +1648,10 @@
     <dgm:cxn modelId="{1931FE8B-C9AE-654A-B35F-5F6790EC953A}" type="presParOf" srcId="{A456EA5D-8518-B54B-AB06-0538D71E6ECE}" destId="{517D8E99-E325-EC44-9243-C827435BEF24}" srcOrd="6" destOrd="0" presId="urn:microsoft.com/office/officeart/2005/8/layout/chevron2"/>
     <dgm:cxn modelId="{56AE2474-1D5D-7647-8F44-386A65009588}" type="presParOf" srcId="{517D8E99-E325-EC44-9243-C827435BEF24}" destId="{CBE0D47B-F51C-6945-999B-50928C2463B5}" srcOrd="0" destOrd="0" presId="urn:microsoft.com/office/officeart/2005/8/layout/chevron2"/>
     <dgm:cxn modelId="{0A8E59AD-4CA2-414E-B80A-0D786713A79F}" type="presParOf" srcId="{517D8E99-E325-EC44-9243-C827435BEF24}" destId="{BBEEE3A0-CFAA-5146-AFD0-D60991A55050}" srcOrd="1" destOrd="0" presId="urn:microsoft.com/office/officeart/2005/8/layout/chevron2"/>
+    <dgm:cxn modelId="{4321698E-507D-614F-BA25-DFB4ED174822}" type="presParOf" srcId="{A456EA5D-8518-B54B-AB06-0538D71E6ECE}" destId="{5FC51C57-1256-D04B-B246-106E61732968}" srcOrd="7" destOrd="0" presId="urn:microsoft.com/office/officeart/2005/8/layout/chevron2"/>
+    <dgm:cxn modelId="{93D908AF-BC69-C543-AE3F-156D96F23954}" type="presParOf" srcId="{A456EA5D-8518-B54B-AB06-0538D71E6ECE}" destId="{A7DC1D63-4654-964D-A972-8EC17AE0DDF9}" srcOrd="8" destOrd="0" presId="urn:microsoft.com/office/officeart/2005/8/layout/chevron2"/>
+    <dgm:cxn modelId="{57AF6ADA-798C-974A-8465-8BF697FBDE79}" type="presParOf" srcId="{A7DC1D63-4654-964D-A972-8EC17AE0DDF9}" destId="{5C902887-AF36-2E4D-804B-381E2921CB7B}" srcOrd="0" destOrd="0" presId="urn:microsoft.com/office/officeart/2005/8/layout/chevron2"/>
+    <dgm:cxn modelId="{DC36E490-0707-1842-9A86-97A1AE524EFE}" type="presParOf" srcId="{A7DC1D63-4654-964D-A972-8EC17AE0DDF9}" destId="{EA0975DF-4971-DF46-83A9-F12C69998F7F}" srcOrd="1" destOrd="0" presId="urn:microsoft.com/office/officeart/2005/8/layout/chevron2"/>
   </dgm:cxnLst>
   <dgm:bg/>
   <dgm:whole/>
@@ -1492,8 +1678,8 @@
       </dsp:nvSpPr>
       <dsp:spPr>
         <a:xfrm rot="5400000">
-          <a:off x="-141430" y="142967"/>
-          <a:ext cx="942872" cy="660010"/>
+          <a:off x="-114213" y="115454"/>
+          <a:ext cx="761426" cy="532998"/>
         </a:xfrm>
         <a:prstGeom prst="chevron">
           <a:avLst/>
@@ -1557,12 +1743,12 @@
         </a:fontRef>
       </dsp:style>
       <dsp:txBody>
-        <a:bodyPr spcFirstLastPara="0" vert="horz" wrap="square" lIns="6350" tIns="6350" rIns="6350" bIns="6350" numCol="1" spcCol="1270" anchor="ctr" anchorCtr="0">
+        <a:bodyPr spcFirstLastPara="0" vert="horz" wrap="square" lIns="5080" tIns="5080" rIns="5080" bIns="5080" numCol="1" spcCol="1270" anchor="ctr" anchorCtr="0">
           <a:noAutofit/>
         </a:bodyPr>
         <a:lstStyle/>
         <a:p>
-          <a:pPr lvl="0" algn="ctr" defTabSz="444500">
+          <a:pPr lvl="0" algn="ctr" defTabSz="355600">
             <a:lnSpc>
               <a:spcPct val="90000"/>
             </a:lnSpc>
@@ -1574,15 +1760,15 @@
             </a:spcAft>
           </a:pPr>
           <a:r>
-            <a:rPr lang="en-US" sz="1000" kern="1200" dirty="0" smtClean="0"/>
+            <a:rPr lang="en-US" sz="800" kern="1200" dirty="0" smtClean="0"/>
             <a:t>Security</a:t>
           </a:r>
-          <a:endParaRPr lang="en-US" sz="1000" kern="1200" dirty="0"/>
+          <a:endParaRPr lang="en-US" sz="800" kern="1200" dirty="0"/>
         </a:p>
       </dsp:txBody>
       <dsp:txXfrm rot="-5400000">
-        <a:off x="1" y="331541"/>
-        <a:ext cx="660010" cy="282862"/>
+        <a:off x="1" y="267739"/>
+        <a:ext cx="532998" cy="228428"/>
       </dsp:txXfrm>
     </dsp:sp>
     <dsp:sp modelId="{8011C9D7-3048-6140-AB27-1079EA91845B}">
@@ -1592,8 +1778,8 @@
       </dsp:nvSpPr>
       <dsp:spPr>
         <a:xfrm rot="5400000">
-          <a:off x="4824171" y="-4162624"/>
-          <a:ext cx="612867" cy="8941189"/>
+          <a:off x="4819635" y="-4285396"/>
+          <a:ext cx="494927" cy="9068201"/>
         </a:xfrm>
         <a:prstGeom prst="round2SameRect">
           <a:avLst/>
@@ -1633,7 +1819,7 @@
         <a:fontRef idx="minor"/>
       </dsp:style>
       <dsp:txBody>
-        <a:bodyPr spcFirstLastPara="0" vert="horz" wrap="square" lIns="128016" tIns="11430" rIns="11430" bIns="11430" numCol="1" spcCol="1270" anchor="ctr" anchorCtr="0">
+        <a:bodyPr spcFirstLastPara="0" vert="horz" wrap="square" lIns="106680" tIns="9525" rIns="9525" bIns="9525" numCol="1" spcCol="1270" anchor="ctr" anchorCtr="0">
           <a:noAutofit/>
         </a:bodyPr>
         <a:lstStyle/>
@@ -1656,14 +1842,14 @@
             <a:defRPr/>
           </a:pPr>
           <a:r>
-            <a:rPr lang="en-US" sz="1800" kern="1200" dirty="0" smtClean="0"/>
+            <a:rPr lang="en-US" sz="1500" kern="1200" dirty="0" smtClean="0"/>
             <a:t>Connected</a:t>
           </a:r>
           <a:r>
-            <a:rPr lang="en-US" sz="1800" kern="1200" baseline="0" dirty="0" smtClean="0"/>
-            <a:t> via LE Bluetooth with security</a:t>
+            <a:rPr lang="en-US" sz="1500" kern="1200" baseline="0" dirty="0" smtClean="0"/>
+            <a:t> via WLAN with WPA2 security</a:t>
           </a:r>
-          <a:endParaRPr lang="en-US" sz="1800" kern="1200" dirty="0"/>
+          <a:endParaRPr lang="en-US" sz="1500" kern="1200" dirty="0"/>
         </a:p>
         <a:p>
           <a:pPr marL="228600" lvl="1" indent="0" algn="l" defTabSz="1066800">
@@ -1679,19 +1865,23 @@
             <a:buChar char="••"/>
           </a:pPr>
           <a:r>
-            <a:rPr lang="en-US" sz="1800" kern="1200" dirty="0" smtClean="0"/>
-            <a:t> Generates</a:t>
+            <a:rPr lang="en-US" sz="1500" kern="1200" dirty="0" smtClean="0"/>
+            <a:t> Generates </a:t>
           </a:r>
           <a:r>
-            <a:rPr lang="en-US" sz="1800" kern="1200" baseline="0" dirty="0" smtClean="0"/>
+            <a:rPr lang="en-US" sz="1500" kern="1200" dirty="0" smtClean="0"/>
+            <a:t>an internal</a:t>
+          </a:r>
+          <a:r>
+            <a:rPr lang="en-US" sz="1500" kern="1200" baseline="0" dirty="0" smtClean="0"/>
             <a:t> OTP to connect to central server</a:t>
           </a:r>
-          <a:endParaRPr lang="en-US" sz="1800" kern="1200" dirty="0"/>
+          <a:endParaRPr lang="en-US" sz="1500" kern="1200" dirty="0"/>
         </a:p>
       </dsp:txBody>
       <dsp:txXfrm rot="-5400000">
-        <a:off x="660010" y="31455"/>
-        <a:ext cx="8911271" cy="553031"/>
+        <a:off x="532998" y="25401"/>
+        <a:ext cx="9044041" cy="446607"/>
       </dsp:txXfrm>
     </dsp:sp>
     <dsp:sp modelId="{254B58AE-43DA-7543-B4CB-861CF89358E7}">
@@ -1701,8 +1891,8 @@
       </dsp:nvSpPr>
       <dsp:spPr>
         <a:xfrm rot="5400000">
-          <a:off x="-141430" y="933610"/>
-          <a:ext cx="942872" cy="660010"/>
+          <a:off x="-114213" y="753946"/>
+          <a:ext cx="761426" cy="532998"/>
         </a:xfrm>
         <a:prstGeom prst="chevron">
           <a:avLst/>
@@ -1766,12 +1956,12 @@
         </a:fontRef>
       </dsp:style>
       <dsp:txBody>
-        <a:bodyPr spcFirstLastPara="0" vert="horz" wrap="square" lIns="6350" tIns="6350" rIns="6350" bIns="6350" numCol="1" spcCol="1270" anchor="ctr" anchorCtr="0">
+        <a:bodyPr spcFirstLastPara="0" vert="horz" wrap="square" lIns="5080" tIns="5080" rIns="5080" bIns="5080" numCol="1" spcCol="1270" anchor="ctr" anchorCtr="0">
           <a:noAutofit/>
         </a:bodyPr>
         <a:lstStyle/>
         <a:p>
-          <a:pPr lvl="0" algn="ctr" defTabSz="444500">
+          <a:pPr lvl="0" algn="ctr" defTabSz="355600">
             <a:lnSpc>
               <a:spcPct val="90000"/>
             </a:lnSpc>
@@ -1783,15 +1973,15 @@
             </a:spcAft>
           </a:pPr>
           <a:r>
-            <a:rPr lang="en-US" sz="1000" kern="1200" dirty="0" smtClean="0"/>
+            <a:rPr lang="en-US" sz="800" kern="1200" dirty="0" smtClean="0"/>
             <a:t>Product Cloud</a:t>
           </a:r>
-          <a:endParaRPr lang="en-US" sz="1000" kern="1200" dirty="0"/>
+          <a:endParaRPr lang="en-US" sz="800" kern="1200" dirty="0"/>
         </a:p>
       </dsp:txBody>
       <dsp:txXfrm rot="-5400000">
-        <a:off x="1" y="1122184"/>
-        <a:ext cx="660010" cy="282862"/>
+        <a:off x="1" y="906231"/>
+        <a:ext cx="532998" cy="228428"/>
       </dsp:txXfrm>
     </dsp:sp>
     <dsp:sp modelId="{B8ADEE56-7036-1B41-8A42-4EA2B2CD03B4}">
@@ -1801,8 +1991,8 @@
       </dsp:nvSpPr>
       <dsp:spPr>
         <a:xfrm rot="5400000">
-          <a:off x="4824171" y="-3371981"/>
-          <a:ext cx="612867" cy="8941189"/>
+          <a:off x="4819635" y="-3646904"/>
+          <a:ext cx="494927" cy="9068201"/>
         </a:xfrm>
         <a:prstGeom prst="round2SameRect">
           <a:avLst/>
@@ -1842,12 +2032,12 @@
         <a:fontRef idx="minor"/>
       </dsp:style>
       <dsp:txBody>
-        <a:bodyPr spcFirstLastPara="0" vert="horz" wrap="square" lIns="128016" tIns="11430" rIns="11430" bIns="11430" numCol="1" spcCol="1270" anchor="ctr" anchorCtr="0">
+        <a:bodyPr spcFirstLastPara="0" vert="horz" wrap="square" lIns="106680" tIns="9525" rIns="9525" bIns="9525" numCol="1" spcCol="1270" anchor="ctr" anchorCtr="0">
           <a:noAutofit/>
         </a:bodyPr>
         <a:lstStyle/>
         <a:p>
-          <a:pPr marL="171450" lvl="1" indent="-171450" algn="l" defTabSz="800100">
+          <a:pPr marL="114300" lvl="1" indent="-114300" algn="l" defTabSz="666750">
             <a:lnSpc>
               <a:spcPct val="90000"/>
             </a:lnSpc>
@@ -1860,13 +2050,13 @@
             <a:buChar char="••"/>
           </a:pPr>
           <a:r>
-            <a:rPr lang="en-US" sz="1800" kern="1200" dirty="0" smtClean="0"/>
+            <a:rPr lang="en-US" sz="1500" kern="1200" dirty="0" smtClean="0"/>
             <a:t>App platform that supports iOS, Android.</a:t>
           </a:r>
-          <a:endParaRPr lang="en-US" sz="1800" kern="1200" dirty="0"/>
+          <a:endParaRPr lang="en-US" sz="1500" kern="1200" dirty="0"/>
         </a:p>
         <a:p>
-          <a:pPr marL="171450" lvl="1" indent="-171450" algn="l" defTabSz="800100">
+          <a:pPr marL="114300" lvl="1" indent="-114300" algn="l" defTabSz="666750">
             <a:lnSpc>
               <a:spcPct val="90000"/>
             </a:lnSpc>
@@ -1878,12 +2068,20 @@
             </a:spcAft>
             <a:buChar char="••"/>
           </a:pPr>
-          <a:endParaRPr lang="en-US" sz="1800" kern="1200" dirty="0"/>
+          <a:r>
+            <a:rPr lang="en-US" sz="1500" kern="1200" smtClean="0"/>
+            <a:t>Pebble </a:t>
+          </a:r>
+          <a:r>
+            <a:rPr lang="en-US" sz="1500" kern="1200" baseline="0" smtClean="0"/>
+            <a:t>gets localized weather info via the server.</a:t>
+          </a:r>
+          <a:endParaRPr lang="en-US" sz="1500" kern="1200" dirty="0"/>
         </a:p>
       </dsp:txBody>
       <dsp:txXfrm rot="-5400000">
-        <a:off x="660010" y="822098"/>
-        <a:ext cx="8911271" cy="553031"/>
+        <a:off x="532998" y="663893"/>
+        <a:ext cx="9044041" cy="446607"/>
       </dsp:txXfrm>
     </dsp:sp>
     <dsp:sp modelId="{8AB332C1-6C3F-1640-B492-3BCE9176D3DC}">
@@ -1893,8 +2091,8 @@
       </dsp:nvSpPr>
       <dsp:spPr>
         <a:xfrm rot="5400000">
-          <a:off x="-141430" y="1724253"/>
-          <a:ext cx="942872" cy="660010"/>
+          <a:off x="-114213" y="1392438"/>
+          <a:ext cx="761426" cy="532998"/>
         </a:xfrm>
         <a:prstGeom prst="chevron">
           <a:avLst/>
@@ -1958,12 +2156,12 @@
         </a:fontRef>
       </dsp:style>
       <dsp:txBody>
-        <a:bodyPr spcFirstLastPara="0" vert="horz" wrap="square" lIns="6350" tIns="6350" rIns="6350" bIns="6350" numCol="1" spcCol="1270" anchor="ctr" anchorCtr="0">
+        <a:bodyPr spcFirstLastPara="0" vert="horz" wrap="square" lIns="5080" tIns="5080" rIns="5080" bIns="5080" numCol="1" spcCol="1270" anchor="ctr" anchorCtr="0">
           <a:noAutofit/>
         </a:bodyPr>
         <a:lstStyle/>
         <a:p>
-          <a:pPr lvl="0" algn="ctr" defTabSz="444500">
+          <a:pPr lvl="0" algn="ctr" defTabSz="355600">
             <a:lnSpc>
               <a:spcPct val="90000"/>
             </a:lnSpc>
@@ -1974,12 +2172,16 @@
               <a:spcPct val="35000"/>
             </a:spcAft>
           </a:pPr>
-          <a:endParaRPr lang="en-US" sz="1000" kern="1200"/>
+          <a:r>
+            <a:rPr lang="en-US" sz="800" kern="1200" dirty="0" smtClean="0"/>
+            <a:t>Connectivity</a:t>
+          </a:r>
+          <a:endParaRPr lang="en-US" sz="800" kern="1200" dirty="0"/>
         </a:p>
       </dsp:txBody>
       <dsp:txXfrm rot="-5400000">
-        <a:off x="1" y="1912827"/>
-        <a:ext cx="660010" cy="282862"/>
+        <a:off x="1" y="1544723"/>
+        <a:ext cx="532998" cy="228428"/>
       </dsp:txXfrm>
     </dsp:sp>
     <dsp:sp modelId="{C1270033-955B-9440-AB6D-D1C7A299F8F3}">
@@ -1989,8 +2191,8 @@
       </dsp:nvSpPr>
       <dsp:spPr>
         <a:xfrm rot="5400000">
-          <a:off x="4824171" y="-2581338"/>
-          <a:ext cx="612867" cy="8941189"/>
+          <a:off x="4819635" y="-3008412"/>
+          <a:ext cx="494927" cy="9068201"/>
         </a:xfrm>
         <a:prstGeom prst="round2SameRect">
           <a:avLst/>
@@ -2030,12 +2232,12 @@
         <a:fontRef idx="minor"/>
       </dsp:style>
       <dsp:txBody>
-        <a:bodyPr spcFirstLastPara="0" vert="horz" wrap="square" lIns="128016" tIns="11430" rIns="11430" bIns="11430" numCol="1" spcCol="1270" anchor="ctr" anchorCtr="0">
+        <a:bodyPr spcFirstLastPara="0" vert="horz" wrap="square" lIns="106680" tIns="9525" rIns="9525" bIns="9525" numCol="1" spcCol="1270" anchor="ctr" anchorCtr="0">
           <a:noAutofit/>
         </a:bodyPr>
         <a:lstStyle/>
         <a:p>
-          <a:pPr marL="171450" lvl="1" indent="-171450" algn="l" defTabSz="800100">
+          <a:pPr marL="114300" lvl="1" indent="-114300" algn="l" defTabSz="666750">
             <a:lnSpc>
               <a:spcPct val="90000"/>
             </a:lnSpc>
@@ -2047,10 +2249,18 @@
             </a:spcAft>
             <a:buChar char="••"/>
           </a:pPr>
-          <a:endParaRPr lang="en-US" sz="1800" kern="1200"/>
+          <a:r>
+            <a:rPr lang="en-US" sz="1500" kern="1200" dirty="0" smtClean="0"/>
+            <a:t>REST API’s with a client-server configuration</a:t>
+          </a:r>
+          <a:r>
+            <a:rPr lang="en-US" sz="1500" kern="1200" baseline="0" dirty="0" smtClean="0"/>
+            <a:t> keeps the Pebble modular and disposable</a:t>
+          </a:r>
+          <a:endParaRPr lang="en-US" sz="1500" kern="1200" dirty="0"/>
         </a:p>
         <a:p>
-          <a:pPr marL="171450" lvl="1" indent="-171450" algn="l" defTabSz="800100">
+          <a:pPr marL="114300" lvl="1" indent="-114300" algn="l" defTabSz="666750">
             <a:lnSpc>
               <a:spcPct val="90000"/>
             </a:lnSpc>
@@ -2062,12 +2272,20 @@
             </a:spcAft>
             <a:buChar char="••"/>
           </a:pPr>
-          <a:endParaRPr lang="en-US" sz="1800" kern="1200"/>
+          <a:r>
+            <a:rPr lang="en-US" sz="1500" kern="1200" dirty="0" smtClean="0"/>
+            <a:t>Users retrieve</a:t>
+          </a:r>
+          <a:r>
+            <a:rPr lang="en-US" sz="1500" kern="1200" baseline="0" dirty="0" smtClean="0"/>
+            <a:t> processed data from the server</a:t>
+          </a:r>
+          <a:endParaRPr lang="en-US" sz="1500" kern="1200" dirty="0"/>
         </a:p>
       </dsp:txBody>
       <dsp:txXfrm rot="-5400000">
-        <a:off x="660010" y="1612741"/>
-        <a:ext cx="8911271" cy="553031"/>
+        <a:off x="532998" y="1302385"/>
+        <a:ext cx="9044041" cy="446607"/>
       </dsp:txXfrm>
     </dsp:sp>
     <dsp:sp modelId="{CBE0D47B-F51C-6945-999B-50928C2463B5}">
@@ -2077,8 +2295,8 @@
       </dsp:nvSpPr>
       <dsp:spPr>
         <a:xfrm rot="5400000">
-          <a:off x="-141430" y="2514897"/>
-          <a:ext cx="942872" cy="660010"/>
+          <a:off x="-114213" y="2030930"/>
+          <a:ext cx="761426" cy="532998"/>
         </a:xfrm>
         <a:prstGeom prst="chevron">
           <a:avLst/>
@@ -2142,12 +2360,12 @@
         </a:fontRef>
       </dsp:style>
       <dsp:txBody>
-        <a:bodyPr spcFirstLastPara="0" vert="horz" wrap="square" lIns="6350" tIns="6350" rIns="6350" bIns="6350" numCol="1" spcCol="1270" anchor="ctr" anchorCtr="0">
+        <a:bodyPr spcFirstLastPara="0" vert="horz" wrap="square" lIns="5080" tIns="5080" rIns="5080" bIns="5080" numCol="1" spcCol="1270" anchor="ctr" anchorCtr="0">
           <a:noAutofit/>
         </a:bodyPr>
         <a:lstStyle/>
         <a:p>
-          <a:pPr lvl="0" algn="ctr" defTabSz="444500">
+          <a:pPr lvl="0" algn="ctr" defTabSz="355600">
             <a:lnSpc>
               <a:spcPct val="90000"/>
             </a:lnSpc>
@@ -2158,12 +2376,16 @@
               <a:spcPct val="35000"/>
             </a:spcAft>
           </a:pPr>
-          <a:endParaRPr lang="en-US" sz="1000" kern="1200"/>
+          <a:r>
+            <a:rPr lang="en-US" sz="800" kern="1200" dirty="0" smtClean="0"/>
+            <a:t>Product</a:t>
+          </a:r>
+          <a:endParaRPr lang="en-US" sz="800" kern="1200" dirty="0"/>
         </a:p>
       </dsp:txBody>
       <dsp:txXfrm rot="-5400000">
-        <a:off x="1" y="2703471"/>
-        <a:ext cx="660010" cy="282862"/>
+        <a:off x="1" y="2183215"/>
+        <a:ext cx="532998" cy="228428"/>
       </dsp:txXfrm>
     </dsp:sp>
     <dsp:sp modelId="{BBEEE3A0-CFAA-5146-AFD0-D60991A55050}">
@@ -2173,8 +2395,8 @@
       </dsp:nvSpPr>
       <dsp:spPr>
         <a:xfrm rot="5400000">
-          <a:off x="4824171" y="-1790694"/>
-          <a:ext cx="612867" cy="8941189"/>
+          <a:off x="4819635" y="-2369920"/>
+          <a:ext cx="494927" cy="9068201"/>
         </a:xfrm>
         <a:prstGeom prst="round2SameRect">
           <a:avLst/>
@@ -2213,6 +2435,231 @@
         </a:effectRef>
         <a:fontRef idx="minor"/>
       </dsp:style>
+      <dsp:txBody>
+        <a:bodyPr spcFirstLastPara="0" vert="horz" wrap="square" lIns="106680" tIns="9525" rIns="9525" bIns="9525" numCol="1" spcCol="1270" anchor="ctr" anchorCtr="0">
+          <a:noAutofit/>
+        </a:bodyPr>
+        <a:lstStyle/>
+        <a:p>
+          <a:pPr marL="114300" lvl="1" indent="-114300" algn="l" defTabSz="666750">
+            <a:lnSpc>
+              <a:spcPct val="90000"/>
+            </a:lnSpc>
+            <a:spcBef>
+              <a:spcPct val="0"/>
+            </a:spcBef>
+            <a:spcAft>
+              <a:spcPct val="15000"/>
+            </a:spcAft>
+            <a:buChar char="••"/>
+          </a:pPr>
+          <a:r>
+            <a:rPr lang="en-US" sz="1500" kern="1200" dirty="0" smtClean="0"/>
+            <a:t>Array of sensors capture the environment around it</a:t>
+          </a:r>
+          <a:endParaRPr lang="en-US" sz="1500" kern="1200" dirty="0"/>
+        </a:p>
+        <a:p>
+          <a:pPr marL="114300" lvl="1" indent="-114300" algn="l" defTabSz="666750">
+            <a:lnSpc>
+              <a:spcPct val="90000"/>
+            </a:lnSpc>
+            <a:spcBef>
+              <a:spcPct val="0"/>
+            </a:spcBef>
+            <a:spcAft>
+              <a:spcPct val="15000"/>
+            </a:spcAft>
+            <a:buChar char="••"/>
+          </a:pPr>
+          <a:r>
+            <a:rPr lang="en-US" sz="1500" kern="1200" dirty="0" smtClean="0"/>
+            <a:t>Onboard embedded software written in easily maintainable Python</a:t>
+          </a:r>
+          <a:endParaRPr lang="en-US" sz="1500" kern="1200" dirty="0"/>
+        </a:p>
+      </dsp:txBody>
+      <dsp:txXfrm rot="-5400000">
+        <a:off x="532998" y="1940877"/>
+        <a:ext cx="9044041" cy="446607"/>
+      </dsp:txXfrm>
+    </dsp:sp>
+    <dsp:sp modelId="{5C902887-AF36-2E4D-804B-381E2921CB7B}">
+      <dsp:nvSpPr>
+        <dsp:cNvPr id="0" name=""/>
+        <dsp:cNvSpPr/>
+      </dsp:nvSpPr>
+      <dsp:spPr>
+        <a:xfrm rot="5400000">
+          <a:off x="-114213" y="2669422"/>
+          <a:ext cx="761426" cy="532998"/>
+        </a:xfrm>
+        <a:prstGeom prst="chevron">
+          <a:avLst/>
+        </a:prstGeom>
+        <a:blipFill rotWithShape="0">
+          <a:blip xmlns:r="http://schemas.openxmlformats.org/officeDocument/2006/relationships" r:embed="rId1">
+            <a:duotone>
+              <a:schemeClr val="accent1">
+                <a:hueOff val="0"/>
+                <a:satOff val="0"/>
+                <a:lumOff val="0"/>
+                <a:alphaOff val="0"/>
+                <a:shade val="74000"/>
+                <a:satMod val="130000"/>
+                <a:lumMod val="90000"/>
+              </a:schemeClr>
+              <a:schemeClr val="accent1">
+                <a:hueOff val="0"/>
+                <a:satOff val="0"/>
+                <a:lumOff val="0"/>
+                <a:alphaOff val="0"/>
+                <a:tint val="94000"/>
+                <a:satMod val="120000"/>
+                <a:lumMod val="104000"/>
+              </a:schemeClr>
+            </a:duotone>
+          </a:blip>
+          <a:tile tx="0" ty="0" sx="100000" sy="100000" flip="none" algn="tl"/>
+        </a:blipFill>
+        <a:ln w="9525" cap="flat" cmpd="sng" algn="ctr">
+          <a:solidFill>
+            <a:schemeClr val="accent1">
+              <a:hueOff val="0"/>
+              <a:satOff val="0"/>
+              <a:lumOff val="0"/>
+              <a:alphaOff val="0"/>
+            </a:schemeClr>
+          </a:solidFill>
+          <a:prstDash val="solid"/>
+        </a:ln>
+        <a:effectLst>
+          <a:innerShdw blurRad="25400" dist="12700" dir="13500000">
+            <a:srgbClr val="000000">
+              <a:alpha val="45000"/>
+            </a:srgbClr>
+          </a:innerShdw>
+        </a:effectLst>
+      </dsp:spPr>
+      <dsp:style>
+        <a:lnRef idx="1">
+          <a:scrgbClr r="0" g="0" b="0"/>
+        </a:lnRef>
+        <a:fillRef idx="3">
+          <a:scrgbClr r="0" g="0" b="0"/>
+        </a:fillRef>
+        <a:effectRef idx="2">
+          <a:scrgbClr r="0" g="0" b="0"/>
+        </a:effectRef>
+        <a:fontRef idx="minor">
+          <a:schemeClr val="lt1"/>
+        </a:fontRef>
+      </dsp:style>
+      <dsp:txBody>
+        <a:bodyPr spcFirstLastPara="0" vert="horz" wrap="square" lIns="5080" tIns="5080" rIns="5080" bIns="5080" numCol="1" spcCol="1270" anchor="ctr" anchorCtr="0">
+          <a:noAutofit/>
+        </a:bodyPr>
+        <a:lstStyle/>
+        <a:p>
+          <a:pPr lvl="0" algn="ctr" defTabSz="355600">
+            <a:lnSpc>
+              <a:spcPct val="90000"/>
+            </a:lnSpc>
+            <a:spcBef>
+              <a:spcPct val="0"/>
+            </a:spcBef>
+            <a:spcAft>
+              <a:spcPct val="35000"/>
+            </a:spcAft>
+          </a:pPr>
+          <a:r>
+            <a:rPr lang="en-US" sz="800" kern="1200" dirty="0" smtClean="0"/>
+            <a:t>Analytics</a:t>
+          </a:r>
+          <a:endParaRPr lang="en-US" sz="800" kern="1200" dirty="0"/>
+        </a:p>
+      </dsp:txBody>
+      <dsp:txXfrm rot="-5400000">
+        <a:off x="1" y="2821707"/>
+        <a:ext cx="532998" cy="228428"/>
+      </dsp:txXfrm>
+    </dsp:sp>
+    <dsp:sp modelId="{EA0975DF-4971-DF46-83A9-F12C69998F7F}">
+      <dsp:nvSpPr>
+        <dsp:cNvPr id="0" name=""/>
+        <dsp:cNvSpPr/>
+      </dsp:nvSpPr>
+      <dsp:spPr>
+        <a:xfrm rot="5400000">
+          <a:off x="4819635" y="-1731428"/>
+          <a:ext cx="494927" cy="9068201"/>
+        </a:xfrm>
+        <a:prstGeom prst="round2SameRect">
+          <a:avLst/>
+        </a:prstGeom>
+        <a:solidFill>
+          <a:schemeClr val="lt1">
+            <a:alpha val="90000"/>
+            <a:hueOff val="0"/>
+            <a:satOff val="0"/>
+            <a:lumOff val="0"/>
+            <a:alphaOff val="0"/>
+          </a:schemeClr>
+        </a:solidFill>
+        <a:ln w="9525" cap="flat" cmpd="sng" algn="ctr">
+          <a:solidFill>
+            <a:schemeClr val="accent1">
+              <a:hueOff val="0"/>
+              <a:satOff val="0"/>
+              <a:lumOff val="0"/>
+              <a:alphaOff val="0"/>
+            </a:schemeClr>
+          </a:solidFill>
+          <a:prstDash val="solid"/>
+        </a:ln>
+        <a:effectLst/>
+      </dsp:spPr>
+      <dsp:style>
+        <a:lnRef idx="1">
+          <a:scrgbClr r="0" g="0" b="0"/>
+        </a:lnRef>
+        <a:fillRef idx="1">
+          <a:scrgbClr r="0" g="0" b="0"/>
+        </a:fillRef>
+        <a:effectRef idx="0">
+          <a:scrgbClr r="0" g="0" b="0"/>
+        </a:effectRef>
+        <a:fontRef idx="minor"/>
+      </dsp:style>
+      <dsp:txBody>
+        <a:bodyPr spcFirstLastPara="0" vert="horz" wrap="square" lIns="106680" tIns="9525" rIns="9525" bIns="9525" numCol="1" spcCol="1270" anchor="ctr" anchorCtr="0">
+          <a:noAutofit/>
+        </a:bodyPr>
+        <a:lstStyle/>
+        <a:p>
+          <a:pPr marL="114300" lvl="1" indent="-114300" algn="l" defTabSz="666750">
+            <a:lnSpc>
+              <a:spcPct val="90000"/>
+            </a:lnSpc>
+            <a:spcBef>
+              <a:spcPct val="0"/>
+            </a:spcBef>
+            <a:spcAft>
+              <a:spcPct val="15000"/>
+            </a:spcAft>
+            <a:buChar char="••"/>
+          </a:pPr>
+          <a:r>
+            <a:rPr lang="en-US" sz="1500" kern="1200" dirty="0" smtClean="0"/>
+            <a:t>Crowdsourced anonymous data allow servers to tweak their algorithms autonomously.</a:t>
+          </a:r>
+          <a:endParaRPr lang="en-US" sz="1500" kern="1200" dirty="0"/>
+        </a:p>
+      </dsp:txBody>
+      <dsp:txXfrm rot="-5400000">
+        <a:off x="532998" y="2579369"/>
+        <a:ext cx="9044041" cy="446607"/>
+      </dsp:txXfrm>
     </dsp:sp>
   </dsp:spTree>
 </dsp:drawing>
@@ -3839,7 +4286,7 @@
           <a:p>
             <a:fld id="{0BCE4439-E337-7647-8BE8-4A4D11C1FA42}" type="datetimeFigureOut">
               <a:rPr lang="en-US" smtClean="0"/>
-              <a:t>9/19/2016</a:t>
+              <a:t>9/19/16</a:t>
             </a:fld>
             <a:endParaRPr lang="en-US"/>
           </a:p>
@@ -4163,7 +4610,7 @@
           <a:p>
             <a:fld id="{0BCE4439-E337-7647-8BE8-4A4D11C1FA42}" type="datetimeFigureOut">
               <a:rPr lang="en-US" smtClean="0"/>
-              <a:t>9/19/2016</a:t>
+              <a:t>9/19/16</a:t>
             </a:fld>
             <a:endParaRPr lang="en-US"/>
           </a:p>
@@ -4411,7 +4858,7 @@
           <a:p>
             <a:fld id="{0BCE4439-E337-7647-8BE8-4A4D11C1FA42}" type="datetimeFigureOut">
               <a:rPr lang="en-US" smtClean="0"/>
-              <a:t>9/19/2016</a:t>
+              <a:t>9/19/16</a:t>
             </a:fld>
             <a:endParaRPr lang="en-US"/>
           </a:p>
@@ -4750,7 +5197,7 @@
           <a:p>
             <a:fld id="{0BCE4439-E337-7647-8BE8-4A4D11C1FA42}" type="datetimeFigureOut">
               <a:rPr lang="en-US" smtClean="0"/>
-              <a:t>9/19/2016</a:t>
+              <a:t>9/19/16</a:t>
             </a:fld>
             <a:endParaRPr lang="en-US"/>
           </a:p>
@@ -5097,7 +5544,7 @@
           <a:p>
             <a:fld id="{0BCE4439-E337-7647-8BE8-4A4D11C1FA42}" type="datetimeFigureOut">
               <a:rPr lang="en-US" smtClean="0"/>
-              <a:t>9/19/2016</a:t>
+              <a:t>9/19/16</a:t>
             </a:fld>
             <a:endParaRPr lang="en-US"/>
           </a:p>
@@ -5471,7 +5918,7 @@
           <a:p>
             <a:fld id="{0BCE4439-E337-7647-8BE8-4A4D11C1FA42}" type="datetimeFigureOut">
               <a:rPr lang="en-US" smtClean="0"/>
-              <a:t>9/19/2016</a:t>
+              <a:t>9/19/16</a:t>
             </a:fld>
             <a:endParaRPr lang="en-US"/>
           </a:p>
@@ -5941,7 +6388,7 @@
           <a:p>
             <a:fld id="{0BCE4439-E337-7647-8BE8-4A4D11C1FA42}" type="datetimeFigureOut">
               <a:rPr lang="en-US" smtClean="0"/>
-              <a:t>9/19/2016</a:t>
+              <a:t>9/19/16</a:t>
             </a:fld>
             <a:endParaRPr lang="en-US"/>
           </a:p>
@@ -6146,7 +6593,7 @@
           <a:p>
             <a:fld id="{0BCE4439-E337-7647-8BE8-4A4D11C1FA42}" type="datetimeFigureOut">
               <a:rPr lang="en-US" smtClean="0"/>
-              <a:t>9/19/2016</a:t>
+              <a:t>9/19/16</a:t>
             </a:fld>
             <a:endParaRPr lang="en-US"/>
           </a:p>
@@ -6357,7 +6804,7 @@
           <a:p>
             <a:fld id="{0BCE4439-E337-7647-8BE8-4A4D11C1FA42}" type="datetimeFigureOut">
               <a:rPr lang="en-US" smtClean="0"/>
-              <a:t>9/19/2016</a:t>
+              <a:t>9/19/16</a:t>
             </a:fld>
             <a:endParaRPr lang="en-US"/>
           </a:p>
@@ -6589,7 +7036,7 @@
           <a:p>
             <a:fld id="{0BCE4439-E337-7647-8BE8-4A4D11C1FA42}" type="datetimeFigureOut">
               <a:rPr lang="en-US" smtClean="0"/>
-              <a:t>9/19/2016</a:t>
+              <a:t>9/19/16</a:t>
             </a:fld>
             <a:endParaRPr lang="en-US"/>
           </a:p>
@@ -6837,7 +7284,7 @@
           <a:p>
             <a:fld id="{0BCE4439-E337-7647-8BE8-4A4D11C1FA42}" type="datetimeFigureOut">
               <a:rPr lang="en-US" smtClean="0"/>
-              <a:t>9/19/2016</a:t>
+              <a:t>9/19/16</a:t>
             </a:fld>
             <a:endParaRPr lang="en-US"/>
           </a:p>
@@ -7135,7 +7582,7 @@
           <a:p>
             <a:fld id="{0BCE4439-E337-7647-8BE8-4A4D11C1FA42}" type="datetimeFigureOut">
               <a:rPr lang="en-US" smtClean="0"/>
-              <a:t>9/19/2016</a:t>
+              <a:t>9/19/16</a:t>
             </a:fld>
             <a:endParaRPr lang="en-US"/>
           </a:p>
@@ -7529,7 +7976,7 @@
           <a:p>
             <a:fld id="{0BCE4439-E337-7647-8BE8-4A4D11C1FA42}" type="datetimeFigureOut">
               <a:rPr lang="en-US" smtClean="0"/>
-              <a:t>9/19/2016</a:t>
+              <a:t>9/19/16</a:t>
             </a:fld>
             <a:endParaRPr lang="en-US"/>
           </a:p>
@@ -7678,7 +8125,7 @@
           <a:p>
             <a:fld id="{0BCE4439-E337-7647-8BE8-4A4D11C1FA42}" type="datetimeFigureOut">
               <a:rPr lang="en-US" smtClean="0"/>
-              <a:t>9/19/2016</a:t>
+              <a:t>9/19/16</a:t>
             </a:fld>
             <a:endParaRPr lang="en-US"/>
           </a:p>
@@ -7804,7 +8251,7 @@
           <a:p>
             <a:fld id="{0BCE4439-E337-7647-8BE8-4A4D11C1FA42}" type="datetimeFigureOut">
               <a:rPr lang="en-US" smtClean="0"/>
-              <a:t>9/19/2016</a:t>
+              <a:t>9/19/16</a:t>
             </a:fld>
             <a:endParaRPr lang="en-US"/>
           </a:p>
@@ -8059,7 +8506,7 @@
           <a:p>
             <a:fld id="{0BCE4439-E337-7647-8BE8-4A4D11C1FA42}" type="datetimeFigureOut">
               <a:rPr lang="en-US" smtClean="0"/>
-              <a:t>9/19/2016</a:t>
+              <a:t>9/19/16</a:t>
             </a:fld>
             <a:endParaRPr lang="en-US"/>
           </a:p>
@@ -8374,7 +8821,7 @@
           <a:p>
             <a:fld id="{0BCE4439-E337-7647-8BE8-4A4D11C1FA42}" type="datetimeFigureOut">
               <a:rPr lang="en-US" smtClean="0"/>
-              <a:t>9/19/2016</a:t>
+              <a:t>9/19/16</a:t>
             </a:fld>
             <a:endParaRPr lang="en-US"/>
           </a:p>
@@ -8725,7 +9172,7 @@
           <a:p>
             <a:fld id="{0BCE4439-E337-7647-8BE8-4A4D11C1FA42}" type="datetimeFigureOut">
               <a:rPr lang="en-US" smtClean="0"/>
-              <a:t>9/19/2016</a:t>
+              <a:t>9/19/16</a:t>
             </a:fld>
             <a:endParaRPr lang="en-US"/>
           </a:p>
@@ -9415,7 +9862,7 @@
           <a:p>
             <a:r>
               <a:rPr lang="en-US" dirty="0" smtClean="0"/>
-              <a:t>Wireless transmit data to the cloud</a:t>
+              <a:t>Wirelessly transmit data to the cloud</a:t>
             </a:r>
           </a:p>
           <a:p>
@@ -9769,19 +10216,6 @@
               </a:rPr>
               <a:t>ABS plastic</a:t>
             </a:r>
-            <a:endParaRPr lang="en-US" sz="3600" dirty="0">
-              <a:ln w="0"/>
-              <a:solidFill>
-                <a:schemeClr val="tx1"/>
-              </a:solidFill>
-              <a:effectLst>
-                <a:outerShdw blurRad="38100" dist="19050" dir="2700000" algn="tl" rotWithShape="0">
-                  <a:schemeClr val="dk1">
-                    <a:alpha val="40000"/>
-                  </a:schemeClr>
-                </a:outerShdw>
-              </a:effectLst>
-            </a:endParaRPr>
           </a:p>
         </p:txBody>
       </p:sp>
@@ -9984,7 +10418,7 @@
             <p:ph idx="1"/>
             <p:extLst>
               <p:ext uri="{D42A27DB-BD31-4B8C-83A1-F6EECF244321}">
-                <p14:modId xmlns:p14="http://schemas.microsoft.com/office/powerpoint/2010/main" val="482152658"/>
+                <p14:modId xmlns:p14="http://schemas.microsoft.com/office/powerpoint/2010/main" val="1640938109"/>
               </p:ext>
             </p:extLst>
           </p:nvPr>
@@ -10067,7 +10501,23 @@
           <a:bodyPr/>
           <a:lstStyle/>
           <a:p>
-            <a:endParaRPr lang="en-US"/>
+            <a:r>
+              <a:rPr lang="en-US" dirty="0" smtClean="0"/>
+              <a:t>Current soil monitoring products on market are bulky and not accurate</a:t>
+            </a:r>
+          </a:p>
+          <a:p>
+            <a:r>
+              <a:rPr lang="en-US" dirty="0" smtClean="0"/>
+              <a:t>Reinforcement learning system augments the sensor values to reduce errors</a:t>
+            </a:r>
+          </a:p>
+          <a:p>
+            <a:r>
+              <a:rPr lang="en-US" dirty="0" smtClean="0"/>
+              <a:t> Solar panels remove the need to recharge unlike competitors</a:t>
+            </a:r>
+            <a:endParaRPr lang="en-US" dirty="0"/>
           </a:p>
         </p:txBody>
       </p:sp>

</xml_diff>